<commit_message>
feat: add Matěj's and Jirka's slides
</commit_message>
<xml_diff>
--- a/milestone_2/sch2_milestone_2.pptx
+++ b/milestone_2/sch2_milestone_2.pptx
@@ -124,16 +124,31 @@
 </p:presentation>
 </file>
 
-<file path=ppt/revisionInfo.xml><?xml version="1.0" encoding="utf-8"?>
-<p1510:revInfo xmlns:a="http://schemas.openxmlformats.org/drawingml/2006/main" xmlns:r="http://schemas.openxmlformats.org/officeDocument/2006/relationships" xmlns:p1510="http://schemas.microsoft.com/office/powerpoint/2015/10/main">
-  <p1510:revLst>
-    <p1510:client id="{A1E7D825-9AD9-4D2B-A34F-7A0F0371E74F}" v="2" dt="2024-12-10T15:04:40.893"/>
-  </p1510:revLst>
-</p1510:revInfo>
-</file>
-
 <file path=ppt/changesInfos/changesInfo1.xml><?xml version="1.0" encoding="utf-8"?>
 <pc:chgInfo xmlns:a="http://schemas.openxmlformats.org/drawingml/2006/main" xmlns:r="http://schemas.openxmlformats.org/officeDocument/2006/relationships" xmlns:ac="http://schemas.microsoft.com/office/drawing/2013/main/command" xmlns:pc="http://schemas.microsoft.com/office/powerpoint/2013/main/command">
+  <pc:docChgLst>
+    <pc:chgData name="Uživatel typu Host" providerId="Windows Live" clId="Web-{31BAD6C0-C353-4650-B105-D3A775045F02}"/>
+    <pc:docChg chg="addSld delSld modSld sldOrd">
+      <pc:chgData name="Uživatel typu Host" userId="" providerId="Windows Live" clId="Web-{31BAD6C0-C353-4650-B105-D3A775045F02}" dt="2024-11-25T12:33:42.874" v="36" actId="1076"/>
+      <pc:docMkLst>
+        <pc:docMk/>
+      </pc:docMkLst>
+      <pc:sldChg chg="addSp delSp modSp del mod setBg">
+        <pc:chgData name="Uživatel typu Host" userId="" providerId="Windows Live" clId="Web-{31BAD6C0-C353-4650-B105-D3A775045F02}" dt="2024-11-25T12:33:06.983" v="28"/>
+        <pc:sldMkLst>
+          <pc:docMk/>
+          <pc:sldMk cId="3548834691" sldId="262"/>
+        </pc:sldMkLst>
+      </pc:sldChg>
+      <pc:sldChg chg="addSp delSp modSp add ord replId">
+        <pc:chgData name="Uživatel typu Host" userId="" providerId="Windows Live" clId="Web-{31BAD6C0-C353-4650-B105-D3A775045F02}" dt="2024-11-25T12:33:42.874" v="36" actId="1076"/>
+        <pc:sldMkLst>
+          <pc:docMk/>
+          <pc:sldMk cId="3192235045" sldId="265"/>
+        </pc:sldMkLst>
+      </pc:sldChg>
+    </pc:docChg>
+  </pc:docChgLst>
   <pc:docChgLst>
     <pc:chgData name="Martin Znamenáček" userId="33331470d373d797" providerId="Windows Live" clId="Web-{0C96E2EA-5096-4B4A-988B-F298539B8DAA}"/>
     <pc:docChg chg="addSld modSld">
@@ -147,38 +162,6 @@
           <pc:docMk/>
           <pc:sldMk cId="297826942" sldId="259"/>
         </pc:sldMkLst>
-        <pc:spChg chg="mod">
-          <ac:chgData name="Martin Znamenáček" userId="33331470d373d797" providerId="Windows Live" clId="Web-{0C96E2EA-5096-4B4A-988B-F298539B8DAA}" dt="2024-11-25T23:07:39.695" v="492" actId="20577"/>
-          <ac:spMkLst>
-            <pc:docMk/>
-            <pc:sldMk cId="297826942" sldId="259"/>
-            <ac:spMk id="3" creationId="{D488303E-288C-652B-FD3A-A8A593001CE1}"/>
-          </ac:spMkLst>
-        </pc:spChg>
-        <pc:spChg chg="add del mod">
-          <ac:chgData name="Martin Znamenáček" userId="33331470d373d797" providerId="Windows Live" clId="Web-{0C96E2EA-5096-4B4A-988B-F298539B8DAA}" dt="2024-11-25T23:10:41.983" v="526"/>
-          <ac:spMkLst>
-            <pc:docMk/>
-            <pc:sldMk cId="297826942" sldId="259"/>
-            <ac:spMk id="5" creationId="{08DB4DB8-CFA1-D481-112C-527076FA1C26}"/>
-          </ac:spMkLst>
-        </pc:spChg>
-        <pc:spChg chg="add mod">
-          <ac:chgData name="Martin Znamenáček" userId="33331470d373d797" providerId="Windows Live" clId="Web-{0C96E2EA-5096-4B4A-988B-F298539B8DAA}" dt="2024-11-25T23:10:56.577" v="533" actId="20577"/>
-          <ac:spMkLst>
-            <pc:docMk/>
-            <pc:sldMk cId="297826942" sldId="259"/>
-            <ac:spMk id="7" creationId="{7F5F7A00-A21C-22EA-8E69-F601DD66BA9F}"/>
-          </ac:spMkLst>
-        </pc:spChg>
-        <pc:picChg chg="add mod ord">
-          <ac:chgData name="Martin Znamenáček" userId="33331470d373d797" providerId="Windows Live" clId="Web-{0C96E2EA-5096-4B4A-988B-F298539B8DAA}" dt="2024-11-25T23:11:05.733" v="534" actId="1076"/>
-          <ac:picMkLst>
-            <pc:docMk/>
-            <pc:sldMk cId="297826942" sldId="259"/>
-            <ac:picMk id="4" creationId="{4A15A527-BCF7-C39E-C441-149E0FC387CB}"/>
-          </ac:picMkLst>
-        </pc:picChg>
       </pc:sldChg>
       <pc:sldChg chg="addSp delSp modSp mod setBg">
         <pc:chgData name="Martin Znamenáček" userId="33331470d373d797" providerId="Windows Live" clId="Web-{0C96E2EA-5096-4B4A-988B-F298539B8DAA}" dt="2024-11-26T00:33:12.715" v="995" actId="20577"/>
@@ -186,70 +169,6 @@
           <pc:docMk/>
           <pc:sldMk cId="4287060232" sldId="260"/>
         </pc:sldMkLst>
-        <pc:spChg chg="mod">
-          <ac:chgData name="Martin Znamenáček" userId="33331470d373d797" providerId="Windows Live" clId="Web-{0C96E2EA-5096-4B4A-988B-F298539B8DAA}" dt="2024-11-25T22:53:38.262" v="308" actId="1076"/>
-          <ac:spMkLst>
-            <pc:docMk/>
-            <pc:sldMk cId="4287060232" sldId="260"/>
-            <ac:spMk id="2" creationId="{4826B047-9CD3-700F-A48D-826654355DDB}"/>
-          </ac:spMkLst>
-        </pc:spChg>
-        <pc:spChg chg="mod">
-          <ac:chgData name="Martin Znamenáček" userId="33331470d373d797" providerId="Windows Live" clId="Web-{0C96E2EA-5096-4B4A-988B-F298539B8DAA}" dt="2024-11-26T00:33:12.715" v="995" actId="20577"/>
-          <ac:spMkLst>
-            <pc:docMk/>
-            <pc:sldMk cId="4287060232" sldId="260"/>
-            <ac:spMk id="3" creationId="{6727F3E9-FD26-C2B8-789C-D06C94AD34BB}"/>
-          </ac:spMkLst>
-        </pc:spChg>
-        <pc:spChg chg="add mod">
-          <ac:chgData name="Martin Znamenáček" userId="33331470d373d797" providerId="Windows Live" clId="Web-{0C96E2EA-5096-4B4A-988B-F298539B8DAA}" dt="2024-11-25T23:10:07.544" v="511" actId="20577"/>
-          <ac:spMkLst>
-            <pc:docMk/>
-            <pc:sldMk cId="4287060232" sldId="260"/>
-            <ac:spMk id="10" creationId="{9BA7366B-E37D-1446-438B-3984475C04DB}"/>
-          </ac:spMkLst>
-        </pc:spChg>
-        <pc:picChg chg="del mod">
-          <ac:chgData name="Martin Znamenáček" userId="33331470d373d797" providerId="Windows Live" clId="Web-{0C96E2EA-5096-4B4A-988B-F298539B8DAA}" dt="2024-11-25T22:36:13.006" v="1"/>
-          <ac:picMkLst>
-            <pc:docMk/>
-            <pc:sldMk cId="4287060232" sldId="260"/>
-            <ac:picMk id="4" creationId="{4A15A527-BCF7-C39E-C441-149E0FC387CB}"/>
-          </ac:picMkLst>
-        </pc:picChg>
-        <pc:picChg chg="add del mod">
-          <ac:chgData name="Martin Znamenáček" userId="33331470d373d797" providerId="Windows Live" clId="Web-{0C96E2EA-5096-4B4A-988B-F298539B8DAA}" dt="2024-11-25T22:46:19.513" v="193"/>
-          <ac:picMkLst>
-            <pc:docMk/>
-            <pc:sldMk cId="4287060232" sldId="260"/>
-            <ac:picMk id="5" creationId="{C8B76FED-B844-3DEA-3B99-ACB72C9E9BFA}"/>
-          </ac:picMkLst>
-        </pc:picChg>
-        <pc:picChg chg="add del mod">
-          <ac:chgData name="Martin Znamenáček" userId="33331470d373d797" providerId="Windows Live" clId="Web-{0C96E2EA-5096-4B4A-988B-F298539B8DAA}" dt="2024-11-25T22:46:40.373" v="196"/>
-          <ac:picMkLst>
-            <pc:docMk/>
-            <pc:sldMk cId="4287060232" sldId="260"/>
-            <ac:picMk id="6" creationId="{7B2DE8C2-4583-5A39-7BC2-437C184F7BE5}"/>
-          </ac:picMkLst>
-        </pc:picChg>
-        <pc:picChg chg="add del mod">
-          <ac:chgData name="Martin Znamenáček" userId="33331470d373d797" providerId="Windows Live" clId="Web-{0C96E2EA-5096-4B4A-988B-F298539B8DAA}" dt="2024-11-25T22:47:39.875" v="201"/>
-          <ac:picMkLst>
-            <pc:docMk/>
-            <pc:sldMk cId="4287060232" sldId="260"/>
-            <ac:picMk id="7" creationId="{2BBE6F33-4F34-D3ED-DA4E-463C6A34EA00}"/>
-          </ac:picMkLst>
-        </pc:picChg>
-        <pc:picChg chg="add del mod ord">
-          <ac:chgData name="Martin Znamenáček" userId="33331470d373d797" providerId="Windows Live" clId="Web-{0C96E2EA-5096-4B4A-988B-F298539B8DAA}" dt="2024-11-25T22:54:25.966" v="315" actId="1076"/>
-          <ac:picMkLst>
-            <pc:docMk/>
-            <pc:sldMk cId="4287060232" sldId="260"/>
-            <ac:picMk id="8" creationId="{AB8E3C01-806E-A6D3-8DF5-2484FAC21324}"/>
-          </ac:picMkLst>
-        </pc:picChg>
       </pc:sldChg>
       <pc:sldChg chg="addSp modSp add replId">
         <pc:chgData name="Martin Znamenáček" userId="33331470d373d797" providerId="Windows Live" clId="Web-{0C96E2EA-5096-4B4A-988B-F298539B8DAA}" dt="2024-11-26T00:33:20.215" v="997" actId="20577"/>
@@ -257,22 +176,6 @@
           <pc:docMk/>
           <pc:sldMk cId="1682889938" sldId="278"/>
         </pc:sldMkLst>
-        <pc:spChg chg="mod">
-          <ac:chgData name="Martin Znamenáček" userId="33331470d373d797" providerId="Windows Live" clId="Web-{0C96E2EA-5096-4B4A-988B-F298539B8DAA}" dt="2024-11-26T00:33:20.215" v="997" actId="20577"/>
-          <ac:spMkLst>
-            <pc:docMk/>
-            <pc:sldMk cId="1682889938" sldId="278"/>
-            <ac:spMk id="3" creationId="{6727F3E9-FD26-C2B8-789C-D06C94AD34BB}"/>
-          </ac:spMkLst>
-        </pc:spChg>
-        <pc:spChg chg="add">
-          <ac:chgData name="Martin Znamenáček" userId="33331470d373d797" providerId="Windows Live" clId="Web-{0C96E2EA-5096-4B4A-988B-F298539B8DAA}" dt="2024-11-25T23:10:13.841" v="512"/>
-          <ac:spMkLst>
-            <pc:docMk/>
-            <pc:sldMk cId="1682889938" sldId="278"/>
-            <ac:spMk id="5" creationId="{32F4C2C1-7E42-2238-3512-3A5427505411}"/>
-          </ac:spMkLst>
-        </pc:spChg>
       </pc:sldChg>
       <pc:sldChg chg="addSp modSp add replId">
         <pc:chgData name="Martin Znamenáček" userId="33331470d373d797" providerId="Windows Live" clId="Web-{0C96E2EA-5096-4B4A-988B-F298539B8DAA}" dt="2024-11-26T00:35:39.048" v="1007" actId="20577"/>
@@ -280,22 +183,6 @@
           <pc:docMk/>
           <pc:sldMk cId="1956524294" sldId="279"/>
         </pc:sldMkLst>
-        <pc:spChg chg="mod">
-          <ac:chgData name="Martin Znamenáček" userId="33331470d373d797" providerId="Windows Live" clId="Web-{0C96E2EA-5096-4B4A-988B-F298539B8DAA}" dt="2024-11-26T00:35:39.048" v="1007" actId="20577"/>
-          <ac:spMkLst>
-            <pc:docMk/>
-            <pc:sldMk cId="1956524294" sldId="279"/>
-            <ac:spMk id="3" creationId="{6727F3E9-FD26-C2B8-789C-D06C94AD34BB}"/>
-          </ac:spMkLst>
-        </pc:spChg>
-        <pc:spChg chg="add">
-          <ac:chgData name="Martin Znamenáček" userId="33331470d373d797" providerId="Windows Live" clId="Web-{0C96E2EA-5096-4B4A-988B-F298539B8DAA}" dt="2024-11-25T23:10:15.794" v="513"/>
-          <ac:spMkLst>
-            <pc:docMk/>
-            <pc:sldMk cId="1956524294" sldId="279"/>
-            <ac:spMk id="5" creationId="{8E484127-DD9C-08DC-2EB4-24004FDC6F7C}"/>
-          </ac:spMkLst>
-        </pc:spChg>
       </pc:sldChg>
       <pc:sldChg chg="addSp delSp modSp add replId">
         <pc:chgData name="Martin Znamenáček" userId="33331470d373d797" providerId="Windows Live" clId="Web-{0C96E2EA-5096-4B4A-988B-F298539B8DAA}" dt="2024-11-26T00:22:48.584" v="886" actId="20577"/>
@@ -303,30 +190,6 @@
           <pc:docMk/>
           <pc:sldMk cId="2356481182" sldId="280"/>
         </pc:sldMkLst>
-        <pc:spChg chg="mod">
-          <ac:chgData name="Martin Znamenáček" userId="33331470d373d797" providerId="Windows Live" clId="Web-{0C96E2EA-5096-4B4A-988B-F298539B8DAA}" dt="2024-11-26T00:22:48.584" v="886" actId="20577"/>
-          <ac:spMkLst>
-            <pc:docMk/>
-            <pc:sldMk cId="2356481182" sldId="280"/>
-            <ac:spMk id="3" creationId="{6727F3E9-FD26-C2B8-789C-D06C94AD34BB}"/>
-          </ac:spMkLst>
-        </pc:spChg>
-        <pc:spChg chg="add">
-          <ac:chgData name="Martin Znamenáček" userId="33331470d373d797" providerId="Windows Live" clId="Web-{0C96E2EA-5096-4B4A-988B-F298539B8DAA}" dt="2024-11-25T23:10:19.123" v="514"/>
-          <ac:spMkLst>
-            <pc:docMk/>
-            <pc:sldMk cId="2356481182" sldId="280"/>
-            <ac:spMk id="5" creationId="{99B91B0E-5C99-36A8-F5C6-1EF9956E38C9}"/>
-          </ac:spMkLst>
-        </pc:spChg>
-        <pc:spChg chg="add del">
-          <ac:chgData name="Martin Znamenáček" userId="33331470d373d797" providerId="Windows Live" clId="Web-{0C96E2EA-5096-4B4A-988B-F298539B8DAA}" dt="2024-11-26T00:21:54.098" v="871"/>
-          <ac:spMkLst>
-            <pc:docMk/>
-            <pc:sldMk cId="2356481182" sldId="280"/>
-            <ac:spMk id="6" creationId="{EEE6524D-580F-F0F5-3E5A-3BF567BF3730}"/>
-          </ac:spMkLst>
-        </pc:spChg>
       </pc:sldChg>
       <pc:sldChg chg="addSp delSp modSp add replId">
         <pc:chgData name="Martin Znamenáček" userId="33331470d373d797" providerId="Windows Live" clId="Web-{0C96E2EA-5096-4B4A-988B-F298539B8DAA}" dt="2024-11-26T00:30:29.241" v="991" actId="20577"/>
@@ -334,30 +197,6 @@
           <pc:docMk/>
           <pc:sldMk cId="1065019830" sldId="281"/>
         </pc:sldMkLst>
-        <pc:spChg chg="add del mod">
-          <ac:chgData name="Martin Znamenáček" userId="33331470d373d797" providerId="Windows Live" clId="Web-{0C96E2EA-5096-4B4A-988B-F298539B8DAA}" dt="2024-11-26T00:30:29.241" v="991" actId="20577"/>
-          <ac:spMkLst>
-            <pc:docMk/>
-            <pc:sldMk cId="1065019830" sldId="281"/>
-            <ac:spMk id="3" creationId="{6727F3E9-FD26-C2B8-789C-D06C94AD34BB}"/>
-          </ac:spMkLst>
-        </pc:spChg>
-        <pc:spChg chg="add">
-          <ac:chgData name="Martin Znamenáček" userId="33331470d373d797" providerId="Windows Live" clId="Web-{0C96E2EA-5096-4B4A-988B-F298539B8DAA}" dt="2024-11-25T23:10:22.857" v="515"/>
-          <ac:spMkLst>
-            <pc:docMk/>
-            <pc:sldMk cId="1065019830" sldId="281"/>
-            <ac:spMk id="5" creationId="{475AFC8B-AD5D-BC09-AA9B-962DC6DB5DFD}"/>
-          </ac:spMkLst>
-        </pc:spChg>
-        <pc:spChg chg="add del mod">
-          <ac:chgData name="Martin Znamenáček" userId="33331470d373d797" providerId="Windows Live" clId="Web-{0C96E2EA-5096-4B4A-988B-F298539B8DAA}" dt="2024-11-26T00:23:30.195" v="922"/>
-          <ac:spMkLst>
-            <pc:docMk/>
-            <pc:sldMk cId="1065019830" sldId="281"/>
-            <ac:spMk id="6" creationId="{E5809C2C-4FB7-3EA5-DF59-A2405F594FA1}"/>
-          </ac:spMkLst>
-        </pc:spChg>
       </pc:sldChg>
     </pc:docChg>
   </pc:docChgLst>
@@ -394,6 +233,84 @@
     </pc:docChg>
   </pc:docChgLst>
   <pc:docChgLst>
+    <pc:chgData name="Jiří Zelenka" userId="df58f0fcc0f80eb2" providerId="LiveId" clId="{6052693A-B9B9-4EFB-96C3-6BAE2DB29B57}"/>
+    <pc:docChg chg="undo redo custSel modSld">
+      <pc:chgData name="Jiří Zelenka" userId="df58f0fcc0f80eb2" providerId="LiveId" clId="{6052693A-B9B9-4EFB-96C3-6BAE2DB29B57}" dt="2025-01-02T15:51:32.352" v="139" actId="113"/>
+      <pc:docMkLst>
+        <pc:docMk/>
+      </pc:docMkLst>
+      <pc:sldChg chg="modSp mod">
+        <pc:chgData name="Jiří Zelenka" userId="df58f0fcc0f80eb2" providerId="LiveId" clId="{6052693A-B9B9-4EFB-96C3-6BAE2DB29B57}" dt="2025-01-02T15:31:27.622" v="0" actId="14100"/>
+        <pc:sldMkLst>
+          <pc:docMk/>
+          <pc:sldMk cId="280015811" sldId="256"/>
+        </pc:sldMkLst>
+        <pc:spChg chg="mod">
+          <ac:chgData name="Jiří Zelenka" userId="df58f0fcc0f80eb2" providerId="LiveId" clId="{6052693A-B9B9-4EFB-96C3-6BAE2DB29B57}" dt="2025-01-02T15:31:27.622" v="0" actId="14100"/>
+          <ac:spMkLst>
+            <pc:docMk/>
+            <pc:sldMk cId="280015811" sldId="256"/>
+            <ac:spMk id="2" creationId="{F1C4D6DC-6895-30CD-6FC6-DA77A765ED95}"/>
+          </ac:spMkLst>
+        </pc:spChg>
+      </pc:sldChg>
+      <pc:sldChg chg="modSp mod">
+        <pc:chgData name="Jiří Zelenka" userId="df58f0fcc0f80eb2" providerId="LiveId" clId="{6052693A-B9B9-4EFB-96C3-6BAE2DB29B57}" dt="2025-01-02T15:33:31.879" v="21" actId="20577"/>
+        <pc:sldMkLst>
+          <pc:docMk/>
+          <pc:sldMk cId="1325151755" sldId="266"/>
+        </pc:sldMkLst>
+        <pc:spChg chg="mod">
+          <ac:chgData name="Jiří Zelenka" userId="df58f0fcc0f80eb2" providerId="LiveId" clId="{6052693A-B9B9-4EFB-96C3-6BAE2DB29B57}" dt="2025-01-02T15:33:31.879" v="21" actId="20577"/>
+          <ac:spMkLst>
+            <pc:docMk/>
+            <pc:sldMk cId="1325151755" sldId="266"/>
+            <ac:spMk id="3" creationId="{A96CE193-C4A3-E298-2B4A-8363E55C5F55}"/>
+          </ac:spMkLst>
+        </pc:spChg>
+      </pc:sldChg>
+      <pc:sldChg chg="addSp delSp modSp mod">
+        <pc:chgData name="Jiří Zelenka" userId="df58f0fcc0f80eb2" providerId="LiveId" clId="{6052693A-B9B9-4EFB-96C3-6BAE2DB29B57}" dt="2025-01-02T15:51:32.352" v="139" actId="113"/>
+        <pc:sldMkLst>
+          <pc:docMk/>
+          <pc:sldMk cId="685026519" sldId="271"/>
+        </pc:sldMkLst>
+        <pc:spChg chg="mod">
+          <ac:chgData name="Jiří Zelenka" userId="df58f0fcc0f80eb2" providerId="LiveId" clId="{6052693A-B9B9-4EFB-96C3-6BAE2DB29B57}" dt="2025-01-02T15:50:38.548" v="77"/>
+          <ac:spMkLst>
+            <pc:docMk/>
+            <pc:sldMk cId="685026519" sldId="271"/>
+            <ac:spMk id="2" creationId="{6D9E0067-F9C0-786F-4AF2-B6EBAC6F4442}"/>
+          </ac:spMkLst>
+        </pc:spChg>
+        <pc:spChg chg="mod">
+          <ac:chgData name="Jiří Zelenka" userId="df58f0fcc0f80eb2" providerId="LiveId" clId="{6052693A-B9B9-4EFB-96C3-6BAE2DB29B57}" dt="2025-01-02T15:51:32.352" v="139" actId="113"/>
+          <ac:spMkLst>
+            <pc:docMk/>
+            <pc:sldMk cId="685026519" sldId="271"/>
+            <ac:spMk id="3" creationId="{7E8617CE-ACEB-2466-5EAC-8E351ECEF538}"/>
+          </ac:spMkLst>
+        </pc:spChg>
+        <pc:spChg chg="add del mod">
+          <ac:chgData name="Jiří Zelenka" userId="df58f0fcc0f80eb2" providerId="LiveId" clId="{6052693A-B9B9-4EFB-96C3-6BAE2DB29B57}" dt="2025-01-02T15:33:04.029" v="15" actId="478"/>
+          <ac:spMkLst>
+            <pc:docMk/>
+            <pc:sldMk cId="685026519" sldId="271"/>
+            <ac:spMk id="9" creationId="{3CB3FD91-D7E2-7D90-C485-B99CBF77F336}"/>
+          </ac:spMkLst>
+        </pc:spChg>
+        <pc:picChg chg="add mod">
+          <ac:chgData name="Jiří Zelenka" userId="df58f0fcc0f80eb2" providerId="LiveId" clId="{6052693A-B9B9-4EFB-96C3-6BAE2DB29B57}" dt="2025-01-02T15:50:50.396" v="84" actId="1076"/>
+          <ac:picMkLst>
+            <pc:docMk/>
+            <pc:sldMk cId="685026519" sldId="271"/>
+            <ac:picMk id="11" creationId="{C0FF9E5D-9517-96AF-BBEF-3E34D72951E4}"/>
+          </ac:picMkLst>
+        </pc:picChg>
+      </pc:sldChg>
+    </pc:docChg>
+  </pc:docChgLst>
+  <pc:docChgLst>
     <pc:chgData name="Pavel Kubát" userId="cb58ac4f4d8ed8ae" providerId="Windows Live" clId="Web-{511E4F77-6934-46F3-8DF3-41DCA9EE5E6C}"/>
     <pc:docChg chg="addSld delSld modSld">
       <pc:chgData name="Pavel Kubát" userId="cb58ac4f4d8ed8ae" providerId="Windows Live" clId="Web-{511E4F77-6934-46F3-8DF3-41DCA9EE5E6C}" dt="2024-11-25T22:22:31.260" v="134" actId="20577"/>
@@ -406,29 +323,87 @@
           <pc:docMk/>
           <pc:sldMk cId="1781808586" sldId="257"/>
         </pc:sldMkLst>
+      </pc:sldChg>
+      <pc:sldChg chg="modSp new del">
+        <pc:chgData name="Pavel Kubát" userId="cb58ac4f4d8ed8ae" providerId="Windows Live" clId="Web-{511E4F77-6934-46F3-8DF3-41DCA9EE5E6C}" dt="2024-11-25T22:21:12.430" v="88"/>
+        <pc:sldMkLst>
+          <pc:docMk/>
+          <pc:sldMk cId="3777467812" sldId="278"/>
+        </pc:sldMkLst>
+      </pc:sldChg>
+    </pc:docChg>
+  </pc:docChgLst>
+  <pc:docChgLst>
+    <pc:chgData name="Matěj Foukal" userId="ec1f3edf691f6795" providerId="Windows Live" clId="Web-{9BA66848-4A8A-4BCE-9EB0-14D7E5B6EB46}"/>
+    <pc:docChg chg="addSld delSld modSld sldOrd">
+      <pc:chgData name="Matěj Foukal" userId="ec1f3edf691f6795" providerId="Windows Live" clId="Web-{9BA66848-4A8A-4BCE-9EB0-14D7E5B6EB46}" dt="2024-11-26T09:06:10" v="50"/>
+      <pc:docMkLst>
+        <pc:docMk/>
+      </pc:docMkLst>
+      <pc:sldChg chg="modSp">
+        <pc:chgData name="Matěj Foukal" userId="ec1f3edf691f6795" providerId="Windows Live" clId="Web-{9BA66848-4A8A-4BCE-9EB0-14D7E5B6EB46}" dt="2024-11-26T09:03:22.852" v="44" actId="20577"/>
+        <pc:sldMkLst>
+          <pc:docMk/>
+          <pc:sldMk cId="280015811" sldId="256"/>
+        </pc:sldMkLst>
         <pc:spChg chg="mod">
-          <ac:chgData name="Pavel Kubát" userId="cb58ac4f4d8ed8ae" providerId="Windows Live" clId="Web-{511E4F77-6934-46F3-8DF3-41DCA9EE5E6C}" dt="2024-11-25T22:22:31.260" v="134" actId="20577"/>
+          <ac:chgData name="Matěj Foukal" userId="ec1f3edf691f6795" providerId="Windows Live" clId="Web-{9BA66848-4A8A-4BCE-9EB0-14D7E5B6EB46}" dt="2024-11-26T09:03:22.852" v="44" actId="20577"/>
           <ac:spMkLst>
             <pc:docMk/>
-            <pc:sldMk cId="1781808586" sldId="257"/>
-            <ac:spMk id="3" creationId="{A8A01347-7020-7C97-9925-06225A0B8597}"/>
+            <pc:sldMk cId="280015811" sldId="256"/>
+            <ac:spMk id="2" creationId="{F1C4D6DC-6895-30CD-6FC6-DA77A765ED95}"/>
           </ac:spMkLst>
         </pc:spChg>
       </pc:sldChg>
-      <pc:sldChg chg="modSp new del">
-        <pc:chgData name="Pavel Kubát" userId="cb58ac4f4d8ed8ae" providerId="Windows Live" clId="Web-{511E4F77-6934-46F3-8DF3-41DCA9EE5E6C}" dt="2024-11-25T22:21:12.430" v="88"/>
-        <pc:sldMkLst>
-          <pc:docMk/>
-          <pc:sldMk cId="3777467812" sldId="278"/>
-        </pc:sldMkLst>
-        <pc:spChg chg="mod">
-          <ac:chgData name="Pavel Kubát" userId="cb58ac4f4d8ed8ae" providerId="Windows Live" clId="Web-{511E4F77-6934-46F3-8DF3-41DCA9EE5E6C}" dt="2024-11-25T22:21:07.429" v="87" actId="20577"/>
-          <ac:spMkLst>
+      <pc:sldChg chg="modSp">
+        <pc:chgData name="Matěj Foukal" userId="ec1f3edf691f6795" providerId="Windows Live" clId="Web-{9BA66848-4A8A-4BCE-9EB0-14D7E5B6EB46}" dt="2024-11-26T09:03:36.200" v="46" actId="1076"/>
+        <pc:sldMkLst>
+          <pc:docMk/>
+          <pc:sldMk cId="3967233716" sldId="263"/>
+        </pc:sldMkLst>
+      </pc:sldChg>
+      <pc:sldChg chg="delSp modSp">
+        <pc:chgData name="Matěj Foukal" userId="ec1f3edf691f6795" providerId="Windows Live" clId="Web-{9BA66848-4A8A-4BCE-9EB0-14D7E5B6EB46}" dt="2024-11-26T09:06:10" v="50"/>
+        <pc:sldMkLst>
+          <pc:docMk/>
+          <pc:sldMk cId="1231510720" sldId="264"/>
+        </pc:sldMkLst>
+        <pc:picChg chg="mod">
+          <ac:chgData name="Matěj Foukal" userId="ec1f3edf691f6795" providerId="Windows Live" clId="Web-{9BA66848-4A8A-4BCE-9EB0-14D7E5B6EB46}" dt="2024-11-26T09:05:10.185" v="47" actId="1076"/>
+          <ac:picMkLst>
             <pc:docMk/>
-            <pc:sldMk cId="3777467812" sldId="278"/>
-            <ac:spMk id="2" creationId="{AEEB80FC-EAC7-A589-76F8-436EAEDA4483}"/>
-          </ac:spMkLst>
-        </pc:spChg>
+            <pc:sldMk cId="1231510720" sldId="264"/>
+            <ac:picMk id="2" creationId="{03A776D3-8100-D3DC-0ADD-75331BEF22B4}"/>
+          </ac:picMkLst>
+        </pc:picChg>
+      </pc:sldChg>
+      <pc:sldChg chg="del">
+        <pc:chgData name="Matěj Foukal" userId="ec1f3edf691f6795" providerId="Windows Live" clId="Web-{9BA66848-4A8A-4BCE-9EB0-14D7E5B6EB46}" dt="2024-11-26T09:02:38.772" v="40"/>
+        <pc:sldMkLst>
+          <pc:docMk/>
+          <pc:sldMk cId="2135356783" sldId="266"/>
+        </pc:sldMkLst>
+      </pc:sldChg>
+      <pc:sldChg chg="del">
+        <pc:chgData name="Matěj Foukal" userId="ec1f3edf691f6795" providerId="Windows Live" clId="Web-{9BA66848-4A8A-4BCE-9EB0-14D7E5B6EB46}" dt="2024-11-26T09:02:38.772" v="39"/>
+        <pc:sldMkLst>
+          <pc:docMk/>
+          <pc:sldMk cId="2493402060" sldId="267"/>
+        </pc:sldMkLst>
+      </pc:sldChg>
+      <pc:sldChg chg="addSp delSp modSp add ord replId">
+        <pc:chgData name="Matěj Foukal" userId="ec1f3edf691f6795" providerId="Windows Live" clId="Web-{9BA66848-4A8A-4BCE-9EB0-14D7E5B6EB46}" dt="2024-11-26T09:02:32.913" v="38" actId="1076"/>
+        <pc:sldMkLst>
+          <pc:docMk/>
+          <pc:sldMk cId="1733626072" sldId="282"/>
+        </pc:sldMkLst>
+      </pc:sldChg>
+      <pc:sldChg chg="modSp add replId">
+        <pc:chgData name="Matěj Foukal" userId="ec1f3edf691f6795" providerId="Windows Live" clId="Web-{9BA66848-4A8A-4BCE-9EB0-14D7E5B6EB46}" dt="2024-11-26T09:01:42.051" v="21" actId="14100"/>
+        <pc:sldMkLst>
+          <pc:docMk/>
+          <pc:sldMk cId="1273820814" sldId="283"/>
+        </pc:sldMkLst>
       </pc:sldChg>
     </pc:docChg>
   </pc:docChgLst>
@@ -445,251 +420,150 @@
           <pc:docMk/>
           <pc:sldMk cId="959329316" sldId="276"/>
         </pc:sldMkLst>
-        <pc:spChg chg="del mod">
-          <ac:chgData name="Matěj Foukal" userId="ec1f3edf691f6795" providerId="Windows Live" clId="Web-{C04D09E0-5013-404E-9F07-03A66B3AD971}" dt="2024-11-25T21:13:45.481" v="36"/>
+      </pc:sldChg>
+      <pc:sldChg chg="addSp delSp modSp">
+        <pc:chgData name="Matěj Foukal" userId="ec1f3edf691f6795" providerId="Windows Live" clId="Web-{C04D09E0-5013-404E-9F07-03A66B3AD971}" dt="2024-11-25T21:13:37.341" v="33"/>
+        <pc:sldMkLst>
+          <pc:docMk/>
+          <pc:sldMk cId="4050476310" sldId="277"/>
+        </pc:sldMkLst>
+      </pc:sldChg>
+    </pc:docChg>
+  </pc:docChgLst>
+  <pc:docChgLst>
+    <pc:chgData name="Matěj Foukal" userId="ec1f3edf691f6795" providerId="Windows Live" clId="Web-{84FE6720-E279-4D86-A358-7CC0E3BEBAC1}"/>
+    <pc:docChg chg="modSld">
+      <pc:chgData name="Matěj Foukal" userId="ec1f3edf691f6795" providerId="Windows Live" clId="Web-{84FE6720-E279-4D86-A358-7CC0E3BEBAC1}" dt="2025-01-01T13:08:06.843" v="203" actId="1076"/>
+      <pc:docMkLst>
+        <pc:docMk/>
+      </pc:docMkLst>
+      <pc:sldChg chg="addSp delSp modSp">
+        <pc:chgData name="Matěj Foukal" userId="ec1f3edf691f6795" providerId="Windows Live" clId="Web-{84FE6720-E279-4D86-A358-7CC0E3BEBAC1}" dt="2025-01-01T13:08:06.843" v="203" actId="1076"/>
+        <pc:sldMkLst>
+          <pc:docMk/>
+          <pc:sldMk cId="3161377603" sldId="267"/>
+        </pc:sldMkLst>
+        <pc:spChg chg="mod">
+          <ac:chgData name="Matěj Foukal" userId="ec1f3edf691f6795" providerId="Windows Live" clId="Web-{84FE6720-E279-4D86-A358-7CC0E3BEBAC1}" dt="2025-01-01T12:49:36.655" v="15" actId="20577"/>
           <ac:spMkLst>
             <pc:docMk/>
-            <pc:sldMk cId="959329316" sldId="276"/>
-            <ac:spMk id="2" creationId="{44212C43-DB12-F0F1-50D0-52F487A78A47}"/>
+            <pc:sldMk cId="3161377603" sldId="267"/>
+            <ac:spMk id="2" creationId="{81E03990-7C90-BD65-6553-CB1AB42C6ED1}"/>
           </ac:spMkLst>
         </pc:spChg>
         <pc:spChg chg="add del mod">
-          <ac:chgData name="Matěj Foukal" userId="ec1f3edf691f6795" providerId="Windows Live" clId="Web-{C04D09E0-5013-404E-9F07-03A66B3AD971}" dt="2024-11-25T21:11:37.181" v="5"/>
+          <ac:chgData name="Matěj Foukal" userId="ec1f3edf691f6795" providerId="Windows Live" clId="Web-{84FE6720-E279-4D86-A358-7CC0E3BEBAC1}" dt="2025-01-01T13:07:47.654" v="202" actId="20577"/>
           <ac:spMkLst>
             <pc:docMk/>
-            <pc:sldMk cId="959329316" sldId="276"/>
-            <ac:spMk id="5" creationId="{FFBCA87C-5C3C-96DB-1018-528AA2A7C9C1}"/>
-          </ac:spMkLst>
-        </pc:spChg>
-        <pc:spChg chg="del mod">
-          <ac:chgData name="Matěj Foukal" userId="ec1f3edf691f6795" providerId="Windows Live" clId="Web-{C04D09E0-5013-404E-9F07-03A66B3AD971}" dt="2024-11-25T21:13:10.605" v="22"/>
-          <ac:spMkLst>
-            <pc:docMk/>
-            <pc:sldMk cId="959329316" sldId="276"/>
-            <ac:spMk id="8" creationId="{10754B95-F5EC-9695-4CCF-62FD203E66DE}"/>
+            <pc:sldMk cId="3161377603" sldId="267"/>
+            <ac:spMk id="3" creationId="{AB5B809E-FA80-65CD-9D41-29A068B11936}"/>
           </ac:spMkLst>
         </pc:spChg>
         <pc:spChg chg="add del mod">
-          <ac:chgData name="Matěj Foukal" userId="ec1f3edf691f6795" providerId="Windows Live" clId="Web-{C04D09E0-5013-404E-9F07-03A66B3AD971}" dt="2024-11-25T21:13:24.403" v="28"/>
+          <ac:chgData name="Matěj Foukal" userId="ec1f3edf691f6795" providerId="Windows Live" clId="Web-{84FE6720-E279-4D86-A358-7CC0E3BEBAC1}" dt="2025-01-01T13:05:34.289" v="151"/>
           <ac:spMkLst>
             <pc:docMk/>
-            <pc:sldMk cId="959329316" sldId="276"/>
-            <ac:spMk id="10" creationId="{4C4847A1-521B-2B74-0F88-DE2CA37A095C}"/>
+            <pc:sldMk cId="3161377603" sldId="267"/>
+            <ac:spMk id="12" creationId="{1B6863AC-883E-C2FF-3CBB-123CADDB9E7B}"/>
           </ac:spMkLst>
         </pc:spChg>
-        <pc:spChg chg="add del mod">
-          <ac:chgData name="Matěj Foukal" userId="ec1f3edf691f6795" providerId="Windows Live" clId="Web-{C04D09E0-5013-404E-9F07-03A66B3AD971}" dt="2024-11-25T21:13:55.138" v="41"/>
-          <ac:spMkLst>
-            <pc:docMk/>
-            <pc:sldMk cId="959329316" sldId="276"/>
-            <ac:spMk id="12" creationId="{0A203245-6B51-85E5-ABC8-EA543FBA2B47}"/>
-          </ac:spMkLst>
-        </pc:spChg>
-        <pc:picChg chg="del">
-          <ac:chgData name="Matěj Foukal" userId="ec1f3edf691f6795" providerId="Windows Live" clId="Web-{C04D09E0-5013-404E-9F07-03A66B3AD971}" dt="2024-11-25T21:10:51.304" v="0"/>
+        <pc:picChg chg="add del mod">
+          <ac:chgData name="Matěj Foukal" userId="ec1f3edf691f6795" providerId="Windows Live" clId="Web-{84FE6720-E279-4D86-A358-7CC0E3BEBAC1}" dt="2025-01-01T12:52:44.491" v="49"/>
           <ac:picMkLst>
             <pc:docMk/>
-            <pc:sldMk cId="959329316" sldId="276"/>
-            <ac:picMk id="4" creationId="{7D8B6D7B-340D-FAEC-9F92-6D5869EA55F8}"/>
+            <pc:sldMk cId="3161377603" sldId="267"/>
+            <ac:picMk id="8" creationId="{B2C9E988-7DA2-C890-4DDD-EF57B28E862F}"/>
           </ac:picMkLst>
         </pc:picChg>
-        <pc:picChg chg="add del mod ord">
-          <ac:chgData name="Matěj Foukal" userId="ec1f3edf691f6795" providerId="Windows Live" clId="Web-{C04D09E0-5013-404E-9F07-03A66B3AD971}" dt="2024-11-25T21:13:17.059" v="25"/>
+        <pc:picChg chg="add del mod">
+          <ac:chgData name="Matěj Foukal" userId="ec1f3edf691f6795" providerId="Windows Live" clId="Web-{84FE6720-E279-4D86-A358-7CC0E3BEBAC1}" dt="2025-01-01T12:53:52.713" v="53"/>
           <ac:picMkLst>
             <pc:docMk/>
-            <pc:sldMk cId="959329316" sldId="276"/>
-            <ac:picMk id="6" creationId="{DF65E527-C4BA-E86E-CF66-C5FB6A0DE95E}"/>
+            <pc:sldMk cId="3161377603" sldId="267"/>
+            <ac:picMk id="9" creationId="{9176104D-08CF-5D08-4440-1EB629A52928}"/>
           </ac:picMkLst>
         </pc:picChg>
         <pc:picChg chg="add mod">
-          <ac:chgData name="Matěj Foukal" userId="ec1f3edf691f6795" providerId="Windows Live" clId="Web-{C04D09E0-5013-404E-9F07-03A66B3AD971}" dt="2024-11-25T21:13:53.044" v="40" actId="1076"/>
+          <ac:chgData name="Matěj Foukal" userId="ec1f3edf691f6795" providerId="Windows Live" clId="Web-{84FE6720-E279-4D86-A358-7CC0E3BEBAC1}" dt="2025-01-01T13:08:06.843" v="203" actId="1076"/>
           <ac:picMkLst>
             <pc:docMk/>
-            <pc:sldMk cId="959329316" sldId="276"/>
-            <ac:picMk id="7" creationId="{214A0232-DBCA-1C84-07BF-E5751D2111D8}"/>
-          </ac:picMkLst>
-        </pc:picChg>
-      </pc:sldChg>
-      <pc:sldChg chg="addSp delSp modSp">
-        <pc:chgData name="Matěj Foukal" userId="ec1f3edf691f6795" providerId="Windows Live" clId="Web-{C04D09E0-5013-404E-9F07-03A66B3AD971}" dt="2024-11-25T21:13:37.341" v="33"/>
-        <pc:sldMkLst>
-          <pc:docMk/>
-          <pc:sldMk cId="4050476310" sldId="277"/>
-        </pc:sldMkLst>
-        <pc:picChg chg="add del mod">
-          <ac:chgData name="Matěj Foukal" userId="ec1f3edf691f6795" providerId="Windows Live" clId="Web-{C04D09E0-5013-404E-9F07-03A66B3AD971}" dt="2024-11-25T21:13:37.341" v="33"/>
-          <ac:picMkLst>
-            <pc:docMk/>
-            <pc:sldMk cId="4050476310" sldId="277"/>
-            <ac:picMk id="5" creationId="{CD25DE96-32F8-BB58-3646-78A68526A91A}"/>
+            <pc:sldMk cId="3161377603" sldId="267"/>
+            <ac:picMk id="10" creationId="{6751A2E9-842B-2416-5D90-5C0AFA9D01B5}"/>
           </ac:picMkLst>
         </pc:picChg>
       </pc:sldChg>
     </pc:docChg>
   </pc:docChgLst>
   <pc:docChgLst>
-    <pc:chgData name="Jiří Zelenka" userId="df58f0fcc0f80eb2" providerId="LiveId" clId="{87F64531-F3AA-4C5B-A219-4595BA46CF51}"/>
-    <pc:docChg chg="undo custSel modSld">
-      <pc:chgData name="Jiří Zelenka" userId="df58f0fcc0f80eb2" providerId="LiveId" clId="{87F64531-F3AA-4C5B-A219-4595BA46CF51}" dt="2024-11-25T11:55:22.438" v="432" actId="20577"/>
-      <pc:docMkLst>
-        <pc:docMk/>
-      </pc:docMkLst>
-      <pc:sldChg chg="addSp delSp modSp mod setBg modNotesTx">
-        <pc:chgData name="Jiří Zelenka" userId="df58f0fcc0f80eb2" providerId="LiveId" clId="{87F64531-F3AA-4C5B-A219-4595BA46CF51}" dt="2024-11-25T11:55:22.438" v="432" actId="20577"/>
-        <pc:sldMkLst>
-          <pc:docMk/>
-          <pc:sldMk cId="3967233716" sldId="263"/>
-        </pc:sldMkLst>
-        <pc:spChg chg="mod">
-          <ac:chgData name="Jiří Zelenka" userId="df58f0fcc0f80eb2" providerId="LiveId" clId="{87F64531-F3AA-4C5B-A219-4595BA46CF51}" dt="2024-11-25T11:53:53.126" v="144" actId="20577"/>
-          <ac:spMkLst>
-            <pc:docMk/>
-            <pc:sldMk cId="3967233716" sldId="263"/>
-            <ac:spMk id="2" creationId="{BCF3F78A-D62E-A79E-C1A9-B039165C5F6F}"/>
-          </ac:spMkLst>
-        </pc:spChg>
-        <pc:spChg chg="add del mod">
-          <ac:chgData name="Jiří Zelenka" userId="df58f0fcc0f80eb2" providerId="LiveId" clId="{87F64531-F3AA-4C5B-A219-4595BA46CF51}" dt="2024-11-25T11:49:41.709" v="24" actId="931"/>
-          <ac:spMkLst>
-            <pc:docMk/>
-            <pc:sldMk cId="3967233716" sldId="263"/>
-            <ac:spMk id="3" creationId="{CD5EEC73-68DF-E355-125D-D07277156DE7}"/>
-          </ac:spMkLst>
-        </pc:spChg>
-        <pc:spChg chg="add del">
-          <ac:chgData name="Jiří Zelenka" userId="df58f0fcc0f80eb2" providerId="LiveId" clId="{87F64531-F3AA-4C5B-A219-4595BA46CF51}" dt="2024-11-25T11:51:53.169" v="65" actId="26606"/>
-          <ac:spMkLst>
-            <pc:docMk/>
-            <pc:sldMk cId="3967233716" sldId="263"/>
-            <ac:spMk id="12" creationId="{D4771268-CB57-404A-9271-370EB28F6090}"/>
-          </ac:spMkLst>
-        </pc:spChg>
-        <pc:spChg chg="add del">
-          <ac:chgData name="Jiří Zelenka" userId="df58f0fcc0f80eb2" providerId="LiveId" clId="{87F64531-F3AA-4C5B-A219-4595BA46CF51}" dt="2024-11-25T11:51:55.365" v="69" actId="26606"/>
-          <ac:spMkLst>
-            <pc:docMk/>
-            <pc:sldMk cId="3967233716" sldId="263"/>
-            <ac:spMk id="16" creationId="{3A9A4357-BD1D-4622-A4FE-766E6AB8DE84}"/>
-          </ac:spMkLst>
-        </pc:spChg>
-        <pc:spChg chg="add del">
-          <ac:chgData name="Jiří Zelenka" userId="df58f0fcc0f80eb2" providerId="LiveId" clId="{87F64531-F3AA-4C5B-A219-4595BA46CF51}" dt="2024-11-25T11:51:55.365" v="69" actId="26606"/>
-          <ac:spMkLst>
-            <pc:docMk/>
-            <pc:sldMk cId="3967233716" sldId="263"/>
-            <ac:spMk id="17" creationId="{058A14AF-9FB5-4CC7-BA35-E8E85D3EDF0E}"/>
-          </ac:spMkLst>
-        </pc:spChg>
-        <pc:spChg chg="add del">
-          <ac:chgData name="Jiří Zelenka" userId="df58f0fcc0f80eb2" providerId="LiveId" clId="{87F64531-F3AA-4C5B-A219-4595BA46CF51}" dt="2024-11-25T11:51:55.365" v="69" actId="26606"/>
-          <ac:spMkLst>
-            <pc:docMk/>
-            <pc:sldMk cId="3967233716" sldId="263"/>
-            <ac:spMk id="18" creationId="{E659831F-0D9A-4C63-9EBB-8435B85A440F}"/>
-          </ac:spMkLst>
-        </pc:spChg>
-        <pc:spChg chg="add del">
-          <ac:chgData name="Jiří Zelenka" userId="df58f0fcc0f80eb2" providerId="LiveId" clId="{87F64531-F3AA-4C5B-A219-4595BA46CF51}" dt="2024-11-25T11:51:55.365" v="69" actId="26606"/>
-          <ac:spMkLst>
-            <pc:docMk/>
-            <pc:sldMk cId="3967233716" sldId="263"/>
-            <ac:spMk id="19" creationId="{617A0E4F-EA97-FD13-9F6A-53F77CF6602C}"/>
-          </ac:spMkLst>
-        </pc:spChg>
-        <pc:spChg chg="add del">
-          <ac:chgData name="Jiří Zelenka" userId="df58f0fcc0f80eb2" providerId="LiveId" clId="{87F64531-F3AA-4C5B-A219-4595BA46CF51}" dt="2024-11-25T11:51:55.365" v="69" actId="26606"/>
-          <ac:spMkLst>
-            <pc:docMk/>
-            <pc:sldMk cId="3967233716" sldId="263"/>
-            <ac:spMk id="20" creationId="{E6995CE5-F890-4ABA-82A2-26507CE8D2A3}"/>
-          </ac:spMkLst>
-        </pc:spChg>
-        <pc:picChg chg="add mod">
-          <ac:chgData name="Jiří Zelenka" userId="df58f0fcc0f80eb2" providerId="LiveId" clId="{87F64531-F3AA-4C5B-A219-4595BA46CF51}" dt="2024-11-25T11:49:30.793" v="23"/>
-          <ac:picMkLst>
-            <pc:docMk/>
-            <pc:sldMk cId="3967233716" sldId="263"/>
-            <ac:picMk id="5" creationId="{60828D0C-288C-0FAC-0AB3-CF645F812E1C}"/>
-          </ac:picMkLst>
-        </pc:picChg>
-        <pc:picChg chg="add mod">
-          <ac:chgData name="Jiří Zelenka" userId="df58f0fcc0f80eb2" providerId="LiveId" clId="{87F64531-F3AA-4C5B-A219-4595BA46CF51}" dt="2024-11-25T11:53:02.802" v="90" actId="1035"/>
-          <ac:picMkLst>
-            <pc:docMk/>
-            <pc:sldMk cId="3967233716" sldId="263"/>
-            <ac:picMk id="7" creationId="{F4920EE7-595D-7C74-12DA-FA3B3C56E336}"/>
-          </ac:picMkLst>
-        </pc:picChg>
-        <pc:picChg chg="add del mod">
-          <ac:chgData name="Jiří Zelenka" userId="df58f0fcc0f80eb2" providerId="LiveId" clId="{87F64531-F3AA-4C5B-A219-4595BA46CF51}" dt="2024-11-25T11:51:18.177" v="56" actId="478"/>
-          <ac:picMkLst>
-            <pc:docMk/>
-            <pc:sldMk cId="3967233716" sldId="263"/>
-            <ac:picMk id="9" creationId="{D1A2CA9A-9716-31CA-5837-170CE8D15E52}"/>
-          </ac:picMkLst>
-        </pc:picChg>
-        <pc:picChg chg="add del mod">
-          <ac:chgData name="Jiří Zelenka" userId="df58f0fcc0f80eb2" providerId="LiveId" clId="{87F64531-F3AA-4C5B-A219-4595BA46CF51}" dt="2024-11-25T11:51:16.805" v="55" actId="478"/>
-          <ac:picMkLst>
-            <pc:docMk/>
-            <pc:sldMk cId="3967233716" sldId="263"/>
-            <ac:picMk id="11" creationId="{E12B0952-9650-56F0-B62F-61CAF0053006}"/>
-          </ac:picMkLst>
-        </pc:picChg>
-        <pc:cxnChg chg="add del">
-          <ac:chgData name="Jiří Zelenka" userId="df58f0fcc0f80eb2" providerId="LiveId" clId="{87F64531-F3AA-4C5B-A219-4595BA46CF51}" dt="2024-11-25T11:51:54.277" v="67" actId="26606"/>
-          <ac:cxnSpMkLst>
-            <pc:docMk/>
-            <pc:sldMk cId="3967233716" sldId="263"/>
-            <ac:cxnSpMk id="14" creationId="{33193FD5-6A49-7562-EA76-F15D42E15804}"/>
-          </ac:cxnSpMkLst>
-        </pc:cxnChg>
-        <pc:cxnChg chg="add">
-          <ac:chgData name="Jiří Zelenka" userId="df58f0fcc0f80eb2" providerId="LiveId" clId="{87F64531-F3AA-4C5B-A219-4595BA46CF51}" dt="2024-11-25T11:51:55.369" v="70" actId="26606"/>
-          <ac:cxnSpMkLst>
-            <pc:docMk/>
-            <pc:sldMk cId="3967233716" sldId="263"/>
-            <ac:cxnSpMk id="22" creationId="{33193FD5-6A49-7562-EA76-F15D42E15804}"/>
-          </ac:cxnSpMkLst>
-        </pc:cxnChg>
-      </pc:sldChg>
-    </pc:docChg>
-  </pc:docChgLst>
-  <pc:docChgLst>
-    <pc:chgData name="Matěj Foukal" userId="ec1f3edf691f6795" providerId="Windows Live" clId="Web-{AA5EA451-8079-48CA-8C8F-7124EE364501}"/>
-    <pc:docChg chg="delSld modSld">
-      <pc:chgData name="Matěj Foukal" userId="ec1f3edf691f6795" providerId="Windows Live" clId="Web-{AA5EA451-8079-48CA-8C8F-7124EE364501}" dt="2024-11-26T11:05:50.733" v="19" actId="1076"/>
+    <pc:chgData name="Pavel Kubát" userId="cb58ac4f4d8ed8ae" providerId="Windows Live" clId="Web-{D918BDE8-D029-44FE-A222-E31BA3A9E85E}"/>
+    <pc:docChg chg="addSld modSld">
+      <pc:chgData name="Pavel Kubát" userId="cb58ac4f4d8ed8ae" providerId="Windows Live" clId="Web-{D918BDE8-D029-44FE-A222-E31BA3A9E85E}" dt="2024-11-26T11:07:00.959" v="98" actId="20577"/>
       <pc:docMkLst>
         <pc:docMk/>
       </pc:docMkLst>
       <pc:sldChg chg="modSp">
-        <pc:chgData name="Matěj Foukal" userId="ec1f3edf691f6795" providerId="Windows Live" clId="Web-{AA5EA451-8079-48CA-8C8F-7124EE364501}" dt="2024-11-26T11:05:50.733" v="19" actId="1076"/>
+        <pc:chgData name="Pavel Kubát" userId="cb58ac4f4d8ed8ae" providerId="Windows Live" clId="Web-{D918BDE8-D029-44FE-A222-E31BA3A9E85E}" dt="2024-11-26T11:06:51.177" v="89" actId="20577"/>
+        <pc:sldMkLst>
+          <pc:docMk/>
+          <pc:sldMk cId="1781808586" sldId="257"/>
+        </pc:sldMkLst>
+      </pc:sldChg>
+      <pc:sldChg chg="modSp new">
+        <pc:chgData name="Pavel Kubát" userId="cb58ac4f4d8ed8ae" providerId="Windows Live" clId="Web-{D918BDE8-D029-44FE-A222-E31BA3A9E85E}" dt="2024-11-26T11:05:09.138" v="26" actId="20577"/>
+        <pc:sldMkLst>
+          <pc:docMk/>
+          <pc:sldMk cId="3972246135" sldId="287"/>
+        </pc:sldMkLst>
+      </pc:sldChg>
+      <pc:sldChg chg="modSp new">
+        <pc:chgData name="Pavel Kubát" userId="cb58ac4f4d8ed8ae" providerId="Windows Live" clId="Web-{D918BDE8-D029-44FE-A222-E31BA3A9E85E}" dt="2024-11-26T11:06:31.832" v="83" actId="20577"/>
+        <pc:sldMkLst>
+          <pc:docMk/>
+          <pc:sldMk cId="575435518" sldId="288"/>
+        </pc:sldMkLst>
+      </pc:sldChg>
+      <pc:sldChg chg="modSp new">
+        <pc:chgData name="Pavel Kubát" userId="cb58ac4f4d8ed8ae" providerId="Windows Live" clId="Web-{D918BDE8-D029-44FE-A222-E31BA3A9E85E}" dt="2024-11-26T11:07:00.959" v="98" actId="20577"/>
+        <pc:sldMkLst>
+          <pc:docMk/>
+          <pc:sldMk cId="1973249726" sldId="289"/>
+        </pc:sldMkLst>
+      </pc:sldChg>
+    </pc:docChg>
+  </pc:docChgLst>
+  <pc:docChgLst>
+    <pc:chgData name="Daniel Meszaros" userId="1aba072b14a0f5d2" providerId="LiveId" clId="{FED47A89-C768-457A-8E2F-DC14D43A377D}"/>
+    <pc:docChg chg="undo custSel addSld modSld">
+      <pc:chgData name="Daniel Meszaros" userId="1aba072b14a0f5d2" providerId="LiveId" clId="{FED47A89-C768-457A-8E2F-DC14D43A377D}" dt="2024-11-25T17:48:28.298" v="163" actId="400"/>
+      <pc:docMkLst>
+        <pc:docMk/>
+      </pc:docMkLst>
+      <pc:sldChg chg="addSp delSp modSp mod">
+        <pc:chgData name="Daniel Meszaros" userId="1aba072b14a0f5d2" providerId="LiveId" clId="{FED47A89-C768-457A-8E2F-DC14D43A377D}" dt="2024-11-25T17:48:28.298" v="163" actId="400"/>
+        <pc:sldMkLst>
+          <pc:docMk/>
+          <pc:sldMk cId="613450863" sldId="261"/>
+        </pc:sldMkLst>
+      </pc:sldChg>
+      <pc:sldChg chg="modSp mod">
+        <pc:chgData name="Daniel Meszaros" userId="1aba072b14a0f5d2" providerId="LiveId" clId="{FED47A89-C768-457A-8E2F-DC14D43A377D}" dt="2024-11-25T17:46:39.417" v="139" actId="14100"/>
         <pc:sldMkLst>
           <pc:docMk/>
           <pc:sldMk cId="3192235045" sldId="265"/>
         </pc:sldMkLst>
-        <pc:spChg chg="mod">
-          <ac:chgData name="Matěj Foukal" userId="ec1f3edf691f6795" providerId="Windows Live" clId="Web-{AA5EA451-8079-48CA-8C8F-7124EE364501}" dt="2024-11-26T11:05:46.498" v="18" actId="20577"/>
-          <ac:spMkLst>
-            <pc:docMk/>
-            <pc:sldMk cId="3192235045" sldId="265"/>
-            <ac:spMk id="2" creationId="{BCF3F78A-D62E-A79E-C1A9-B039165C5F6F}"/>
-          </ac:spMkLst>
-        </pc:spChg>
-        <pc:picChg chg="mod">
-          <ac:chgData name="Matěj Foukal" userId="ec1f3edf691f6795" providerId="Windows Live" clId="Web-{AA5EA451-8079-48CA-8C8F-7124EE364501}" dt="2024-11-26T11:05:50.733" v="19" actId="1076"/>
-          <ac:picMkLst>
-            <pc:docMk/>
-            <pc:sldMk cId="3192235045" sldId="265"/>
-            <ac:picMk id="4" creationId="{8105C726-0FBF-BE6D-112B-87ECCEEB8FA6}"/>
-          </ac:picMkLst>
-        </pc:picChg>
-      </pc:sldChg>
-      <pc:sldChg chg="del">
-        <pc:chgData name="Matěj Foukal" userId="ec1f3edf691f6795" providerId="Windows Live" clId="Web-{AA5EA451-8079-48CA-8C8F-7124EE364501}" dt="2024-11-26T10:59:38.333" v="0"/>
-        <pc:sldMkLst>
-          <pc:docMk/>
-          <pc:sldMk cId="3524135438" sldId="271"/>
+      </pc:sldChg>
+      <pc:sldChg chg="addSp modSp new mod">
+        <pc:chgData name="Daniel Meszaros" userId="1aba072b14a0f5d2" providerId="LiveId" clId="{FED47A89-C768-457A-8E2F-DC14D43A377D}" dt="2024-11-25T17:47:40.974" v="154" actId="1076"/>
+        <pc:sldMkLst>
+          <pc:docMk/>
+          <pc:sldMk cId="2135356783" sldId="266"/>
+        </pc:sldMkLst>
+      </pc:sldChg>
+      <pc:sldChg chg="addSp modSp new mod">
+        <pc:chgData name="Daniel Meszaros" userId="1aba072b14a0f5d2" providerId="LiveId" clId="{FED47A89-C768-457A-8E2F-DC14D43A377D}" dt="2024-11-25T17:47:44.036" v="155" actId="1076"/>
+        <pc:sldMkLst>
+          <pc:docMk/>
+          <pc:sldMk cId="2493402060" sldId="267"/>
         </pc:sldMkLst>
       </pc:sldChg>
     </pc:docChg>
@@ -730,22 +604,6 @@
           <pc:docMk/>
           <pc:sldMk cId="1781808586" sldId="257"/>
         </pc:sldMkLst>
-        <pc:spChg chg="mod ord">
-          <ac:chgData name="Matěj Foukal" userId="ec1f3edf691f6795" providerId="Windows Live" clId="Web-{D6B47B1B-5F3D-4390-891D-DEC0C82BF11B}" dt="2024-11-25T21:08:37.254" v="31"/>
-          <ac:spMkLst>
-            <pc:docMk/>
-            <pc:sldMk cId="1781808586" sldId="257"/>
-            <ac:spMk id="2" creationId="{8C4CCB29-3600-C905-F028-D18CBFCC3C88}"/>
-          </ac:spMkLst>
-        </pc:spChg>
-        <pc:spChg chg="mod ord">
-          <ac:chgData name="Matěj Foukal" userId="ec1f3edf691f6795" providerId="Windows Live" clId="Web-{D6B47B1B-5F3D-4390-891D-DEC0C82BF11B}" dt="2024-11-25T21:08:37.254" v="31"/>
-          <ac:spMkLst>
-            <pc:docMk/>
-            <pc:sldMk cId="1781808586" sldId="257"/>
-            <ac:spMk id="3" creationId="{A8A01347-7020-7C97-9925-06225A0B8597}"/>
-          </ac:spMkLst>
-        </pc:spChg>
       </pc:sldChg>
       <pc:sldChg chg="modSp mod modClrScheme chgLayout">
         <pc:chgData name="Matěj Foukal" userId="ec1f3edf691f6795" providerId="Windows Live" clId="Web-{D6B47B1B-5F3D-4390-891D-DEC0C82BF11B}" dt="2024-11-25T21:08:37.254" v="31"/>
@@ -753,22 +611,6 @@
           <pc:docMk/>
           <pc:sldMk cId="3621262893" sldId="258"/>
         </pc:sldMkLst>
-        <pc:spChg chg="mod ord">
-          <ac:chgData name="Matěj Foukal" userId="ec1f3edf691f6795" providerId="Windows Live" clId="Web-{D6B47B1B-5F3D-4390-891D-DEC0C82BF11B}" dt="2024-11-25T21:08:37.254" v="31"/>
-          <ac:spMkLst>
-            <pc:docMk/>
-            <pc:sldMk cId="3621262893" sldId="258"/>
-            <ac:spMk id="2" creationId="{D51C919C-096B-C7CE-361E-C0998804E13E}"/>
-          </ac:spMkLst>
-        </pc:spChg>
-        <pc:spChg chg="mod ord">
-          <ac:chgData name="Matěj Foukal" userId="ec1f3edf691f6795" providerId="Windows Live" clId="Web-{D6B47B1B-5F3D-4390-891D-DEC0C82BF11B}" dt="2024-11-25T21:08:37.254" v="31"/>
-          <ac:spMkLst>
-            <pc:docMk/>
-            <pc:sldMk cId="3621262893" sldId="258"/>
-            <ac:spMk id="3" creationId="{D825998C-CA6C-3BE9-2798-05448B7CC072}"/>
-          </ac:spMkLst>
-        </pc:spChg>
       </pc:sldChg>
       <pc:sldChg chg="modSp mod modClrScheme chgLayout">
         <pc:chgData name="Matěj Foukal" userId="ec1f3edf691f6795" providerId="Windows Live" clId="Web-{D6B47B1B-5F3D-4390-891D-DEC0C82BF11B}" dt="2024-11-25T21:08:37.254" v="31"/>
@@ -776,22 +618,6 @@
           <pc:docMk/>
           <pc:sldMk cId="297826942" sldId="259"/>
         </pc:sldMkLst>
-        <pc:spChg chg="mod ord">
-          <ac:chgData name="Matěj Foukal" userId="ec1f3edf691f6795" providerId="Windows Live" clId="Web-{D6B47B1B-5F3D-4390-891D-DEC0C82BF11B}" dt="2024-11-25T21:08:37.254" v="31"/>
-          <ac:spMkLst>
-            <pc:docMk/>
-            <pc:sldMk cId="297826942" sldId="259"/>
-            <ac:spMk id="2" creationId="{4748FAE2-8698-0C0E-3A34-0FF240D402DF}"/>
-          </ac:spMkLst>
-        </pc:spChg>
-        <pc:spChg chg="mod ord">
-          <ac:chgData name="Matěj Foukal" userId="ec1f3edf691f6795" providerId="Windows Live" clId="Web-{D6B47B1B-5F3D-4390-891D-DEC0C82BF11B}" dt="2024-11-25T21:08:37.254" v="31"/>
-          <ac:spMkLst>
-            <pc:docMk/>
-            <pc:sldMk cId="297826942" sldId="259"/>
-            <ac:spMk id="3" creationId="{D488303E-288C-652B-FD3A-A8A593001CE1}"/>
-          </ac:spMkLst>
-        </pc:spChg>
       </pc:sldChg>
       <pc:sldChg chg="modSp mod modClrScheme chgLayout">
         <pc:chgData name="Matěj Foukal" userId="ec1f3edf691f6795" providerId="Windows Live" clId="Web-{D6B47B1B-5F3D-4390-891D-DEC0C82BF11B}" dt="2024-11-25T21:08:37.254" v="31"/>
@@ -799,22 +625,6 @@
           <pc:docMk/>
           <pc:sldMk cId="4287060232" sldId="260"/>
         </pc:sldMkLst>
-        <pc:spChg chg="mod ord">
-          <ac:chgData name="Matěj Foukal" userId="ec1f3edf691f6795" providerId="Windows Live" clId="Web-{D6B47B1B-5F3D-4390-891D-DEC0C82BF11B}" dt="2024-11-25T21:08:37.254" v="31"/>
-          <ac:spMkLst>
-            <pc:docMk/>
-            <pc:sldMk cId="4287060232" sldId="260"/>
-            <ac:spMk id="2" creationId="{4826B047-9CD3-700F-A48D-826654355DDB}"/>
-          </ac:spMkLst>
-        </pc:spChg>
-        <pc:spChg chg="mod ord">
-          <ac:chgData name="Matěj Foukal" userId="ec1f3edf691f6795" providerId="Windows Live" clId="Web-{D6B47B1B-5F3D-4390-891D-DEC0C82BF11B}" dt="2024-11-25T21:08:37.254" v="31"/>
-          <ac:spMkLst>
-            <pc:docMk/>
-            <pc:sldMk cId="4287060232" sldId="260"/>
-            <ac:spMk id="3" creationId="{6727F3E9-FD26-C2B8-789C-D06C94AD34BB}"/>
-          </ac:spMkLst>
-        </pc:spChg>
       </pc:sldChg>
       <pc:sldChg chg="modSp mod modClrScheme chgLayout">
         <pc:chgData name="Matěj Foukal" userId="ec1f3edf691f6795" providerId="Windows Live" clId="Web-{D6B47B1B-5F3D-4390-891D-DEC0C82BF11B}" dt="2024-11-25T21:08:37.254" v="31"/>
@@ -822,22 +632,6 @@
           <pc:docMk/>
           <pc:sldMk cId="613450863" sldId="261"/>
         </pc:sldMkLst>
-        <pc:spChg chg="mod ord">
-          <ac:chgData name="Matěj Foukal" userId="ec1f3edf691f6795" providerId="Windows Live" clId="Web-{D6B47B1B-5F3D-4390-891D-DEC0C82BF11B}" dt="2024-11-25T21:08:37.254" v="31"/>
-          <ac:spMkLst>
-            <pc:docMk/>
-            <pc:sldMk cId="613450863" sldId="261"/>
-            <ac:spMk id="2" creationId="{A7B6CFE7-03A6-00DB-34B3-210FA09B163C}"/>
-          </ac:spMkLst>
-        </pc:spChg>
-        <pc:spChg chg="mod ord">
-          <ac:chgData name="Matěj Foukal" userId="ec1f3edf691f6795" providerId="Windows Live" clId="Web-{D6B47B1B-5F3D-4390-891D-DEC0C82BF11B}" dt="2024-11-25T21:08:37.254" v="31"/>
-          <ac:spMkLst>
-            <pc:docMk/>
-            <pc:sldMk cId="613450863" sldId="261"/>
-            <ac:spMk id="3" creationId="{13889384-0C0D-1984-122D-8B1A68E41E03}"/>
-          </ac:spMkLst>
-        </pc:spChg>
       </pc:sldChg>
       <pc:sldChg chg="addSp delSp modSp mod modClrScheme delDesignElem chgLayout">
         <pc:chgData name="Matěj Foukal" userId="ec1f3edf691f6795" providerId="Windows Live" clId="Web-{D6B47B1B-5F3D-4390-891D-DEC0C82BF11B}" dt="2024-11-25T21:08:37.254" v="31"/>
@@ -845,30 +639,6 @@
           <pc:docMk/>
           <pc:sldMk cId="3967233716" sldId="263"/>
         </pc:sldMkLst>
-        <pc:spChg chg="mod ord">
-          <ac:chgData name="Matěj Foukal" userId="ec1f3edf691f6795" providerId="Windows Live" clId="Web-{D6B47B1B-5F3D-4390-891D-DEC0C82BF11B}" dt="2024-11-25T21:08:37.254" v="31"/>
-          <ac:spMkLst>
-            <pc:docMk/>
-            <pc:sldMk cId="3967233716" sldId="263"/>
-            <ac:spMk id="2" creationId="{BCF3F78A-D62E-A79E-C1A9-B039165C5F6F}"/>
-          </ac:spMkLst>
-        </pc:spChg>
-        <pc:picChg chg="mod ord">
-          <ac:chgData name="Matěj Foukal" userId="ec1f3edf691f6795" providerId="Windows Live" clId="Web-{D6B47B1B-5F3D-4390-891D-DEC0C82BF11B}" dt="2024-11-25T21:08:37.254" v="31"/>
-          <ac:picMkLst>
-            <pc:docMk/>
-            <pc:sldMk cId="3967233716" sldId="263"/>
-            <ac:picMk id="7" creationId="{F4920EE7-595D-7C74-12DA-FA3B3C56E336}"/>
-          </ac:picMkLst>
-        </pc:picChg>
-        <pc:cxnChg chg="add del">
-          <ac:chgData name="Matěj Foukal" userId="ec1f3edf691f6795" providerId="Windows Live" clId="Web-{D6B47B1B-5F3D-4390-891D-DEC0C82BF11B}" dt="2024-11-25T21:08:37.254" v="31"/>
-          <ac:cxnSpMkLst>
-            <pc:docMk/>
-            <pc:sldMk cId="3967233716" sldId="263"/>
-            <ac:cxnSpMk id="22" creationId="{33193FD5-6A49-7562-EA76-F15D42E15804}"/>
-          </ac:cxnSpMkLst>
-        </pc:cxnChg>
       </pc:sldChg>
       <pc:sldChg chg="addSp delSp modSp mod modClrScheme delDesignElem chgLayout">
         <pc:chgData name="Matěj Foukal" userId="ec1f3edf691f6795" providerId="Windows Live" clId="Web-{D6B47B1B-5F3D-4390-891D-DEC0C82BF11B}" dt="2024-11-25T21:08:37.254" v="31"/>
@@ -882,62 +652,6 @@
             <pc:docMk/>
             <pc:sldMk cId="1231510720" sldId="264"/>
             <ac:spMk id="4" creationId="{826E7F67-FBB2-0715-0336-190DE4473B6D}"/>
-          </ac:spMkLst>
-        </pc:spChg>
-        <pc:spChg chg="add del">
-          <ac:chgData name="Matěj Foukal" userId="ec1f3edf691f6795" providerId="Windows Live" clId="Web-{D6B47B1B-5F3D-4390-891D-DEC0C82BF11B}" dt="2024-11-25T21:08:37.254" v="31"/>
-          <ac:spMkLst>
-            <pc:docMk/>
-            <pc:sldMk cId="1231510720" sldId="264"/>
-            <ac:spMk id="9" creationId="{362D44EE-C852-4460-B8B5-C4F2BC20510C}"/>
-          </ac:spMkLst>
-        </pc:spChg>
-        <pc:spChg chg="add del">
-          <ac:chgData name="Matěj Foukal" userId="ec1f3edf691f6795" providerId="Windows Live" clId="Web-{D6B47B1B-5F3D-4390-891D-DEC0C82BF11B}" dt="2024-11-25T21:08:37.254" v="31"/>
-          <ac:spMkLst>
-            <pc:docMk/>
-            <pc:sldMk cId="1231510720" sldId="264"/>
-            <ac:spMk id="11" creationId="{658970D8-8D1D-4B5C-894B-E871CC86543D}"/>
-          </ac:spMkLst>
-        </pc:spChg>
-        <pc:spChg chg="add del">
-          <ac:chgData name="Matěj Foukal" userId="ec1f3edf691f6795" providerId="Windows Live" clId="Web-{D6B47B1B-5F3D-4390-891D-DEC0C82BF11B}" dt="2024-11-25T21:08:37.254" v="31"/>
-          <ac:spMkLst>
-            <pc:docMk/>
-            <pc:sldMk cId="1231510720" sldId="264"/>
-            <ac:spMk id="13" creationId="{F227E5B6-9132-43CA-B503-37A18562ADF2}"/>
-          </ac:spMkLst>
-        </pc:spChg>
-        <pc:spChg chg="add del">
-          <ac:chgData name="Matěj Foukal" userId="ec1f3edf691f6795" providerId="Windows Live" clId="Web-{D6B47B1B-5F3D-4390-891D-DEC0C82BF11B}" dt="2024-11-25T21:08:37.254" v="31"/>
-          <ac:spMkLst>
-            <pc:docMk/>
-            <pc:sldMk cId="1231510720" sldId="264"/>
-            <ac:spMk id="15" creationId="{03C2051E-A88D-48E5-BACF-AAED17892722}"/>
-          </ac:spMkLst>
-        </pc:spChg>
-        <pc:spChg chg="add del">
-          <ac:chgData name="Matěj Foukal" userId="ec1f3edf691f6795" providerId="Windows Live" clId="Web-{D6B47B1B-5F3D-4390-891D-DEC0C82BF11B}" dt="2024-11-25T21:08:37.254" v="31"/>
-          <ac:spMkLst>
-            <pc:docMk/>
-            <pc:sldMk cId="1231510720" sldId="264"/>
-            <ac:spMk id="17" creationId="{7821A508-2985-4905-874A-527429BAABFA}"/>
-          </ac:spMkLst>
-        </pc:spChg>
-        <pc:spChg chg="add del">
-          <ac:chgData name="Matěj Foukal" userId="ec1f3edf691f6795" providerId="Windows Live" clId="Web-{D6B47B1B-5F3D-4390-891D-DEC0C82BF11B}" dt="2024-11-25T21:08:37.254" v="31"/>
-          <ac:spMkLst>
-            <pc:docMk/>
-            <pc:sldMk cId="1231510720" sldId="264"/>
-            <ac:spMk id="19" creationId="{D2929CB1-0E3C-4B2D-ADC5-0154FB33BA44}"/>
-          </ac:spMkLst>
-        </pc:spChg>
-        <pc:spChg chg="add del">
-          <ac:chgData name="Matěj Foukal" userId="ec1f3edf691f6795" providerId="Windows Live" clId="Web-{D6B47B1B-5F3D-4390-891D-DEC0C82BF11B}" dt="2024-11-25T21:08:37.254" v="31"/>
-          <ac:spMkLst>
-            <pc:docMk/>
-            <pc:sldMk cId="1231510720" sldId="264"/>
-            <ac:spMk id="21" creationId="{5F2F0C84-BE8C-4DC2-A6D3-30349A801D5C}"/>
           </ac:spMkLst>
         </pc:spChg>
         <pc:picChg chg="add del mod modCrop">
@@ -948,30 +662,6 @@
             <ac:picMk id="2" creationId="{03A776D3-8100-D3DC-0ADD-75331BEF22B4}"/>
           </ac:picMkLst>
         </pc:picChg>
-        <pc:picChg chg="add del mod">
-          <ac:chgData name="Matěj Foukal" userId="ec1f3edf691f6795" providerId="Windows Live" clId="Web-{D6B47B1B-5F3D-4390-891D-DEC0C82BF11B}" dt="2024-11-25T21:01:29.850" v="1"/>
-          <ac:picMkLst>
-            <pc:docMk/>
-            <pc:sldMk cId="1231510720" sldId="264"/>
-            <ac:picMk id="5" creationId="{04CDAC5D-B271-302B-9EE1-3A258328D0D6}"/>
-          </ac:picMkLst>
-        </pc:picChg>
-        <pc:picChg chg="add del mod">
-          <ac:chgData name="Matěj Foukal" userId="ec1f3edf691f6795" providerId="Windows Live" clId="Web-{D6B47B1B-5F3D-4390-891D-DEC0C82BF11B}" dt="2024-11-25T21:02:13.585" v="17"/>
-          <ac:picMkLst>
-            <pc:docMk/>
-            <pc:sldMk cId="1231510720" sldId="264"/>
-            <ac:picMk id="6" creationId="{21F062B6-854D-AE94-A3D5-9B76F9CFA60C}"/>
-          </ac:picMkLst>
-        </pc:picChg>
-        <pc:picChg chg="add del mod">
-          <ac:chgData name="Matěj Foukal" userId="ec1f3edf691f6795" providerId="Windows Live" clId="Web-{D6B47B1B-5F3D-4390-891D-DEC0C82BF11B}" dt="2024-11-25T21:03:13.165" v="24"/>
-          <ac:picMkLst>
-            <pc:docMk/>
-            <pc:sldMk cId="1231510720" sldId="264"/>
-            <ac:picMk id="7" creationId="{87849E41-B73D-4AE3-4DB9-39071E505E74}"/>
-          </ac:picMkLst>
-        </pc:picChg>
       </pc:sldChg>
       <pc:sldChg chg="addSp delSp modSp mod modClrScheme delDesignElem chgLayout">
         <pc:chgData name="Matěj Foukal" userId="ec1f3edf691f6795" providerId="Windows Live" clId="Web-{D6B47B1B-5F3D-4390-891D-DEC0C82BF11B}" dt="2024-11-25T21:08:37.254" v="31"/>
@@ -979,22 +669,6 @@
           <pc:docMk/>
           <pc:sldMk cId="3192235045" sldId="265"/>
         </pc:sldMkLst>
-        <pc:spChg chg="mod ord">
-          <ac:chgData name="Matěj Foukal" userId="ec1f3edf691f6795" providerId="Windows Live" clId="Web-{D6B47B1B-5F3D-4390-891D-DEC0C82BF11B}" dt="2024-11-25T21:08:37.254" v="31"/>
-          <ac:spMkLst>
-            <pc:docMk/>
-            <pc:sldMk cId="3192235045" sldId="265"/>
-            <ac:spMk id="2" creationId="{BCF3F78A-D62E-A79E-C1A9-B039165C5F6F}"/>
-          </ac:spMkLst>
-        </pc:spChg>
-        <pc:cxnChg chg="add del">
-          <ac:chgData name="Matěj Foukal" userId="ec1f3edf691f6795" providerId="Windows Live" clId="Web-{D6B47B1B-5F3D-4390-891D-DEC0C82BF11B}" dt="2024-11-25T21:08:37.254" v="31"/>
-          <ac:cxnSpMkLst>
-            <pc:docMk/>
-            <pc:sldMk cId="3192235045" sldId="265"/>
-            <ac:cxnSpMk id="22" creationId="{33193FD5-6A49-7562-EA76-F15D42E15804}"/>
-          </ac:cxnSpMkLst>
-        </pc:cxnChg>
       </pc:sldChg>
       <pc:sldChg chg="mod modClrScheme chgLayout">
         <pc:chgData name="Matěj Foukal" userId="ec1f3edf691f6795" providerId="Windows Live" clId="Web-{D6B47B1B-5F3D-4390-891D-DEC0C82BF11B}" dt="2024-11-25T21:08:37.254" v="31"/>
@@ -1016,22 +690,6 @@
           <pc:docMk/>
           <pc:sldMk cId="2570008656" sldId="268"/>
         </pc:sldMkLst>
-        <pc:spChg chg="mod ord">
-          <ac:chgData name="Matěj Foukal" userId="ec1f3edf691f6795" providerId="Windows Live" clId="Web-{D6B47B1B-5F3D-4390-891D-DEC0C82BF11B}" dt="2024-11-25T21:08:37.254" v="31"/>
-          <ac:spMkLst>
-            <pc:docMk/>
-            <pc:sldMk cId="2570008656" sldId="268"/>
-            <ac:spMk id="2" creationId="{D14317BD-BB01-5DEA-766D-C3B8DA00A393}"/>
-          </ac:spMkLst>
-        </pc:spChg>
-        <pc:spChg chg="mod ord">
-          <ac:chgData name="Matěj Foukal" userId="ec1f3edf691f6795" providerId="Windows Live" clId="Web-{D6B47B1B-5F3D-4390-891D-DEC0C82BF11B}" dt="2024-11-25T21:08:37.254" v="31"/>
-          <ac:spMkLst>
-            <pc:docMk/>
-            <pc:sldMk cId="2570008656" sldId="268"/>
-            <ac:spMk id="3" creationId="{DF890C83-B701-7C39-363E-EE3C4AA10EB8}"/>
-          </ac:spMkLst>
-        </pc:spChg>
       </pc:sldChg>
       <pc:sldChg chg="modSp mod modClrScheme chgLayout">
         <pc:chgData name="Matěj Foukal" userId="ec1f3edf691f6795" providerId="Windows Live" clId="Web-{D6B47B1B-5F3D-4390-891D-DEC0C82BF11B}" dt="2024-11-25T21:08:37.254" v="31"/>
@@ -1039,22 +697,6 @@
           <pc:docMk/>
           <pc:sldMk cId="393156591" sldId="269"/>
         </pc:sldMkLst>
-        <pc:spChg chg="mod ord">
-          <ac:chgData name="Matěj Foukal" userId="ec1f3edf691f6795" providerId="Windows Live" clId="Web-{D6B47B1B-5F3D-4390-891D-DEC0C82BF11B}" dt="2024-11-25T21:08:37.254" v="31"/>
-          <ac:spMkLst>
-            <pc:docMk/>
-            <pc:sldMk cId="393156591" sldId="269"/>
-            <ac:spMk id="2" creationId="{F9DCE38E-9E5B-5363-6CE8-763A4D3E1590}"/>
-          </ac:spMkLst>
-        </pc:spChg>
-        <pc:spChg chg="mod ord">
-          <ac:chgData name="Matěj Foukal" userId="ec1f3edf691f6795" providerId="Windows Live" clId="Web-{D6B47B1B-5F3D-4390-891D-DEC0C82BF11B}" dt="2024-11-25T21:08:37.254" v="31"/>
-          <ac:spMkLst>
-            <pc:docMk/>
-            <pc:sldMk cId="393156591" sldId="269"/>
-            <ac:spMk id="3" creationId="{FE317941-97C8-E8DF-7EED-7C19C9A6F6A6}"/>
-          </ac:spMkLst>
-        </pc:spChg>
       </pc:sldChg>
       <pc:sldChg chg="modSp mod modClrScheme chgLayout">
         <pc:chgData name="Matěj Foukal" userId="ec1f3edf691f6795" providerId="Windows Live" clId="Web-{D6B47B1B-5F3D-4390-891D-DEC0C82BF11B}" dt="2024-11-25T21:08:37.254" v="31"/>
@@ -1062,22 +704,6 @@
           <pc:docMk/>
           <pc:sldMk cId="2149822024" sldId="270"/>
         </pc:sldMkLst>
-        <pc:spChg chg="mod ord">
-          <ac:chgData name="Matěj Foukal" userId="ec1f3edf691f6795" providerId="Windows Live" clId="Web-{D6B47B1B-5F3D-4390-891D-DEC0C82BF11B}" dt="2024-11-25T21:08:37.254" v="31"/>
-          <ac:spMkLst>
-            <pc:docMk/>
-            <pc:sldMk cId="2149822024" sldId="270"/>
-            <ac:spMk id="2" creationId="{D14317BD-BB01-5DEA-766D-C3B8DA00A393}"/>
-          </ac:spMkLst>
-        </pc:spChg>
-        <pc:spChg chg="mod ord">
-          <ac:chgData name="Matěj Foukal" userId="ec1f3edf691f6795" providerId="Windows Live" clId="Web-{D6B47B1B-5F3D-4390-891D-DEC0C82BF11B}" dt="2024-11-25T21:08:37.254" v="31"/>
-          <ac:spMkLst>
-            <pc:docMk/>
-            <pc:sldMk cId="2149822024" sldId="270"/>
-            <ac:spMk id="3" creationId="{DF890C83-B701-7C39-363E-EE3C4AA10EB8}"/>
-          </ac:spMkLst>
-        </pc:spChg>
       </pc:sldChg>
       <pc:sldChg chg="modSp mod modClrScheme chgLayout">
         <pc:chgData name="Matěj Foukal" userId="ec1f3edf691f6795" providerId="Windows Live" clId="Web-{D6B47B1B-5F3D-4390-891D-DEC0C82BF11B}" dt="2024-11-25T21:08:37.254" v="31"/>
@@ -1085,22 +711,6 @@
           <pc:docMk/>
           <pc:sldMk cId="3524135438" sldId="271"/>
         </pc:sldMkLst>
-        <pc:spChg chg="mod ord">
-          <ac:chgData name="Matěj Foukal" userId="ec1f3edf691f6795" providerId="Windows Live" clId="Web-{D6B47B1B-5F3D-4390-891D-DEC0C82BF11B}" dt="2024-11-25T21:08:37.254" v="31"/>
-          <ac:spMkLst>
-            <pc:docMk/>
-            <pc:sldMk cId="3524135438" sldId="271"/>
-            <ac:spMk id="2" creationId="{D14317BD-BB01-5DEA-766D-C3B8DA00A393}"/>
-          </ac:spMkLst>
-        </pc:spChg>
-        <pc:spChg chg="mod ord">
-          <ac:chgData name="Matěj Foukal" userId="ec1f3edf691f6795" providerId="Windows Live" clId="Web-{D6B47B1B-5F3D-4390-891D-DEC0C82BF11B}" dt="2024-11-25T21:08:37.254" v="31"/>
-          <ac:spMkLst>
-            <pc:docMk/>
-            <pc:sldMk cId="3524135438" sldId="271"/>
-            <ac:spMk id="3" creationId="{DF890C83-B701-7C39-363E-EE3C4AA10EB8}"/>
-          </ac:spMkLst>
-        </pc:spChg>
       </pc:sldChg>
       <pc:sldChg chg="modSp mod modClrScheme chgLayout">
         <pc:chgData name="Matěj Foukal" userId="ec1f3edf691f6795" providerId="Windows Live" clId="Web-{D6B47B1B-5F3D-4390-891D-DEC0C82BF11B}" dt="2024-11-25T21:08:37.254" v="31"/>
@@ -1108,22 +718,6 @@
           <pc:docMk/>
           <pc:sldMk cId="3718496977" sldId="272"/>
         </pc:sldMkLst>
-        <pc:spChg chg="mod ord">
-          <ac:chgData name="Matěj Foukal" userId="ec1f3edf691f6795" providerId="Windows Live" clId="Web-{D6B47B1B-5F3D-4390-891D-DEC0C82BF11B}" dt="2024-11-25T21:08:37.254" v="31"/>
-          <ac:spMkLst>
-            <pc:docMk/>
-            <pc:sldMk cId="3718496977" sldId="272"/>
-            <ac:spMk id="2" creationId="{D14317BD-BB01-5DEA-766D-C3B8DA00A393}"/>
-          </ac:spMkLst>
-        </pc:spChg>
-        <pc:spChg chg="mod ord">
-          <ac:chgData name="Matěj Foukal" userId="ec1f3edf691f6795" providerId="Windows Live" clId="Web-{D6B47B1B-5F3D-4390-891D-DEC0C82BF11B}" dt="2024-11-25T21:08:37.254" v="31"/>
-          <ac:spMkLst>
-            <pc:docMk/>
-            <pc:sldMk cId="3718496977" sldId="272"/>
-            <ac:spMk id="3" creationId="{DF890C83-B701-7C39-363E-EE3C4AA10EB8}"/>
-          </ac:spMkLst>
-        </pc:spChg>
       </pc:sldChg>
       <pc:sldChg chg="modSp mod modClrScheme chgLayout">
         <pc:chgData name="Matěj Foukal" userId="ec1f3edf691f6795" providerId="Windows Live" clId="Web-{D6B47B1B-5F3D-4390-891D-DEC0C82BF11B}" dt="2024-11-25T21:08:37.254" v="31"/>
@@ -1131,22 +725,6 @@
           <pc:docMk/>
           <pc:sldMk cId="1142221253" sldId="273"/>
         </pc:sldMkLst>
-        <pc:spChg chg="mod ord">
-          <ac:chgData name="Matěj Foukal" userId="ec1f3edf691f6795" providerId="Windows Live" clId="Web-{D6B47B1B-5F3D-4390-891D-DEC0C82BF11B}" dt="2024-11-25T21:08:37.254" v="31"/>
-          <ac:spMkLst>
-            <pc:docMk/>
-            <pc:sldMk cId="1142221253" sldId="273"/>
-            <ac:spMk id="2" creationId="{D14317BD-BB01-5DEA-766D-C3B8DA00A393}"/>
-          </ac:spMkLst>
-        </pc:spChg>
-        <pc:spChg chg="mod ord">
-          <ac:chgData name="Matěj Foukal" userId="ec1f3edf691f6795" providerId="Windows Live" clId="Web-{D6B47B1B-5F3D-4390-891D-DEC0C82BF11B}" dt="2024-11-25T21:08:37.254" v="31"/>
-          <ac:spMkLst>
-            <pc:docMk/>
-            <pc:sldMk cId="1142221253" sldId="273"/>
-            <ac:spMk id="3" creationId="{DF890C83-B701-7C39-363E-EE3C4AA10EB8}"/>
-          </ac:spMkLst>
-        </pc:spChg>
       </pc:sldChg>
       <pc:sldChg chg="modSp mod modClrScheme chgLayout">
         <pc:chgData name="Matěj Foukal" userId="ec1f3edf691f6795" providerId="Windows Live" clId="Web-{D6B47B1B-5F3D-4390-891D-DEC0C82BF11B}" dt="2024-11-25T21:08:37.254" v="31"/>
@@ -1154,22 +732,6 @@
           <pc:docMk/>
           <pc:sldMk cId="134548107" sldId="274"/>
         </pc:sldMkLst>
-        <pc:spChg chg="mod ord">
-          <ac:chgData name="Matěj Foukal" userId="ec1f3edf691f6795" providerId="Windows Live" clId="Web-{D6B47B1B-5F3D-4390-891D-DEC0C82BF11B}" dt="2024-11-25T21:08:37.254" v="31"/>
-          <ac:spMkLst>
-            <pc:docMk/>
-            <pc:sldMk cId="134548107" sldId="274"/>
-            <ac:spMk id="2" creationId="{D14317BD-BB01-5DEA-766D-C3B8DA00A393}"/>
-          </ac:spMkLst>
-        </pc:spChg>
-        <pc:spChg chg="mod ord">
-          <ac:chgData name="Matěj Foukal" userId="ec1f3edf691f6795" providerId="Windows Live" clId="Web-{D6B47B1B-5F3D-4390-891D-DEC0C82BF11B}" dt="2024-11-25T21:08:37.254" v="31"/>
-          <ac:spMkLst>
-            <pc:docMk/>
-            <pc:sldMk cId="134548107" sldId="274"/>
-            <ac:spMk id="3" creationId="{DF890C83-B701-7C39-363E-EE3C4AA10EB8}"/>
-          </ac:spMkLst>
-        </pc:spChg>
       </pc:sldChg>
       <pc:sldChg chg="modSp mod modClrScheme chgLayout">
         <pc:chgData name="Matěj Foukal" userId="ec1f3edf691f6795" providerId="Windows Live" clId="Web-{D6B47B1B-5F3D-4390-891D-DEC0C82BF11B}" dt="2024-11-25T21:08:37.254" v="31"/>
@@ -1177,22 +739,6 @@
           <pc:docMk/>
           <pc:sldMk cId="4133623028" sldId="275"/>
         </pc:sldMkLst>
-        <pc:spChg chg="mod ord">
-          <ac:chgData name="Matěj Foukal" userId="ec1f3edf691f6795" providerId="Windows Live" clId="Web-{D6B47B1B-5F3D-4390-891D-DEC0C82BF11B}" dt="2024-11-25T21:08:37.254" v="31"/>
-          <ac:spMkLst>
-            <pc:docMk/>
-            <pc:sldMk cId="4133623028" sldId="275"/>
-            <ac:spMk id="2" creationId="{D14317BD-BB01-5DEA-766D-C3B8DA00A393}"/>
-          </ac:spMkLst>
-        </pc:spChg>
-        <pc:spChg chg="mod ord">
-          <ac:chgData name="Matěj Foukal" userId="ec1f3edf691f6795" providerId="Windows Live" clId="Web-{D6B47B1B-5F3D-4390-891D-DEC0C82BF11B}" dt="2024-11-25T21:08:37.254" v="31"/>
-          <ac:spMkLst>
-            <pc:docMk/>
-            <pc:sldMk cId="4133623028" sldId="275"/>
-            <ac:spMk id="3" creationId="{DF890C83-B701-7C39-363E-EE3C4AA10EB8}"/>
-          </ac:spMkLst>
-        </pc:spChg>
       </pc:sldChg>
       <pc:sldChg chg="modSp mod modClrScheme chgLayout">
         <pc:chgData name="Matěj Foukal" userId="ec1f3edf691f6795" providerId="Windows Live" clId="Web-{D6B47B1B-5F3D-4390-891D-DEC0C82BF11B}" dt="2024-11-25T21:08:37.254" v="31"/>
@@ -1200,22 +746,6 @@
           <pc:docMk/>
           <pc:sldMk cId="959329316" sldId="276"/>
         </pc:sldMkLst>
-        <pc:spChg chg="mod ord">
-          <ac:chgData name="Matěj Foukal" userId="ec1f3edf691f6795" providerId="Windows Live" clId="Web-{D6B47B1B-5F3D-4390-891D-DEC0C82BF11B}" dt="2024-11-25T21:08:37.254" v="31"/>
-          <ac:spMkLst>
-            <pc:docMk/>
-            <pc:sldMk cId="959329316" sldId="276"/>
-            <ac:spMk id="2" creationId="{44212C43-DB12-F0F1-50D0-52F487A78A47}"/>
-          </ac:spMkLst>
-        </pc:spChg>
-        <pc:picChg chg="mod ord">
-          <ac:chgData name="Matěj Foukal" userId="ec1f3edf691f6795" providerId="Windows Live" clId="Web-{D6B47B1B-5F3D-4390-891D-DEC0C82BF11B}" dt="2024-11-25T21:08:37.254" v="31"/>
-          <ac:picMkLst>
-            <pc:docMk/>
-            <pc:sldMk cId="959329316" sldId="276"/>
-            <ac:picMk id="4" creationId="{7D8B6D7B-340D-FAEC-9F92-6D5869EA55F8}"/>
-          </ac:picMkLst>
-        </pc:picChg>
       </pc:sldChg>
       <pc:sldChg chg="modSp mod modClrScheme chgLayout">
         <pc:chgData name="Matěj Foukal" userId="ec1f3edf691f6795" providerId="Windows Live" clId="Web-{D6B47B1B-5F3D-4390-891D-DEC0C82BF11B}" dt="2024-11-25T21:08:37.254" v="31"/>
@@ -1223,14 +753,6 @@
           <pc:docMk/>
           <pc:sldMk cId="4050476310" sldId="277"/>
         </pc:sldMkLst>
-        <pc:spChg chg="mod ord">
-          <ac:chgData name="Matěj Foukal" userId="ec1f3edf691f6795" providerId="Windows Live" clId="Web-{D6B47B1B-5F3D-4390-891D-DEC0C82BF11B}" dt="2024-11-25T21:08:37.254" v="31"/>
-          <ac:spMkLst>
-            <pc:docMk/>
-            <pc:sldMk cId="4050476310" sldId="277"/>
-            <ac:spMk id="2" creationId="{BC2FA32E-6E40-06FB-6823-212775041441}"/>
-          </ac:spMkLst>
-        </pc:spChg>
       </pc:sldChg>
       <pc:sldMasterChg chg="add del addSldLayout delSldLayout">
         <pc:chgData name="Matěj Foukal" userId="ec1f3edf691f6795" providerId="Windows Live" clId="Web-{D6B47B1B-5F3D-4390-891D-DEC0C82BF11B}" dt="2024-11-25T21:08:37.254" v="31"/>
@@ -1520,58 +1042,205 @@
     </pc:docChg>
   </pc:docChgLst>
   <pc:docChgLst>
-    <pc:chgData name="Matěj Foukal" userId="ec1f3edf691f6795" providerId="Windows Live" clId="Web-{9BA66848-4A8A-4BCE-9EB0-14D7E5B6EB46}"/>
-    <pc:docChg chg="addSld delSld modSld sldOrd">
-      <pc:chgData name="Matěj Foukal" userId="ec1f3edf691f6795" providerId="Windows Live" clId="Web-{9BA66848-4A8A-4BCE-9EB0-14D7E5B6EB46}" dt="2024-11-26T09:06:10" v="50"/>
+    <pc:chgData name="Jiří Zelenka" userId="df58f0fcc0f80eb2" providerId="LiveId" clId="{0DEDA3C8-6D0F-465E-BF39-CB7B153DACAD}"/>
+    <pc:docChg chg="undo redo custSel addSld delSld modSld sldOrd">
+      <pc:chgData name="Jiří Zelenka" userId="df58f0fcc0f80eb2" providerId="LiveId" clId="{0DEDA3C8-6D0F-465E-BF39-CB7B153DACAD}" dt="2024-11-26T11:08:36.823" v="905" actId="2696"/>
       <pc:docMkLst>
         <pc:docMk/>
       </pc:docMkLst>
-      <pc:sldChg chg="modSp">
-        <pc:chgData name="Matěj Foukal" userId="ec1f3edf691f6795" providerId="Windows Live" clId="Web-{9BA66848-4A8A-4BCE-9EB0-14D7E5B6EB46}" dt="2024-11-26T09:03:22.852" v="44" actId="20577"/>
+      <pc:sldChg chg="modSp new mod">
+        <pc:chgData name="Jiří Zelenka" userId="df58f0fcc0f80eb2" providerId="LiveId" clId="{0DEDA3C8-6D0F-465E-BF39-CB7B153DACAD}" dt="2024-11-19T15:11:00.543" v="145" actId="20577"/>
         <pc:sldMkLst>
           <pc:docMk/>
           <pc:sldMk cId="280015811" sldId="256"/>
         </pc:sldMkLst>
         <pc:spChg chg="mod">
-          <ac:chgData name="Matěj Foukal" userId="ec1f3edf691f6795" providerId="Windows Live" clId="Web-{9BA66848-4A8A-4BCE-9EB0-14D7E5B6EB46}" dt="2024-11-26T09:03:22.852" v="44" actId="20577"/>
+          <ac:chgData name="Jiří Zelenka" userId="df58f0fcc0f80eb2" providerId="LiveId" clId="{0DEDA3C8-6D0F-465E-BF39-CB7B153DACAD}" dt="2024-11-19T15:04:55.084" v="25" actId="20577"/>
           <ac:spMkLst>
             <pc:docMk/>
             <pc:sldMk cId="280015811" sldId="256"/>
             <ac:spMk id="2" creationId="{F1C4D6DC-6895-30CD-6FC6-DA77A765ED95}"/>
           </ac:spMkLst>
         </pc:spChg>
-      </pc:sldChg>
-      <pc:sldChg chg="modSp">
-        <pc:chgData name="Matěj Foukal" userId="ec1f3edf691f6795" providerId="Windows Live" clId="Web-{9BA66848-4A8A-4BCE-9EB0-14D7E5B6EB46}" dt="2024-11-26T09:03:36.200" v="46" actId="1076"/>
+        <pc:spChg chg="mod">
+          <ac:chgData name="Jiří Zelenka" userId="df58f0fcc0f80eb2" providerId="LiveId" clId="{0DEDA3C8-6D0F-465E-BF39-CB7B153DACAD}" dt="2024-11-19T15:11:00.543" v="145" actId="20577"/>
+          <ac:spMkLst>
+            <pc:docMk/>
+            <pc:sldMk cId="280015811" sldId="256"/>
+            <ac:spMk id="3" creationId="{52473F9E-28A4-D0E5-874D-CB359B712A41}"/>
+          </ac:spMkLst>
+        </pc:spChg>
+      </pc:sldChg>
+      <pc:sldChg chg="modSp new mod">
+        <pc:chgData name="Jiří Zelenka" userId="df58f0fcc0f80eb2" providerId="LiveId" clId="{0DEDA3C8-6D0F-465E-BF39-CB7B153DACAD}" dt="2024-11-19T15:30:50.608" v="578" actId="20577"/>
+        <pc:sldMkLst>
+          <pc:docMk/>
+          <pc:sldMk cId="1781808586" sldId="257"/>
+        </pc:sldMkLst>
+      </pc:sldChg>
+      <pc:sldChg chg="modSp new mod">
+        <pc:chgData name="Jiří Zelenka" userId="df58f0fcc0f80eb2" providerId="LiveId" clId="{0DEDA3C8-6D0F-465E-BF39-CB7B153DACAD}" dt="2024-11-19T15:17:07.209" v="205" actId="20577"/>
+        <pc:sldMkLst>
+          <pc:docMk/>
+          <pc:sldMk cId="3621262893" sldId="258"/>
+        </pc:sldMkLst>
+      </pc:sldChg>
+      <pc:sldChg chg="modSp new mod ord">
+        <pc:chgData name="Jiří Zelenka" userId="df58f0fcc0f80eb2" providerId="LiveId" clId="{0DEDA3C8-6D0F-465E-BF39-CB7B153DACAD}" dt="2024-11-19T15:20:48.530" v="394"/>
+        <pc:sldMkLst>
+          <pc:docMk/>
+          <pc:sldMk cId="297826942" sldId="259"/>
+        </pc:sldMkLst>
+      </pc:sldChg>
+      <pc:sldChg chg="modSp new mod">
+        <pc:chgData name="Jiří Zelenka" userId="df58f0fcc0f80eb2" providerId="LiveId" clId="{0DEDA3C8-6D0F-465E-BF39-CB7B153DACAD}" dt="2024-11-19T15:21:23.560" v="407" actId="20577"/>
+        <pc:sldMkLst>
+          <pc:docMk/>
+          <pc:sldMk cId="4287060232" sldId="260"/>
+        </pc:sldMkLst>
+      </pc:sldChg>
+      <pc:sldChg chg="addSp modSp new mod ord">
+        <pc:chgData name="Jiří Zelenka" userId="df58f0fcc0f80eb2" providerId="LiveId" clId="{0DEDA3C8-6D0F-465E-BF39-CB7B153DACAD}" dt="2024-11-26T10:57:51.784" v="765" actId="1076"/>
+        <pc:sldMkLst>
+          <pc:docMk/>
+          <pc:sldMk cId="613450863" sldId="261"/>
+        </pc:sldMkLst>
+      </pc:sldChg>
+      <pc:sldChg chg="addSp delSp modSp new mod">
+        <pc:chgData name="Jiří Zelenka" userId="df58f0fcc0f80eb2" providerId="LiveId" clId="{0DEDA3C8-6D0F-465E-BF39-CB7B153DACAD}" dt="2024-11-19T15:23:35.153" v="482"/>
+        <pc:sldMkLst>
+          <pc:docMk/>
+          <pc:sldMk cId="3548834691" sldId="262"/>
+        </pc:sldMkLst>
+      </pc:sldChg>
+      <pc:sldChg chg="modSp new mod">
+        <pc:chgData name="Jiří Zelenka" userId="df58f0fcc0f80eb2" providerId="LiveId" clId="{0DEDA3C8-6D0F-465E-BF39-CB7B153DACAD}" dt="2024-11-19T15:24:00.417" v="514"/>
         <pc:sldMkLst>
           <pc:docMk/>
           <pc:sldMk cId="3967233716" sldId="263"/>
         </pc:sldMkLst>
-        <pc:picChg chg="mod">
-          <ac:chgData name="Matěj Foukal" userId="ec1f3edf691f6795" providerId="Windows Live" clId="Web-{9BA66848-4A8A-4BCE-9EB0-14D7E5B6EB46}" dt="2024-11-26T09:03:36.200" v="46" actId="1076"/>
-          <ac:picMkLst>
-            <pc:docMk/>
-            <pc:sldMk cId="3967233716" sldId="263"/>
-            <ac:picMk id="7" creationId="{F4920EE7-595D-7C74-12DA-FA3B3C56E336}"/>
-          </ac:picMkLst>
-        </pc:picChg>
-      </pc:sldChg>
-      <pc:sldChg chg="delSp modSp">
-        <pc:chgData name="Matěj Foukal" userId="ec1f3edf691f6795" providerId="Windows Live" clId="Web-{9BA66848-4A8A-4BCE-9EB0-14D7E5B6EB46}" dt="2024-11-26T09:06:10" v="50"/>
+      </pc:sldChg>
+      <pc:sldChg chg="addSp delSp modSp new mod modClrScheme chgLayout">
+        <pc:chgData name="Jiří Zelenka" userId="df58f0fcc0f80eb2" providerId="LiveId" clId="{0DEDA3C8-6D0F-465E-BF39-CB7B153DACAD}" dt="2024-11-19T15:24:29.442" v="570" actId="20577"/>
         <pc:sldMkLst>
           <pc:docMk/>
           <pc:sldMk cId="1231510720" sldId="264"/>
         </pc:sldMkLst>
-        <pc:spChg chg="del mod">
-          <ac:chgData name="Matěj Foukal" userId="ec1f3edf691f6795" providerId="Windows Live" clId="Web-{9BA66848-4A8A-4BCE-9EB0-14D7E5B6EB46}" dt="2024-11-26T09:06:10" v="50"/>
+        <pc:spChg chg="add mod ord">
+          <ac:chgData name="Jiří Zelenka" userId="df58f0fcc0f80eb2" providerId="LiveId" clId="{0DEDA3C8-6D0F-465E-BF39-CB7B153DACAD}" dt="2024-11-19T15:24:29.442" v="570" actId="20577"/>
           <ac:spMkLst>
             <pc:docMk/>
             <pc:sldMk cId="1231510720" sldId="264"/>
-            <ac:spMk id="3" creationId="{75E52C88-5E0B-5EFF-D6EF-D62FB33C6DF5}"/>
+            <ac:spMk id="4" creationId="{826E7F67-FBB2-0715-0336-190DE4473B6D}"/>
           </ac:spMkLst>
         </pc:spChg>
-        <pc:picChg chg="mod">
-          <ac:chgData name="Matěj Foukal" userId="ec1f3edf691f6795" providerId="Windows Live" clId="Web-{9BA66848-4A8A-4BCE-9EB0-14D7E5B6EB46}" dt="2024-11-26T09:05:10.185" v="47" actId="1076"/>
+      </pc:sldChg>
+      <pc:sldChg chg="del">
+        <pc:chgData name="Jiří Zelenka" userId="df58f0fcc0f80eb2" providerId="LiveId" clId="{0DEDA3C8-6D0F-465E-BF39-CB7B153DACAD}" dt="2024-11-26T11:08:36.823" v="905" actId="2696"/>
+        <pc:sldMkLst>
+          <pc:docMk/>
+          <pc:sldMk cId="2570008656" sldId="268"/>
+        </pc:sldMkLst>
+      </pc:sldChg>
+      <pc:sldChg chg="addSp modSp del mod">
+        <pc:chgData name="Jiří Zelenka" userId="df58f0fcc0f80eb2" providerId="LiveId" clId="{0DEDA3C8-6D0F-465E-BF39-CB7B153DACAD}" dt="2024-11-26T10:59:29.967" v="831" actId="2696"/>
+        <pc:sldMkLst>
+          <pc:docMk/>
+          <pc:sldMk cId="1733626072" sldId="282"/>
+        </pc:sldMkLst>
+      </pc:sldChg>
+      <pc:sldChg chg="addSp modSp del mod">
+        <pc:chgData name="Jiří Zelenka" userId="df58f0fcc0f80eb2" providerId="LiveId" clId="{0DEDA3C8-6D0F-465E-BF39-CB7B153DACAD}" dt="2024-11-26T10:59:34.010" v="832" actId="2696"/>
+        <pc:sldMkLst>
+          <pc:docMk/>
+          <pc:sldMk cId="1273820814" sldId="283"/>
+        </pc:sldMkLst>
+      </pc:sldChg>
+      <pc:sldChg chg="addSp delSp modSp new mod">
+        <pc:chgData name="Jiří Zelenka" userId="df58f0fcc0f80eb2" providerId="LiveId" clId="{0DEDA3C8-6D0F-465E-BF39-CB7B153DACAD}" dt="2024-11-26T11:03:16.652" v="903" actId="14100"/>
+        <pc:sldMkLst>
+          <pc:docMk/>
+          <pc:sldMk cId="2491711268" sldId="284"/>
+        </pc:sldMkLst>
+      </pc:sldChg>
+      <pc:sldChg chg="addSp delSp modSp new mod ord">
+        <pc:chgData name="Jiří Zelenka" userId="df58f0fcc0f80eb2" providerId="LiveId" clId="{0DEDA3C8-6D0F-465E-BF39-CB7B153DACAD}" dt="2024-11-26T11:03:08.376" v="901" actId="14100"/>
+        <pc:sldMkLst>
+          <pc:docMk/>
+          <pc:sldMk cId="2115653945" sldId="285"/>
+        </pc:sldMkLst>
+      </pc:sldChg>
+      <pc:sldChg chg="addSp delSp modSp new mod">
+        <pc:chgData name="Jiří Zelenka" userId="df58f0fcc0f80eb2" providerId="LiveId" clId="{0DEDA3C8-6D0F-465E-BF39-CB7B153DACAD}" dt="2024-11-26T11:03:26.399" v="904" actId="14100"/>
+        <pc:sldMkLst>
+          <pc:docMk/>
+          <pc:sldMk cId="2794367450" sldId="286"/>
+        </pc:sldMkLst>
+      </pc:sldChg>
+    </pc:docChg>
+  </pc:docChgLst>
+  <pc:docChgLst>
+    <pc:chgData name="Uživatel typu Host" providerId="Windows Live" clId="Web-{6CC78255-02CC-486D-9799-D2D6624806BE}"/>
+    <pc:docChg chg="modSld">
+      <pc:chgData name="Uživatel typu Host" userId="" providerId="Windows Live" clId="Web-{6CC78255-02CC-486D-9799-D2D6624806BE}" dt="2024-11-25T09:14:02.833" v="1" actId="20577"/>
+      <pc:docMkLst>
+        <pc:docMk/>
+      </pc:docMkLst>
+      <pc:sldChg chg="modSp">
+        <pc:chgData name="Uživatel typu Host" userId="" providerId="Windows Live" clId="Web-{6CC78255-02CC-486D-9799-D2D6624806BE}" dt="2024-11-25T09:14:02.833" v="1" actId="20577"/>
+        <pc:sldMkLst>
+          <pc:docMk/>
+          <pc:sldMk cId="4287060232" sldId="260"/>
+        </pc:sldMkLst>
+      </pc:sldChg>
+    </pc:docChg>
+  </pc:docChgLst>
+  <pc:docChgLst>
+    <pc:chgData name="Jiří Zelenka" userId="df58f0fcc0f80eb2" providerId="LiveId" clId="{87F64531-F3AA-4C5B-A219-4595BA46CF51}"/>
+    <pc:docChg chg="undo custSel modSld">
+      <pc:chgData name="Jiří Zelenka" userId="df58f0fcc0f80eb2" providerId="LiveId" clId="{87F64531-F3AA-4C5B-A219-4595BA46CF51}" dt="2024-11-25T11:55:22.438" v="432" actId="20577"/>
+      <pc:docMkLst>
+        <pc:docMk/>
+      </pc:docMkLst>
+      <pc:sldChg chg="addSp delSp modSp mod setBg modNotesTx">
+        <pc:chgData name="Jiří Zelenka" userId="df58f0fcc0f80eb2" providerId="LiveId" clId="{87F64531-F3AA-4C5B-A219-4595BA46CF51}" dt="2024-11-25T11:55:22.438" v="432" actId="20577"/>
+        <pc:sldMkLst>
+          <pc:docMk/>
+          <pc:sldMk cId="3967233716" sldId="263"/>
+        </pc:sldMkLst>
+      </pc:sldChg>
+    </pc:docChg>
+  </pc:docChgLst>
+  <pc:docChgLst>
+    <pc:chgData name="Ladislav Nagy" userId="b8f981e2ccf60262" providerId="Windows Live" clId="Web-{89234472-BDEA-4CAD-985D-8441D3BB3FBD}"/>
+    <pc:docChg chg="addSld delSld modSld">
+      <pc:chgData name="Ladislav Nagy" userId="b8f981e2ccf60262" providerId="Windows Live" clId="Web-{89234472-BDEA-4CAD-985D-8441D3BB3FBD}" dt="2024-11-25T19:55:26.298" v="529" actId="1076"/>
+      <pc:docMkLst>
+        <pc:docMk/>
+      </pc:docMkLst>
+      <pc:sldChg chg="modSp">
+        <pc:chgData name="Ladislav Nagy" userId="b8f981e2ccf60262" providerId="Windows Live" clId="Web-{89234472-BDEA-4CAD-985D-8441D3BB3FBD}" dt="2024-11-25T19:39:56.985" v="410" actId="20577"/>
+        <pc:sldMkLst>
+          <pc:docMk/>
+          <pc:sldMk cId="3621262893" sldId="258"/>
+        </pc:sldMkLst>
+      </pc:sldChg>
+      <pc:sldChg chg="addSp modSp mod setBg">
+        <pc:chgData name="Ladislav Nagy" userId="b8f981e2ccf60262" providerId="Windows Live" clId="Web-{89234472-BDEA-4CAD-985D-8441D3BB3FBD}" dt="2024-11-25T19:51:18.446" v="507" actId="1076"/>
+        <pc:sldMkLst>
+          <pc:docMk/>
+          <pc:sldMk cId="1231510720" sldId="264"/>
+        </pc:sldMkLst>
+        <pc:spChg chg="mod">
+          <ac:chgData name="Ladislav Nagy" userId="b8f981e2ccf60262" providerId="Windows Live" clId="Web-{89234472-BDEA-4CAD-985D-8441D3BB3FBD}" dt="2024-11-25T19:45:13.980" v="415" actId="20577"/>
+          <ac:spMkLst>
+            <pc:docMk/>
+            <pc:sldMk cId="1231510720" sldId="264"/>
+            <ac:spMk id="4" creationId="{826E7F67-FBB2-0715-0336-190DE4473B6D}"/>
+          </ac:spMkLst>
+        </pc:spChg>
+        <pc:picChg chg="add mod">
+          <ac:chgData name="Ladislav Nagy" userId="b8f981e2ccf60262" providerId="Windows Live" clId="Web-{89234472-BDEA-4CAD-985D-8441D3BB3FBD}" dt="2024-11-25T19:45:08.902" v="414"/>
           <ac:picMkLst>
             <pc:docMk/>
             <pc:sldMk cId="1231510720" sldId="264"/>
@@ -1579,73 +1248,133 @@
           </ac:picMkLst>
         </pc:picChg>
       </pc:sldChg>
-      <pc:sldChg chg="del">
-        <pc:chgData name="Matěj Foukal" userId="ec1f3edf691f6795" providerId="Windows Live" clId="Web-{9BA66848-4A8A-4BCE-9EB0-14D7E5B6EB46}" dt="2024-11-26T09:02:38.772" v="40"/>
-        <pc:sldMkLst>
-          <pc:docMk/>
-          <pc:sldMk cId="2135356783" sldId="266"/>
-        </pc:sldMkLst>
-      </pc:sldChg>
-      <pc:sldChg chg="del">
-        <pc:chgData name="Matěj Foukal" userId="ec1f3edf691f6795" providerId="Windows Live" clId="Web-{9BA66848-4A8A-4BCE-9EB0-14D7E5B6EB46}" dt="2024-11-26T09:02:38.772" v="39"/>
-        <pc:sldMkLst>
-          <pc:docMk/>
-          <pc:sldMk cId="2493402060" sldId="267"/>
-        </pc:sldMkLst>
-      </pc:sldChg>
-      <pc:sldChg chg="addSp delSp modSp add ord replId">
-        <pc:chgData name="Matěj Foukal" userId="ec1f3edf691f6795" providerId="Windows Live" clId="Web-{9BA66848-4A8A-4BCE-9EB0-14D7E5B6EB46}" dt="2024-11-26T09:02:32.913" v="38" actId="1076"/>
-        <pc:sldMkLst>
-          <pc:docMk/>
-          <pc:sldMk cId="1733626072" sldId="282"/>
-        </pc:sldMkLst>
-        <pc:spChg chg="mod">
-          <ac:chgData name="Matěj Foukal" userId="ec1f3edf691f6795" providerId="Windows Live" clId="Web-{9BA66848-4A8A-4BCE-9EB0-14D7E5B6EB46}" dt="2024-11-26T09:02:24.287" v="36" actId="20577"/>
-          <ac:spMkLst>
-            <pc:docMk/>
-            <pc:sldMk cId="1733626072" sldId="282"/>
-            <ac:spMk id="2" creationId="{BCF3F78A-D62E-A79E-C1A9-B039165C5F6F}"/>
-          </ac:spMkLst>
-        </pc:spChg>
-        <pc:picChg chg="del">
-          <ac:chgData name="Matěj Foukal" userId="ec1f3edf691f6795" providerId="Windows Live" clId="Web-{9BA66848-4A8A-4BCE-9EB0-14D7E5B6EB46}" dt="2024-11-26T09:00:38.878" v="3"/>
-          <ac:picMkLst>
-            <pc:docMk/>
-            <pc:sldMk cId="1733626072" sldId="282"/>
-            <ac:picMk id="4" creationId="{8105C726-0FBF-BE6D-112B-87ECCEEB8FA6}"/>
-          </ac:picMkLst>
-        </pc:picChg>
-        <pc:picChg chg="add del mod ord">
-          <ac:chgData name="Matěj Foukal" userId="ec1f3edf691f6795" providerId="Windows Live" clId="Web-{9BA66848-4A8A-4BCE-9EB0-14D7E5B6EB46}" dt="2024-11-26T09:01:50.802" v="22"/>
-          <ac:picMkLst>
-            <pc:docMk/>
-            <pc:sldMk cId="1733626072" sldId="282"/>
-            <ac:picMk id="5" creationId="{A189AA3C-604F-7B52-992F-1076CBA167E8}"/>
-          </ac:picMkLst>
-        </pc:picChg>
-        <pc:picChg chg="add mod ord">
-          <ac:chgData name="Matěj Foukal" userId="ec1f3edf691f6795" providerId="Windows Live" clId="Web-{9BA66848-4A8A-4BCE-9EB0-14D7E5B6EB46}" dt="2024-11-26T09:02:32.913" v="38" actId="1076"/>
-          <ac:picMkLst>
-            <pc:docMk/>
-            <pc:sldMk cId="1733626072" sldId="282"/>
-            <ac:picMk id="7" creationId="{893812E6-BA13-9019-119E-F17624D0583D}"/>
-          </ac:picMkLst>
-        </pc:picChg>
+      <pc:sldChg chg="modSp new">
+        <pc:chgData name="Ladislav Nagy" userId="b8f981e2ccf60262" providerId="Windows Live" clId="Web-{89234472-BDEA-4CAD-985D-8441D3BB3FBD}" dt="2024-11-25T19:30:49.670" v="175" actId="20577"/>
+        <pc:sldMkLst>
+          <pc:docMk/>
+          <pc:sldMk cId="2570008656" sldId="268"/>
+        </pc:sldMkLst>
+      </pc:sldChg>
+      <pc:sldChg chg="modSp new">
+        <pc:chgData name="Ladislav Nagy" userId="b8f981e2ccf60262" providerId="Windows Live" clId="Web-{89234472-BDEA-4CAD-985D-8441D3BB3FBD}" dt="2024-11-25T19:33:23.832" v="312" actId="20577"/>
+        <pc:sldMkLst>
+          <pc:docMk/>
+          <pc:sldMk cId="393156591" sldId="269"/>
+        </pc:sldMkLst>
       </pc:sldChg>
       <pc:sldChg chg="modSp add replId">
-        <pc:chgData name="Matěj Foukal" userId="ec1f3edf691f6795" providerId="Windows Live" clId="Web-{9BA66848-4A8A-4BCE-9EB0-14D7E5B6EB46}" dt="2024-11-26T09:01:42.051" v="21" actId="14100"/>
-        <pc:sldMkLst>
-          <pc:docMk/>
-          <pc:sldMk cId="1273820814" sldId="283"/>
-        </pc:sldMkLst>
-        <pc:picChg chg="mod ord">
-          <ac:chgData name="Matěj Foukal" userId="ec1f3edf691f6795" providerId="Windows Live" clId="Web-{9BA66848-4A8A-4BCE-9EB0-14D7E5B6EB46}" dt="2024-11-26T09:01:42.051" v="21" actId="14100"/>
-          <ac:picMkLst>
-            <pc:docMk/>
-            <pc:sldMk cId="1273820814" sldId="283"/>
-            <ac:picMk id="5" creationId="{A189AA3C-604F-7B52-992F-1076CBA167E8}"/>
-          </ac:picMkLst>
-        </pc:picChg>
+        <pc:chgData name="Ladislav Nagy" userId="b8f981e2ccf60262" providerId="Windows Live" clId="Web-{89234472-BDEA-4CAD-985D-8441D3BB3FBD}" dt="2024-11-25T19:35:40.836" v="347" actId="20577"/>
+        <pc:sldMkLst>
+          <pc:docMk/>
+          <pc:sldMk cId="2149822024" sldId="270"/>
+        </pc:sldMkLst>
+      </pc:sldChg>
+      <pc:sldChg chg="modSp add replId">
+        <pc:chgData name="Ladislav Nagy" userId="b8f981e2ccf60262" providerId="Windows Live" clId="Web-{89234472-BDEA-4CAD-985D-8441D3BB3FBD}" dt="2024-11-25T19:36:06.040" v="354" actId="20577"/>
+        <pc:sldMkLst>
+          <pc:docMk/>
+          <pc:sldMk cId="3524135438" sldId="271"/>
+        </pc:sldMkLst>
+      </pc:sldChg>
+      <pc:sldChg chg="add del replId">
+        <pc:chgData name="Ladislav Nagy" userId="b8f981e2ccf60262" providerId="Windows Live" clId="Web-{89234472-BDEA-4CAD-985D-8441D3BB3FBD}" dt="2024-11-25T19:34:26.802" v="327"/>
+        <pc:sldMkLst>
+          <pc:docMk/>
+          <pc:sldMk cId="3821738194" sldId="271"/>
+        </pc:sldMkLst>
+      </pc:sldChg>
+      <pc:sldChg chg="add del replId">
+        <pc:chgData name="Ladislav Nagy" userId="b8f981e2ccf60262" providerId="Windows Live" clId="Web-{89234472-BDEA-4CAD-985D-8441D3BB3FBD}" dt="2024-11-25T19:34:23.677" v="326"/>
+        <pc:sldMkLst>
+          <pc:docMk/>
+          <pc:sldMk cId="472592551" sldId="272"/>
+        </pc:sldMkLst>
+      </pc:sldChg>
+      <pc:sldChg chg="modSp add replId">
+        <pc:chgData name="Ladislav Nagy" userId="b8f981e2ccf60262" providerId="Windows Live" clId="Web-{89234472-BDEA-4CAD-985D-8441D3BB3FBD}" dt="2024-11-25T19:36:37.666" v="370" actId="20577"/>
+        <pc:sldMkLst>
+          <pc:docMk/>
+          <pc:sldMk cId="3718496977" sldId="272"/>
+        </pc:sldMkLst>
+      </pc:sldChg>
+      <pc:sldChg chg="modSp add replId">
+        <pc:chgData name="Ladislav Nagy" userId="b8f981e2ccf60262" providerId="Windows Live" clId="Web-{89234472-BDEA-4CAD-985D-8441D3BB3FBD}" dt="2024-11-25T19:37:03.651" v="376" actId="20577"/>
+        <pc:sldMkLst>
+          <pc:docMk/>
+          <pc:sldMk cId="1142221253" sldId="273"/>
+        </pc:sldMkLst>
+      </pc:sldChg>
+      <pc:sldChg chg="add del replId">
+        <pc:chgData name="Ladislav Nagy" userId="b8f981e2ccf60262" providerId="Windows Live" clId="Web-{89234472-BDEA-4CAD-985D-8441D3BB3FBD}" dt="2024-11-25T19:34:22.708" v="325"/>
+        <pc:sldMkLst>
+          <pc:docMk/>
+          <pc:sldMk cId="2968465358" sldId="273"/>
+        </pc:sldMkLst>
+      </pc:sldChg>
+      <pc:sldChg chg="modSp add replId">
+        <pc:chgData name="Ladislav Nagy" userId="b8f981e2ccf60262" providerId="Windows Live" clId="Web-{89234472-BDEA-4CAD-985D-8441D3BB3FBD}" dt="2024-11-25T19:37:35.699" v="390" actId="14100"/>
+        <pc:sldMkLst>
+          <pc:docMk/>
+          <pc:sldMk cId="134548107" sldId="274"/>
+        </pc:sldMkLst>
+      </pc:sldChg>
+      <pc:sldChg chg="add del replId">
+        <pc:chgData name="Ladislav Nagy" userId="b8f981e2ccf60262" providerId="Windows Live" clId="Web-{89234472-BDEA-4CAD-985D-8441D3BB3FBD}" dt="2024-11-25T19:34:21.849" v="324"/>
+        <pc:sldMkLst>
+          <pc:docMk/>
+          <pc:sldMk cId="1575268575" sldId="274"/>
+        </pc:sldMkLst>
+      </pc:sldChg>
+      <pc:sldChg chg="modSp add replId">
+        <pc:chgData name="Ladislav Nagy" userId="b8f981e2ccf60262" providerId="Windows Live" clId="Web-{89234472-BDEA-4CAD-985D-8441D3BB3FBD}" dt="2024-11-25T19:38:18.841" v="402" actId="20577"/>
+        <pc:sldMkLst>
+          <pc:docMk/>
+          <pc:sldMk cId="4133623028" sldId="275"/>
+        </pc:sldMkLst>
+      </pc:sldChg>
+      <pc:sldChg chg="addSp delSp modSp new mod setBg">
+        <pc:chgData name="Ladislav Nagy" userId="b8f981e2ccf60262" providerId="Windows Live" clId="Web-{89234472-BDEA-4CAD-985D-8441D3BB3FBD}" dt="2024-11-25T19:49:55.912" v="501" actId="20577"/>
+        <pc:sldMkLst>
+          <pc:docMk/>
+          <pc:sldMk cId="959329316" sldId="276"/>
+        </pc:sldMkLst>
+      </pc:sldChg>
+      <pc:sldChg chg="addSp delSp modSp new del">
+        <pc:chgData name="Ladislav Nagy" userId="b8f981e2ccf60262" providerId="Windows Live" clId="Web-{89234472-BDEA-4CAD-985D-8441D3BB3FBD}" dt="2024-11-25T19:47:35.173" v="431"/>
+        <pc:sldMkLst>
+          <pc:docMk/>
+          <pc:sldMk cId="2725881028" sldId="277"/>
+        </pc:sldMkLst>
+      </pc:sldChg>
+      <pc:sldChg chg="addSp delSp modSp new add del">
+        <pc:chgData name="Ladislav Nagy" userId="b8f981e2ccf60262" providerId="Windows Live" clId="Web-{89234472-BDEA-4CAD-985D-8441D3BB3FBD}" dt="2024-11-25T19:55:26.298" v="529" actId="1076"/>
+        <pc:sldMkLst>
+          <pc:docMk/>
+          <pc:sldMk cId="4050476310" sldId="277"/>
+        </pc:sldMkLst>
+      </pc:sldChg>
+    </pc:docChg>
+  </pc:docChgLst>
+  <pc:docChgLst>
+    <pc:chgData name="Martin Znamenáček" userId="33331470d373d797" providerId="Windows Live" clId="Web-{327C7DE0-5C83-46D1-B8FF-FA61CBA6BB92}"/>
+    <pc:docChg chg="modSld">
+      <pc:chgData name="Martin Znamenáček" userId="33331470d373d797" providerId="Windows Live" clId="Web-{327C7DE0-5C83-46D1-B8FF-FA61CBA6BB92}" dt="2024-11-25T22:34:59.689" v="10"/>
+      <pc:docMkLst>
+        <pc:docMk/>
+      </pc:docMkLst>
+      <pc:sldChg chg="modSp">
+        <pc:chgData name="Martin Znamenáček" userId="33331470d373d797" providerId="Windows Live" clId="Web-{327C7DE0-5C83-46D1-B8FF-FA61CBA6BB92}" dt="2024-11-25T22:33:33.483" v="1" actId="20577"/>
+        <pc:sldMkLst>
+          <pc:docMk/>
+          <pc:sldMk cId="297826942" sldId="259"/>
+        </pc:sldMkLst>
+      </pc:sldChg>
+      <pc:sldChg chg="addSp modSp">
+        <pc:chgData name="Martin Znamenáček" userId="33331470d373d797" providerId="Windows Live" clId="Web-{327C7DE0-5C83-46D1-B8FF-FA61CBA6BB92}" dt="2024-11-25T22:34:59.689" v="10"/>
+        <pc:sldMkLst>
+          <pc:docMk/>
+          <pc:sldMk cId="4287060232" sldId="260"/>
+        </pc:sldMkLst>
       </pc:sldChg>
     </pc:docChg>
   </pc:docChgLst>
@@ -1662,14 +1391,6 @@
           <pc:docMk/>
           <pc:sldMk cId="3621262893" sldId="258"/>
         </pc:sldMkLst>
-        <pc:spChg chg="mod">
-          <ac:chgData name="Ladislav Nagy" userId="b8f981e2ccf60262" providerId="Windows Live" clId="Web-{E1326F10-A011-4774-A3AC-2E580B7EBD58}" dt="2024-11-25T22:35:05.620" v="38" actId="20577"/>
-          <ac:spMkLst>
-            <pc:docMk/>
-            <pc:sldMk cId="3621262893" sldId="258"/>
-            <ac:spMk id="3" creationId="{D825998C-CA6C-3BE9-2798-05448B7CC072}"/>
-          </ac:spMkLst>
-        </pc:spChg>
       </pc:sldChg>
       <pc:sldChg chg="modSp">
         <pc:chgData name="Ladislav Nagy" userId="b8f981e2ccf60262" providerId="Windows Live" clId="Web-{E1326F10-A011-4774-A3AC-2E580B7EBD58}" dt="2024-11-25T22:35:16.417" v="40" actId="20577"/>
@@ -1677,22 +1398,6 @@
           <pc:docMk/>
           <pc:sldMk cId="2570008656" sldId="268"/>
         </pc:sldMkLst>
-        <pc:spChg chg="mod">
-          <ac:chgData name="Ladislav Nagy" userId="b8f981e2ccf60262" providerId="Windows Live" clId="Web-{E1326F10-A011-4774-A3AC-2E580B7EBD58}" dt="2024-11-25T22:35:16.417" v="40" actId="20577"/>
-          <ac:spMkLst>
-            <pc:docMk/>
-            <pc:sldMk cId="2570008656" sldId="268"/>
-            <ac:spMk id="2" creationId="{D14317BD-BB01-5DEA-766D-C3B8DA00A393}"/>
-          </ac:spMkLst>
-        </pc:spChg>
-        <pc:spChg chg="mod">
-          <ac:chgData name="Ladislav Nagy" userId="b8f981e2ccf60262" providerId="Windows Live" clId="Web-{E1326F10-A011-4774-A3AC-2E580B7EBD58}" dt="2024-11-25T22:33:25.194" v="6" actId="20577"/>
-          <ac:spMkLst>
-            <pc:docMk/>
-            <pc:sldMk cId="2570008656" sldId="268"/>
-            <ac:spMk id="3" creationId="{DF890C83-B701-7C39-363E-EE3C4AA10EB8}"/>
-          </ac:spMkLst>
-        </pc:spChg>
       </pc:sldChg>
       <pc:sldChg chg="modSp">
         <pc:chgData name="Ladislav Nagy" userId="b8f981e2ccf60262" providerId="Windows Live" clId="Web-{E1326F10-A011-4774-A3AC-2E580B7EBD58}" dt="2024-11-25T22:32:57.787" v="4"/>
@@ -1700,22 +1405,6 @@
           <pc:docMk/>
           <pc:sldMk cId="393156591" sldId="269"/>
         </pc:sldMkLst>
-        <pc:spChg chg="mod">
-          <ac:chgData name="Ladislav Nagy" userId="b8f981e2ccf60262" providerId="Windows Live" clId="Web-{E1326F10-A011-4774-A3AC-2E580B7EBD58}" dt="2024-11-25T22:32:27.645" v="0" actId="20577"/>
-          <ac:spMkLst>
-            <pc:docMk/>
-            <pc:sldMk cId="393156591" sldId="269"/>
-            <ac:spMk id="2" creationId="{F9DCE38E-9E5B-5363-6CE8-763A4D3E1590}"/>
-          </ac:spMkLst>
-        </pc:spChg>
-        <pc:spChg chg="mod">
-          <ac:chgData name="Ladislav Nagy" userId="b8f981e2ccf60262" providerId="Windows Live" clId="Web-{E1326F10-A011-4774-A3AC-2E580B7EBD58}" dt="2024-11-25T22:32:57.787" v="4"/>
-          <ac:spMkLst>
-            <pc:docMk/>
-            <pc:sldMk cId="393156591" sldId="269"/>
-            <ac:spMk id="3" creationId="{FE317941-97C8-E8DF-7EED-7C19C9A6F6A6}"/>
-          </ac:spMkLst>
-        </pc:spChg>
       </pc:sldChg>
       <pc:sldChg chg="modSp">
         <pc:chgData name="Ladislav Nagy" userId="b8f981e2ccf60262" providerId="Windows Live" clId="Web-{E1326F10-A011-4774-A3AC-2E580B7EBD58}" dt="2024-11-25T22:37:31.110" v="48" actId="20577"/>
@@ -1723,22 +1412,6 @@
           <pc:docMk/>
           <pc:sldMk cId="2149822024" sldId="270"/>
         </pc:sldMkLst>
-        <pc:spChg chg="mod">
-          <ac:chgData name="Ladislav Nagy" userId="b8f981e2ccf60262" providerId="Windows Live" clId="Web-{E1326F10-A011-4774-A3AC-2E580B7EBD58}" dt="2024-11-25T22:37:31.110" v="48" actId="20577"/>
-          <ac:spMkLst>
-            <pc:docMk/>
-            <pc:sldMk cId="2149822024" sldId="270"/>
-            <ac:spMk id="2" creationId="{D14317BD-BB01-5DEA-766D-C3B8DA00A393}"/>
-          </ac:spMkLst>
-        </pc:spChg>
-        <pc:spChg chg="mod">
-          <ac:chgData name="Ladislav Nagy" userId="b8f981e2ccf60262" providerId="Windows Live" clId="Web-{E1326F10-A011-4774-A3AC-2E580B7EBD58}" dt="2024-11-25T22:33:35.522" v="8" actId="20577"/>
-          <ac:spMkLst>
-            <pc:docMk/>
-            <pc:sldMk cId="2149822024" sldId="270"/>
-            <ac:spMk id="3" creationId="{DF890C83-B701-7C39-363E-EE3C4AA10EB8}"/>
-          </ac:spMkLst>
-        </pc:spChg>
       </pc:sldChg>
       <pc:sldChg chg="modSp">
         <pc:chgData name="Ladislav Nagy" userId="b8f981e2ccf60262" providerId="Windows Live" clId="Web-{E1326F10-A011-4774-A3AC-2E580B7EBD58}" dt="2024-11-25T22:37:36.892" v="50" actId="20577"/>
@@ -1746,22 +1419,6 @@
           <pc:docMk/>
           <pc:sldMk cId="3524135438" sldId="271"/>
         </pc:sldMkLst>
-        <pc:spChg chg="mod">
-          <ac:chgData name="Ladislav Nagy" userId="b8f981e2ccf60262" providerId="Windows Live" clId="Web-{E1326F10-A011-4774-A3AC-2E580B7EBD58}" dt="2024-11-25T22:37:36.892" v="50" actId="20577"/>
-          <ac:spMkLst>
-            <pc:docMk/>
-            <pc:sldMk cId="3524135438" sldId="271"/>
-            <ac:spMk id="2" creationId="{D14317BD-BB01-5DEA-766D-C3B8DA00A393}"/>
-          </ac:spMkLst>
-        </pc:spChg>
-        <pc:spChg chg="mod">
-          <ac:chgData name="Ladislav Nagy" userId="b8f981e2ccf60262" providerId="Windows Live" clId="Web-{E1326F10-A011-4774-A3AC-2E580B7EBD58}" dt="2024-11-25T22:33:38.788" v="10" actId="20577"/>
-          <ac:spMkLst>
-            <pc:docMk/>
-            <pc:sldMk cId="3524135438" sldId="271"/>
-            <ac:spMk id="3" creationId="{DF890C83-B701-7C39-363E-EE3C4AA10EB8}"/>
-          </ac:spMkLst>
-        </pc:spChg>
       </pc:sldChg>
       <pc:sldChg chg="del">
         <pc:chgData name="Ladislav Nagy" userId="b8f981e2ccf60262" providerId="Windows Live" clId="Web-{E1326F10-A011-4774-A3AC-2E580B7EBD58}" dt="2024-11-25T22:35:50.137" v="41"/>
@@ -1783,22 +1440,6 @@
           <pc:docMk/>
           <pc:sldMk cId="134548107" sldId="274"/>
         </pc:sldMkLst>
-        <pc:spChg chg="mod">
-          <ac:chgData name="Ladislav Nagy" userId="b8f981e2ccf60262" providerId="Windows Live" clId="Web-{E1326F10-A011-4774-A3AC-2E580B7EBD58}" dt="2024-11-25T22:37:42.501" v="52" actId="20577"/>
-          <ac:spMkLst>
-            <pc:docMk/>
-            <pc:sldMk cId="134548107" sldId="274"/>
-            <ac:spMk id="2" creationId="{D14317BD-BB01-5DEA-766D-C3B8DA00A393}"/>
-          </ac:spMkLst>
-        </pc:spChg>
-        <pc:spChg chg="mod">
-          <ac:chgData name="Ladislav Nagy" userId="b8f981e2ccf60262" providerId="Windows Live" clId="Web-{E1326F10-A011-4774-A3AC-2E580B7EBD58}" dt="2024-11-25T22:38:30.894" v="57" actId="14100"/>
-          <ac:spMkLst>
-            <pc:docMk/>
-            <pc:sldMk cId="134548107" sldId="274"/>
-            <ac:spMk id="3" creationId="{DF890C83-B701-7C39-363E-EE3C4AA10EB8}"/>
-          </ac:spMkLst>
-        </pc:spChg>
       </pc:sldChg>
       <pc:sldChg chg="modSp">
         <pc:chgData name="Ladislav Nagy" userId="b8f981e2ccf60262" providerId="Windows Live" clId="Web-{E1326F10-A011-4774-A3AC-2E580B7EBD58}" dt="2024-11-25T22:37:46.439" v="53" actId="20577"/>
@@ -1806,266 +1447,29 @@
           <pc:docMk/>
           <pc:sldMk cId="4133623028" sldId="275"/>
         </pc:sldMkLst>
-        <pc:spChg chg="mod">
-          <ac:chgData name="Ladislav Nagy" userId="b8f981e2ccf60262" providerId="Windows Live" clId="Web-{E1326F10-A011-4774-A3AC-2E580B7EBD58}" dt="2024-11-25T22:37:46.439" v="53" actId="20577"/>
-          <ac:spMkLst>
-            <pc:docMk/>
-            <pc:sldMk cId="4133623028" sldId="275"/>
-            <ac:spMk id="2" creationId="{D14317BD-BB01-5DEA-766D-C3B8DA00A393}"/>
-          </ac:spMkLst>
-        </pc:spChg>
-        <pc:spChg chg="mod">
-          <ac:chgData name="Ladislav Nagy" userId="b8f981e2ccf60262" providerId="Windows Live" clId="Web-{E1326F10-A011-4774-A3AC-2E580B7EBD58}" dt="2024-11-25T22:36:43.061" v="46" actId="20577"/>
-          <ac:spMkLst>
-            <pc:docMk/>
-            <pc:sldMk cId="4133623028" sldId="275"/>
-            <ac:spMk id="3" creationId="{DF890C83-B701-7C39-363E-EE3C4AA10EB8}"/>
-          </ac:spMkLst>
-        </pc:spChg>
       </pc:sldChg>
     </pc:docChg>
   </pc:docChgLst>
   <pc:docChgLst>
-    <pc:chgData name="Pavel Kubát" userId="cb58ac4f4d8ed8ae" providerId="Windows Live" clId="Web-{D918BDE8-D029-44FE-A222-E31BA3A9E85E}"/>
-    <pc:docChg chg="addSld modSld">
-      <pc:chgData name="Pavel Kubát" userId="cb58ac4f4d8ed8ae" providerId="Windows Live" clId="Web-{D918BDE8-D029-44FE-A222-E31BA3A9E85E}" dt="2024-11-26T11:07:00.959" v="98" actId="20577"/>
+    <pc:chgData name="Matěj Foukal" userId="ec1f3edf691f6795" providerId="Windows Live" clId="Web-{AA5EA451-8079-48CA-8C8F-7124EE364501}"/>
+    <pc:docChg chg="delSld modSld">
+      <pc:chgData name="Matěj Foukal" userId="ec1f3edf691f6795" providerId="Windows Live" clId="Web-{AA5EA451-8079-48CA-8C8F-7124EE364501}" dt="2024-11-26T11:05:50.733" v="19" actId="1076"/>
       <pc:docMkLst>
         <pc:docMk/>
       </pc:docMkLst>
       <pc:sldChg chg="modSp">
-        <pc:chgData name="Pavel Kubát" userId="cb58ac4f4d8ed8ae" providerId="Windows Live" clId="Web-{D918BDE8-D029-44FE-A222-E31BA3A9E85E}" dt="2024-11-26T11:06:51.177" v="89" actId="20577"/>
-        <pc:sldMkLst>
-          <pc:docMk/>
-          <pc:sldMk cId="1781808586" sldId="257"/>
-        </pc:sldMkLst>
-        <pc:spChg chg="mod">
-          <ac:chgData name="Pavel Kubát" userId="cb58ac4f4d8ed8ae" providerId="Windows Live" clId="Web-{D918BDE8-D029-44FE-A222-E31BA3A9E85E}" dt="2024-11-26T11:06:51.177" v="89" actId="20577"/>
-          <ac:spMkLst>
-            <pc:docMk/>
-            <pc:sldMk cId="1781808586" sldId="257"/>
-            <ac:spMk id="3" creationId="{A8A01347-7020-7C97-9925-06225A0B8597}"/>
-          </ac:spMkLst>
-        </pc:spChg>
-      </pc:sldChg>
-      <pc:sldChg chg="modSp new">
-        <pc:chgData name="Pavel Kubát" userId="cb58ac4f4d8ed8ae" providerId="Windows Live" clId="Web-{D918BDE8-D029-44FE-A222-E31BA3A9E85E}" dt="2024-11-26T11:05:09.138" v="26" actId="20577"/>
-        <pc:sldMkLst>
-          <pc:docMk/>
-          <pc:sldMk cId="3972246135" sldId="287"/>
-        </pc:sldMkLst>
-        <pc:spChg chg="mod">
-          <ac:chgData name="Pavel Kubát" userId="cb58ac4f4d8ed8ae" providerId="Windows Live" clId="Web-{D918BDE8-D029-44FE-A222-E31BA3A9E85E}" dt="2024-11-26T11:04:46.996" v="8" actId="20577"/>
-          <ac:spMkLst>
-            <pc:docMk/>
-            <pc:sldMk cId="3972246135" sldId="287"/>
-            <ac:spMk id="2" creationId="{9969BD12-65A8-05B6-CD81-88E6E30ADB5D}"/>
-          </ac:spMkLst>
-        </pc:spChg>
-        <pc:spChg chg="mod">
-          <ac:chgData name="Pavel Kubát" userId="cb58ac4f4d8ed8ae" providerId="Windows Live" clId="Web-{D918BDE8-D029-44FE-A222-E31BA3A9E85E}" dt="2024-11-26T11:05:09.138" v="26" actId="20577"/>
-          <ac:spMkLst>
-            <pc:docMk/>
-            <pc:sldMk cId="3972246135" sldId="287"/>
-            <ac:spMk id="3" creationId="{9A71170A-F963-341A-83F8-593259894C04}"/>
-          </ac:spMkLst>
-        </pc:spChg>
-      </pc:sldChg>
-      <pc:sldChg chg="modSp new">
-        <pc:chgData name="Pavel Kubát" userId="cb58ac4f4d8ed8ae" providerId="Windows Live" clId="Web-{D918BDE8-D029-44FE-A222-E31BA3A9E85E}" dt="2024-11-26T11:06:31.832" v="83" actId="20577"/>
-        <pc:sldMkLst>
-          <pc:docMk/>
-          <pc:sldMk cId="575435518" sldId="288"/>
-        </pc:sldMkLst>
-        <pc:spChg chg="mod">
-          <ac:chgData name="Pavel Kubát" userId="cb58ac4f4d8ed8ae" providerId="Windows Live" clId="Web-{D918BDE8-D029-44FE-A222-E31BA3A9E85E}" dt="2024-11-26T11:06:31.832" v="83" actId="20577"/>
-          <ac:spMkLst>
-            <pc:docMk/>
-            <pc:sldMk cId="575435518" sldId="288"/>
-            <ac:spMk id="2" creationId="{9066EA3E-95E3-9EC3-B631-F0E1151EA71B}"/>
-          </ac:spMkLst>
-        </pc:spChg>
-        <pc:spChg chg="mod">
-          <ac:chgData name="Pavel Kubát" userId="cb58ac4f4d8ed8ae" providerId="Windows Live" clId="Web-{D918BDE8-D029-44FE-A222-E31BA3A9E85E}" dt="2024-11-26T11:05:44.797" v="31" actId="20577"/>
-          <ac:spMkLst>
-            <pc:docMk/>
-            <pc:sldMk cId="575435518" sldId="288"/>
-            <ac:spMk id="3" creationId="{FDAE2AE8-7C1F-8695-2B65-3752F964A8D2}"/>
-          </ac:spMkLst>
-        </pc:spChg>
-      </pc:sldChg>
-      <pc:sldChg chg="modSp new">
-        <pc:chgData name="Pavel Kubát" userId="cb58ac4f4d8ed8ae" providerId="Windows Live" clId="Web-{D918BDE8-D029-44FE-A222-E31BA3A9E85E}" dt="2024-11-26T11:07:00.959" v="98" actId="20577"/>
-        <pc:sldMkLst>
-          <pc:docMk/>
-          <pc:sldMk cId="1973249726" sldId="289"/>
-        </pc:sldMkLst>
-        <pc:spChg chg="mod">
-          <ac:chgData name="Pavel Kubát" userId="cb58ac4f4d8ed8ae" providerId="Windows Live" clId="Web-{D918BDE8-D029-44FE-A222-E31BA3A9E85E}" dt="2024-11-26T11:06:58.240" v="96" actId="20577"/>
-          <ac:spMkLst>
-            <pc:docMk/>
-            <pc:sldMk cId="1973249726" sldId="289"/>
-            <ac:spMk id="2" creationId="{4FF78D81-D2F6-4CEC-8B09-EA353B8F56A1}"/>
-          </ac:spMkLst>
-        </pc:spChg>
-        <pc:spChg chg="mod">
-          <ac:chgData name="Pavel Kubát" userId="cb58ac4f4d8ed8ae" providerId="Windows Live" clId="Web-{D918BDE8-D029-44FE-A222-E31BA3A9E85E}" dt="2024-11-26T11:07:00.959" v="98" actId="20577"/>
-          <ac:spMkLst>
-            <pc:docMk/>
-            <pc:sldMk cId="1973249726" sldId="289"/>
-            <ac:spMk id="3" creationId="{8419CFB9-137F-5321-9CAF-0C0DC013D0D2}"/>
-          </ac:spMkLst>
-        </pc:spChg>
-      </pc:sldChg>
-    </pc:docChg>
-  </pc:docChgLst>
-  <pc:docChgLst>
-    <pc:chgData name="Uživatel typu Host" providerId="Windows Live" clId="Web-{31BAD6C0-C353-4650-B105-D3A775045F02}"/>
-    <pc:docChg chg="addSld delSld modSld sldOrd">
-      <pc:chgData name="Uživatel typu Host" userId="" providerId="Windows Live" clId="Web-{31BAD6C0-C353-4650-B105-D3A775045F02}" dt="2024-11-25T12:33:42.874" v="36" actId="1076"/>
-      <pc:docMkLst>
-        <pc:docMk/>
-      </pc:docMkLst>
-      <pc:sldChg chg="addSp delSp modSp del mod setBg">
-        <pc:chgData name="Uživatel typu Host" userId="" providerId="Windows Live" clId="Web-{31BAD6C0-C353-4650-B105-D3A775045F02}" dt="2024-11-25T12:33:06.983" v="28"/>
-        <pc:sldMkLst>
-          <pc:docMk/>
-          <pc:sldMk cId="3548834691" sldId="262"/>
-        </pc:sldMkLst>
-        <pc:spChg chg="add del mod">
-          <ac:chgData name="Uživatel typu Host" userId="" providerId="Windows Live" clId="Web-{31BAD6C0-C353-4650-B105-D3A775045F02}" dt="2024-11-25T12:32:22.919" v="15"/>
-          <ac:spMkLst>
-            <pc:docMk/>
-            <pc:sldMk cId="3548834691" sldId="262"/>
-            <ac:spMk id="2" creationId="{D249FC60-0E1C-3FA7-CDA2-7A47B64B30C7}"/>
-          </ac:spMkLst>
-        </pc:spChg>
-        <pc:spChg chg="add del">
-          <ac:chgData name="Uživatel typu Host" userId="" providerId="Windows Live" clId="Web-{31BAD6C0-C353-4650-B105-D3A775045F02}" dt="2024-11-25T12:32:18.653" v="14"/>
-          <ac:spMkLst>
-            <pc:docMk/>
-            <pc:sldMk cId="3548834691" sldId="262"/>
-            <ac:spMk id="3" creationId="{33E2789F-33DE-F715-358A-23113803527A}"/>
-          </ac:spMkLst>
-        </pc:spChg>
-        <pc:spChg chg="add del mod">
-          <ac:chgData name="Uživatel typu Host" userId="" providerId="Windows Live" clId="Web-{31BAD6C0-C353-4650-B105-D3A775045F02}" dt="2024-11-25T12:30:26.634" v="5"/>
-          <ac:spMkLst>
-            <pc:docMk/>
-            <pc:sldMk cId="3548834691" sldId="262"/>
-            <ac:spMk id="6" creationId="{4BB8C57E-F8AC-5883-4FF5-25B81D1E2367}"/>
-          </ac:spMkLst>
-        </pc:spChg>
-        <pc:spChg chg="add del mod">
-          <ac:chgData name="Uživatel typu Host" userId="" providerId="Windows Live" clId="Web-{31BAD6C0-C353-4650-B105-D3A775045F02}" dt="2024-11-25T12:30:26.634" v="4"/>
-          <ac:spMkLst>
-            <pc:docMk/>
-            <pc:sldMk cId="3548834691" sldId="262"/>
-            <ac:spMk id="8" creationId="{2B84E74D-F8F3-96C8-DE9B-2473388F339C}"/>
-          </ac:spMkLst>
-        </pc:spChg>
-        <pc:spChg chg="add del mod">
-          <ac:chgData name="Uživatel typu Host" userId="" providerId="Windows Live" clId="Web-{31BAD6C0-C353-4650-B105-D3A775045F02}" dt="2024-11-25T12:32:27.247" v="16"/>
-          <ac:spMkLst>
-            <pc:docMk/>
-            <pc:sldMk cId="3548834691" sldId="262"/>
-            <ac:spMk id="12" creationId="{731EA1B4-5627-4F1A-CC4B-8E627ACF7E26}"/>
-          </ac:spMkLst>
-        </pc:spChg>
-        <pc:spChg chg="add">
-          <ac:chgData name="Uživatel typu Host" userId="" providerId="Windows Live" clId="Web-{31BAD6C0-C353-4650-B105-D3A775045F02}" dt="2024-11-25T12:32:22.919" v="15"/>
-          <ac:spMkLst>
-            <pc:docMk/>
-            <pc:sldMk cId="3548834691" sldId="262"/>
-            <ac:spMk id="17" creationId="{84ECDE7A-6944-466D-8FFE-149A29BA6BAE}"/>
-          </ac:spMkLst>
-        </pc:spChg>
-        <pc:spChg chg="add">
-          <ac:chgData name="Uživatel typu Host" userId="" providerId="Windows Live" clId="Web-{31BAD6C0-C353-4650-B105-D3A775045F02}" dt="2024-11-25T12:32:22.919" v="15"/>
-          <ac:spMkLst>
-            <pc:docMk/>
-            <pc:sldMk cId="3548834691" sldId="262"/>
-            <ac:spMk id="19" creationId="{B3420082-9415-44EC-802E-C77D71D59C57}"/>
-          </ac:spMkLst>
-        </pc:spChg>
-        <pc:spChg chg="add">
-          <ac:chgData name="Uživatel typu Host" userId="" providerId="Windows Live" clId="Web-{31BAD6C0-C353-4650-B105-D3A775045F02}" dt="2024-11-25T12:32:22.919" v="15"/>
-          <ac:spMkLst>
-            <pc:docMk/>
-            <pc:sldMk cId="3548834691" sldId="262"/>
-            <ac:spMk id="21" creationId="{55A52C45-1FCB-4636-A80F-2849B8226C01}"/>
-          </ac:spMkLst>
-        </pc:spChg>
-        <pc:spChg chg="add">
-          <ac:chgData name="Uživatel typu Host" userId="" providerId="Windows Live" clId="Web-{31BAD6C0-C353-4650-B105-D3A775045F02}" dt="2024-11-25T12:32:22.919" v="15"/>
-          <ac:spMkLst>
-            <pc:docMk/>
-            <pc:sldMk cId="3548834691" sldId="262"/>
-            <ac:spMk id="23" creationId="{768EB4DD-3704-43AD-92B3-C4E0C6EA92CB}"/>
-          </ac:spMkLst>
-        </pc:spChg>
-        <pc:picChg chg="add del mod">
-          <ac:chgData name="Uživatel typu Host" userId="" providerId="Windows Live" clId="Web-{31BAD6C0-C353-4650-B105-D3A775045F02}" dt="2024-11-25T12:30:29.213" v="7"/>
-          <ac:picMkLst>
-            <pc:docMk/>
-            <pc:sldMk cId="3548834691" sldId="262"/>
-            <ac:picMk id="4" creationId="{FAB79A26-C545-5EB9-AFB8-E1F62BC55801}"/>
-          </ac:picMkLst>
-        </pc:picChg>
-        <pc:picChg chg="add del mod">
-          <ac:chgData name="Uživatel typu Host" userId="" providerId="Windows Live" clId="Web-{31BAD6C0-C353-4650-B105-D3A775045F02}" dt="2024-11-25T12:30:34.666" v="9"/>
-          <ac:picMkLst>
-            <pc:docMk/>
-            <pc:sldMk cId="3548834691" sldId="262"/>
-            <ac:picMk id="9" creationId="{C0F24903-E221-DCBA-1EBE-06DFC3088AF4}"/>
-          </ac:picMkLst>
-        </pc:picChg>
-        <pc:picChg chg="add mod">
-          <ac:chgData name="Uživatel typu Host" userId="" providerId="Windows Live" clId="Web-{31BAD6C0-C353-4650-B105-D3A775045F02}" dt="2024-11-25T12:32:31.732" v="17" actId="1076"/>
-          <ac:picMkLst>
-            <pc:docMk/>
-            <pc:sldMk cId="3548834691" sldId="262"/>
-            <ac:picMk id="10" creationId="{FC3917FD-B901-2707-0D3C-A9BEA0A7FED4}"/>
-          </ac:picMkLst>
-        </pc:picChg>
-      </pc:sldChg>
-      <pc:sldChg chg="addSp delSp modSp add ord replId">
-        <pc:chgData name="Uživatel typu Host" userId="" providerId="Windows Live" clId="Web-{31BAD6C0-C353-4650-B105-D3A775045F02}" dt="2024-11-25T12:33:42.874" v="36" actId="1076"/>
+        <pc:chgData name="Matěj Foukal" userId="ec1f3edf691f6795" providerId="Windows Live" clId="Web-{AA5EA451-8079-48CA-8C8F-7124EE364501}" dt="2024-11-26T11:05:50.733" v="19" actId="1076"/>
         <pc:sldMkLst>
           <pc:docMk/>
           <pc:sldMk cId="3192235045" sldId="265"/>
         </pc:sldMkLst>
-        <pc:spChg chg="mod">
-          <ac:chgData name="Uživatel typu Host" userId="" providerId="Windows Live" clId="Web-{31BAD6C0-C353-4650-B105-D3A775045F02}" dt="2024-11-25T12:33:22.514" v="30" actId="20577"/>
-          <ac:spMkLst>
-            <pc:docMk/>
-            <pc:sldMk cId="3192235045" sldId="265"/>
-            <ac:spMk id="2" creationId="{BCF3F78A-D62E-A79E-C1A9-B039165C5F6F}"/>
-          </ac:spMkLst>
-        </pc:spChg>
-        <pc:spChg chg="add del mod">
-          <ac:chgData name="Uživatel typu Host" userId="" providerId="Windows Live" clId="Web-{31BAD6C0-C353-4650-B105-D3A775045F02}" dt="2024-11-25T12:33:01.904" v="25"/>
-          <ac:spMkLst>
-            <pc:docMk/>
-            <pc:sldMk cId="3192235045" sldId="265"/>
-            <ac:spMk id="6" creationId="{37667388-7AEB-0A03-4C7F-AE9EFFF51348}"/>
-          </ac:spMkLst>
-        </pc:spChg>
-        <pc:picChg chg="add mod">
-          <ac:chgData name="Uživatel typu Host" userId="" providerId="Windows Live" clId="Web-{31BAD6C0-C353-4650-B105-D3A775045F02}" dt="2024-11-25T12:33:42.874" v="36" actId="1076"/>
-          <ac:picMkLst>
-            <pc:docMk/>
-            <pc:sldMk cId="3192235045" sldId="265"/>
-            <ac:picMk id="4" creationId="{8105C726-0FBF-BE6D-112B-87ECCEEB8FA6}"/>
-          </ac:picMkLst>
-        </pc:picChg>
-        <pc:picChg chg="del">
-          <ac:chgData name="Uživatel typu Host" userId="" providerId="Windows Live" clId="Web-{31BAD6C0-C353-4650-B105-D3A775045F02}" dt="2024-11-25T12:32:55.357" v="23"/>
-          <ac:picMkLst>
-            <pc:docMk/>
-            <pc:sldMk cId="3192235045" sldId="265"/>
-            <ac:picMk id="7" creationId="{F4920EE7-595D-7C74-12DA-FA3B3C56E336}"/>
-          </ac:picMkLst>
-        </pc:picChg>
+      </pc:sldChg>
+      <pc:sldChg chg="del">
+        <pc:chgData name="Matěj Foukal" userId="ec1f3edf691f6795" providerId="Windows Live" clId="Web-{AA5EA451-8079-48CA-8C8F-7124EE364501}" dt="2024-11-26T10:59:38.333" v="0"/>
+        <pc:sldMkLst>
+          <pc:docMk/>
+          <pc:sldMk cId="3524135438" sldId="271"/>
+        </pc:sldMkLst>
       </pc:sldChg>
     </pc:docChg>
   </pc:docChgLst>
@@ -2388,964 +1792,6 @@
           <pc:docMk/>
           <pc:sldMk cId="1973249726" sldId="289"/>
         </pc:sldMkLst>
-      </pc:sldChg>
-    </pc:docChg>
-  </pc:docChgLst>
-  <pc:docChgLst>
-    <pc:chgData name="Uživatel typu Host" providerId="Windows Live" clId="Web-{6CC78255-02CC-486D-9799-D2D6624806BE}"/>
-    <pc:docChg chg="modSld">
-      <pc:chgData name="Uživatel typu Host" userId="" providerId="Windows Live" clId="Web-{6CC78255-02CC-486D-9799-D2D6624806BE}" dt="2024-11-25T09:14:02.833" v="1" actId="20577"/>
-      <pc:docMkLst>
-        <pc:docMk/>
-      </pc:docMkLst>
-      <pc:sldChg chg="modSp">
-        <pc:chgData name="Uživatel typu Host" userId="" providerId="Windows Live" clId="Web-{6CC78255-02CC-486D-9799-D2D6624806BE}" dt="2024-11-25T09:14:02.833" v="1" actId="20577"/>
-        <pc:sldMkLst>
-          <pc:docMk/>
-          <pc:sldMk cId="4287060232" sldId="260"/>
-        </pc:sldMkLst>
-        <pc:spChg chg="mod">
-          <ac:chgData name="Uživatel typu Host" userId="" providerId="Windows Live" clId="Web-{6CC78255-02CC-486D-9799-D2D6624806BE}" dt="2024-11-25T09:14:02.833" v="1" actId="20577"/>
-          <ac:spMkLst>
-            <pc:docMk/>
-            <pc:sldMk cId="4287060232" sldId="260"/>
-            <ac:spMk id="3" creationId="{6727F3E9-FD26-C2B8-789C-D06C94AD34BB}"/>
-          </ac:spMkLst>
-        </pc:spChg>
-      </pc:sldChg>
-    </pc:docChg>
-  </pc:docChgLst>
-  <pc:docChgLst>
-    <pc:chgData name="Daniel Meszaros" userId="1aba072b14a0f5d2" providerId="LiveId" clId="{FED47A89-C768-457A-8E2F-DC14D43A377D}"/>
-    <pc:docChg chg="undo custSel addSld modSld">
-      <pc:chgData name="Daniel Meszaros" userId="1aba072b14a0f5d2" providerId="LiveId" clId="{FED47A89-C768-457A-8E2F-DC14D43A377D}" dt="2024-11-25T17:48:28.298" v="163" actId="400"/>
-      <pc:docMkLst>
-        <pc:docMk/>
-      </pc:docMkLst>
-      <pc:sldChg chg="addSp delSp modSp mod">
-        <pc:chgData name="Daniel Meszaros" userId="1aba072b14a0f5d2" providerId="LiveId" clId="{FED47A89-C768-457A-8E2F-DC14D43A377D}" dt="2024-11-25T17:48:28.298" v="163" actId="400"/>
-        <pc:sldMkLst>
-          <pc:docMk/>
-          <pc:sldMk cId="613450863" sldId="261"/>
-        </pc:sldMkLst>
-        <pc:spChg chg="mod">
-          <ac:chgData name="Daniel Meszaros" userId="1aba072b14a0f5d2" providerId="LiveId" clId="{FED47A89-C768-457A-8E2F-DC14D43A377D}" dt="2024-11-25T17:48:09.596" v="159" actId="20577"/>
-          <ac:spMkLst>
-            <pc:docMk/>
-            <pc:sldMk cId="613450863" sldId="261"/>
-            <ac:spMk id="2" creationId="{A7B6CFE7-03A6-00DB-34B3-210FA09B163C}"/>
-          </ac:spMkLst>
-        </pc:spChg>
-        <pc:spChg chg="mod">
-          <ac:chgData name="Daniel Meszaros" userId="1aba072b14a0f5d2" providerId="LiveId" clId="{FED47A89-C768-457A-8E2F-DC14D43A377D}" dt="2024-11-25T17:48:28.298" v="163" actId="400"/>
-          <ac:spMkLst>
-            <pc:docMk/>
-            <pc:sldMk cId="613450863" sldId="261"/>
-            <ac:spMk id="3" creationId="{13889384-0C0D-1984-122D-8B1A68E41E03}"/>
-          </ac:spMkLst>
-        </pc:spChg>
-        <pc:picChg chg="add del">
-          <ac:chgData name="Daniel Meszaros" userId="1aba072b14a0f5d2" providerId="LiveId" clId="{FED47A89-C768-457A-8E2F-DC14D43A377D}" dt="2024-11-25T17:36:43.799" v="1" actId="22"/>
-          <ac:picMkLst>
-            <pc:docMk/>
-            <pc:sldMk cId="613450863" sldId="261"/>
-            <ac:picMk id="5" creationId="{8C69D758-4962-4444-66B9-141B4C0F4F1B}"/>
-          </ac:picMkLst>
-        </pc:picChg>
-      </pc:sldChg>
-      <pc:sldChg chg="modSp mod">
-        <pc:chgData name="Daniel Meszaros" userId="1aba072b14a0f5d2" providerId="LiveId" clId="{FED47A89-C768-457A-8E2F-DC14D43A377D}" dt="2024-11-25T17:46:39.417" v="139" actId="14100"/>
-        <pc:sldMkLst>
-          <pc:docMk/>
-          <pc:sldMk cId="3192235045" sldId="265"/>
-        </pc:sldMkLst>
-        <pc:picChg chg="mod">
-          <ac:chgData name="Daniel Meszaros" userId="1aba072b14a0f5d2" providerId="LiveId" clId="{FED47A89-C768-457A-8E2F-DC14D43A377D}" dt="2024-11-25T17:46:39.417" v="139" actId="14100"/>
-          <ac:picMkLst>
-            <pc:docMk/>
-            <pc:sldMk cId="3192235045" sldId="265"/>
-            <ac:picMk id="4" creationId="{8105C726-0FBF-BE6D-112B-87ECCEEB8FA6}"/>
-          </ac:picMkLst>
-        </pc:picChg>
-      </pc:sldChg>
-      <pc:sldChg chg="addSp modSp new mod">
-        <pc:chgData name="Daniel Meszaros" userId="1aba072b14a0f5d2" providerId="LiveId" clId="{FED47A89-C768-457A-8E2F-DC14D43A377D}" dt="2024-11-25T17:47:40.974" v="154" actId="1076"/>
-        <pc:sldMkLst>
-          <pc:docMk/>
-          <pc:sldMk cId="2135356783" sldId="266"/>
-        </pc:sldMkLst>
-        <pc:spChg chg="add mod">
-          <ac:chgData name="Daniel Meszaros" userId="1aba072b14a0f5d2" providerId="LiveId" clId="{FED47A89-C768-457A-8E2F-DC14D43A377D}" dt="2024-11-25T17:47:40.974" v="154" actId="1076"/>
-          <ac:spMkLst>
-            <pc:docMk/>
-            <pc:sldMk cId="2135356783" sldId="266"/>
-            <ac:spMk id="5" creationId="{D8F7AD6C-7C7C-5C5C-8DA1-AFA53F039815}"/>
-          </ac:spMkLst>
-        </pc:spChg>
-        <pc:picChg chg="add">
-          <ac:chgData name="Daniel Meszaros" userId="1aba072b14a0f5d2" providerId="LiveId" clId="{FED47A89-C768-457A-8E2F-DC14D43A377D}" dt="2024-11-25T17:37:12.483" v="3" actId="22"/>
-          <ac:picMkLst>
-            <pc:docMk/>
-            <pc:sldMk cId="2135356783" sldId="266"/>
-            <ac:picMk id="3" creationId="{86BEB2D3-F4DA-4C3D-78F9-6E7CCD941F62}"/>
-          </ac:picMkLst>
-        </pc:picChg>
-      </pc:sldChg>
-      <pc:sldChg chg="addSp modSp new mod">
-        <pc:chgData name="Daniel Meszaros" userId="1aba072b14a0f5d2" providerId="LiveId" clId="{FED47A89-C768-457A-8E2F-DC14D43A377D}" dt="2024-11-25T17:47:44.036" v="155" actId="1076"/>
-        <pc:sldMkLst>
-          <pc:docMk/>
-          <pc:sldMk cId="2493402060" sldId="267"/>
-        </pc:sldMkLst>
-        <pc:spChg chg="add mod">
-          <ac:chgData name="Daniel Meszaros" userId="1aba072b14a0f5d2" providerId="LiveId" clId="{FED47A89-C768-457A-8E2F-DC14D43A377D}" dt="2024-11-25T17:47:44.036" v="155" actId="1076"/>
-          <ac:spMkLst>
-            <pc:docMk/>
-            <pc:sldMk cId="2493402060" sldId="267"/>
-            <ac:spMk id="4" creationId="{8A96FA70-4B35-2BDF-4EA3-429D39FA8161}"/>
-          </ac:spMkLst>
-        </pc:spChg>
-        <pc:picChg chg="add mod">
-          <ac:chgData name="Daniel Meszaros" userId="1aba072b14a0f5d2" providerId="LiveId" clId="{FED47A89-C768-457A-8E2F-DC14D43A377D}" dt="2024-11-25T17:47:29.527" v="145" actId="1076"/>
-          <ac:picMkLst>
-            <pc:docMk/>
-            <pc:sldMk cId="2493402060" sldId="267"/>
-            <ac:picMk id="3" creationId="{871EBC4B-18BB-1CC0-D031-E5CA3AFFA8E6}"/>
-          </ac:picMkLst>
-        </pc:picChg>
-      </pc:sldChg>
-    </pc:docChg>
-  </pc:docChgLst>
-  <pc:docChgLst>
-    <pc:chgData name="Jiří Zelenka" userId="df58f0fcc0f80eb2" providerId="LiveId" clId="{0DEDA3C8-6D0F-465E-BF39-CB7B153DACAD}"/>
-    <pc:docChg chg="undo redo custSel addSld delSld modSld sldOrd">
-      <pc:chgData name="Jiří Zelenka" userId="df58f0fcc0f80eb2" providerId="LiveId" clId="{0DEDA3C8-6D0F-465E-BF39-CB7B153DACAD}" dt="2024-11-26T11:08:36.823" v="905" actId="2696"/>
-      <pc:docMkLst>
-        <pc:docMk/>
-      </pc:docMkLst>
-      <pc:sldChg chg="modSp new mod">
-        <pc:chgData name="Jiří Zelenka" userId="df58f0fcc0f80eb2" providerId="LiveId" clId="{0DEDA3C8-6D0F-465E-BF39-CB7B153DACAD}" dt="2024-11-19T15:11:00.543" v="145" actId="20577"/>
-        <pc:sldMkLst>
-          <pc:docMk/>
-          <pc:sldMk cId="280015811" sldId="256"/>
-        </pc:sldMkLst>
-        <pc:spChg chg="mod">
-          <ac:chgData name="Jiří Zelenka" userId="df58f0fcc0f80eb2" providerId="LiveId" clId="{0DEDA3C8-6D0F-465E-BF39-CB7B153DACAD}" dt="2024-11-19T15:04:55.084" v="25" actId="20577"/>
-          <ac:spMkLst>
-            <pc:docMk/>
-            <pc:sldMk cId="280015811" sldId="256"/>
-            <ac:spMk id="2" creationId="{F1C4D6DC-6895-30CD-6FC6-DA77A765ED95}"/>
-          </ac:spMkLst>
-        </pc:spChg>
-        <pc:spChg chg="mod">
-          <ac:chgData name="Jiří Zelenka" userId="df58f0fcc0f80eb2" providerId="LiveId" clId="{0DEDA3C8-6D0F-465E-BF39-CB7B153DACAD}" dt="2024-11-19T15:11:00.543" v="145" actId="20577"/>
-          <ac:spMkLst>
-            <pc:docMk/>
-            <pc:sldMk cId="280015811" sldId="256"/>
-            <ac:spMk id="3" creationId="{52473F9E-28A4-D0E5-874D-CB359B712A41}"/>
-          </ac:spMkLst>
-        </pc:spChg>
-      </pc:sldChg>
-      <pc:sldChg chg="modSp new mod">
-        <pc:chgData name="Jiří Zelenka" userId="df58f0fcc0f80eb2" providerId="LiveId" clId="{0DEDA3C8-6D0F-465E-BF39-CB7B153DACAD}" dt="2024-11-19T15:30:50.608" v="578" actId="20577"/>
-        <pc:sldMkLst>
-          <pc:docMk/>
-          <pc:sldMk cId="1781808586" sldId="257"/>
-        </pc:sldMkLst>
-        <pc:spChg chg="mod">
-          <ac:chgData name="Jiří Zelenka" userId="df58f0fcc0f80eb2" providerId="LiveId" clId="{0DEDA3C8-6D0F-465E-BF39-CB7B153DACAD}" dt="2024-11-19T15:30:50.608" v="578" actId="20577"/>
-          <ac:spMkLst>
-            <pc:docMk/>
-            <pc:sldMk cId="1781808586" sldId="257"/>
-            <ac:spMk id="2" creationId="{8C4CCB29-3600-C905-F028-D18CBFCC3C88}"/>
-          </ac:spMkLst>
-        </pc:spChg>
-        <pc:spChg chg="mod">
-          <ac:chgData name="Jiří Zelenka" userId="df58f0fcc0f80eb2" providerId="LiveId" clId="{0DEDA3C8-6D0F-465E-BF39-CB7B153DACAD}" dt="2024-11-19T15:17:30.828" v="222" actId="20577"/>
-          <ac:spMkLst>
-            <pc:docMk/>
-            <pc:sldMk cId="1781808586" sldId="257"/>
-            <ac:spMk id="3" creationId="{A8A01347-7020-7C97-9925-06225A0B8597}"/>
-          </ac:spMkLst>
-        </pc:spChg>
-      </pc:sldChg>
-      <pc:sldChg chg="modSp new mod">
-        <pc:chgData name="Jiří Zelenka" userId="df58f0fcc0f80eb2" providerId="LiveId" clId="{0DEDA3C8-6D0F-465E-BF39-CB7B153DACAD}" dt="2024-11-19T15:17:07.209" v="205" actId="20577"/>
-        <pc:sldMkLst>
-          <pc:docMk/>
-          <pc:sldMk cId="3621262893" sldId="258"/>
-        </pc:sldMkLst>
-        <pc:spChg chg="mod">
-          <ac:chgData name="Jiří Zelenka" userId="df58f0fcc0f80eb2" providerId="LiveId" clId="{0DEDA3C8-6D0F-465E-BF39-CB7B153DACAD}" dt="2024-11-19T15:16:52.151" v="202" actId="20577"/>
-          <ac:spMkLst>
-            <pc:docMk/>
-            <pc:sldMk cId="3621262893" sldId="258"/>
-            <ac:spMk id="2" creationId="{D51C919C-096B-C7CE-361E-C0998804E13E}"/>
-          </ac:spMkLst>
-        </pc:spChg>
-        <pc:spChg chg="mod">
-          <ac:chgData name="Jiří Zelenka" userId="df58f0fcc0f80eb2" providerId="LiveId" clId="{0DEDA3C8-6D0F-465E-BF39-CB7B153DACAD}" dt="2024-11-19T15:17:07.209" v="205" actId="20577"/>
-          <ac:spMkLst>
-            <pc:docMk/>
-            <pc:sldMk cId="3621262893" sldId="258"/>
-            <ac:spMk id="3" creationId="{D825998C-CA6C-3BE9-2798-05448B7CC072}"/>
-          </ac:spMkLst>
-        </pc:spChg>
-      </pc:sldChg>
-      <pc:sldChg chg="modSp new mod ord">
-        <pc:chgData name="Jiří Zelenka" userId="df58f0fcc0f80eb2" providerId="LiveId" clId="{0DEDA3C8-6D0F-465E-BF39-CB7B153DACAD}" dt="2024-11-19T15:20:48.530" v="394"/>
-        <pc:sldMkLst>
-          <pc:docMk/>
-          <pc:sldMk cId="297826942" sldId="259"/>
-        </pc:sldMkLst>
-        <pc:spChg chg="mod">
-          <ac:chgData name="Jiří Zelenka" userId="df58f0fcc0f80eb2" providerId="LiveId" clId="{0DEDA3C8-6D0F-465E-BF39-CB7B153DACAD}" dt="2024-11-19T15:19:48.108" v="261" actId="20577"/>
-          <ac:spMkLst>
-            <pc:docMk/>
-            <pc:sldMk cId="297826942" sldId="259"/>
-            <ac:spMk id="2" creationId="{4748FAE2-8698-0C0E-3A34-0FF240D402DF}"/>
-          </ac:spMkLst>
-        </pc:spChg>
-        <pc:spChg chg="mod">
-          <ac:chgData name="Jiří Zelenka" userId="df58f0fcc0f80eb2" providerId="LiveId" clId="{0DEDA3C8-6D0F-465E-BF39-CB7B153DACAD}" dt="2024-11-19T15:20:40.586" v="387" actId="20577"/>
-          <ac:spMkLst>
-            <pc:docMk/>
-            <pc:sldMk cId="297826942" sldId="259"/>
-            <ac:spMk id="3" creationId="{D488303E-288C-652B-FD3A-A8A593001CE1}"/>
-          </ac:spMkLst>
-        </pc:spChg>
-      </pc:sldChg>
-      <pc:sldChg chg="modSp new mod">
-        <pc:chgData name="Jiří Zelenka" userId="df58f0fcc0f80eb2" providerId="LiveId" clId="{0DEDA3C8-6D0F-465E-BF39-CB7B153DACAD}" dt="2024-11-19T15:21:23.560" v="407" actId="20577"/>
-        <pc:sldMkLst>
-          <pc:docMk/>
-          <pc:sldMk cId="4287060232" sldId="260"/>
-        </pc:sldMkLst>
-        <pc:spChg chg="mod">
-          <ac:chgData name="Jiří Zelenka" userId="df58f0fcc0f80eb2" providerId="LiveId" clId="{0DEDA3C8-6D0F-465E-BF39-CB7B153DACAD}" dt="2024-11-19T15:19:54.589" v="265" actId="20577"/>
-          <ac:spMkLst>
-            <pc:docMk/>
-            <pc:sldMk cId="4287060232" sldId="260"/>
-            <ac:spMk id="2" creationId="{4826B047-9CD3-700F-A48D-826654355DDB}"/>
-          </ac:spMkLst>
-        </pc:spChg>
-        <pc:spChg chg="mod">
-          <ac:chgData name="Jiří Zelenka" userId="df58f0fcc0f80eb2" providerId="LiveId" clId="{0DEDA3C8-6D0F-465E-BF39-CB7B153DACAD}" dt="2024-11-19T15:21:23.560" v="407" actId="20577"/>
-          <ac:spMkLst>
-            <pc:docMk/>
-            <pc:sldMk cId="4287060232" sldId="260"/>
-            <ac:spMk id="3" creationId="{6727F3E9-FD26-C2B8-789C-D06C94AD34BB}"/>
-          </ac:spMkLst>
-        </pc:spChg>
-      </pc:sldChg>
-      <pc:sldChg chg="addSp modSp new mod ord">
-        <pc:chgData name="Jiří Zelenka" userId="df58f0fcc0f80eb2" providerId="LiveId" clId="{0DEDA3C8-6D0F-465E-BF39-CB7B153DACAD}" dt="2024-11-26T10:57:51.784" v="765" actId="1076"/>
-        <pc:sldMkLst>
-          <pc:docMk/>
-          <pc:sldMk cId="613450863" sldId="261"/>
-        </pc:sldMkLst>
-        <pc:spChg chg="mod">
-          <ac:chgData name="Jiří Zelenka" userId="df58f0fcc0f80eb2" providerId="LiveId" clId="{0DEDA3C8-6D0F-465E-BF39-CB7B153DACAD}" dt="2024-11-26T10:56:30.772" v="659" actId="20577"/>
-          <ac:spMkLst>
-            <pc:docMk/>
-            <pc:sldMk cId="613450863" sldId="261"/>
-            <ac:spMk id="2" creationId="{A7B6CFE7-03A6-00DB-34B3-210FA09B163C}"/>
-          </ac:spMkLst>
-        </pc:spChg>
-        <pc:spChg chg="mod">
-          <ac:chgData name="Jiří Zelenka" userId="df58f0fcc0f80eb2" providerId="LiveId" clId="{0DEDA3C8-6D0F-465E-BF39-CB7B153DACAD}" dt="2024-11-26T10:57:06.770" v="759" actId="20577"/>
-          <ac:spMkLst>
-            <pc:docMk/>
-            <pc:sldMk cId="613450863" sldId="261"/>
-            <ac:spMk id="3" creationId="{13889384-0C0D-1984-122D-8B1A68E41E03}"/>
-          </ac:spMkLst>
-        </pc:spChg>
-        <pc:picChg chg="add mod">
-          <ac:chgData name="Jiří Zelenka" userId="df58f0fcc0f80eb2" providerId="LiveId" clId="{0DEDA3C8-6D0F-465E-BF39-CB7B153DACAD}" dt="2024-11-26T10:57:51.784" v="765" actId="1076"/>
-          <ac:picMkLst>
-            <pc:docMk/>
-            <pc:sldMk cId="613450863" sldId="261"/>
-            <ac:picMk id="5" creationId="{8A2636B0-3F70-7330-2D9A-46D1C6A9C4DE}"/>
-          </ac:picMkLst>
-        </pc:picChg>
-      </pc:sldChg>
-      <pc:sldChg chg="addSp delSp modSp new mod">
-        <pc:chgData name="Jiří Zelenka" userId="df58f0fcc0f80eb2" providerId="LiveId" clId="{0DEDA3C8-6D0F-465E-BF39-CB7B153DACAD}" dt="2024-11-19T15:23:35.153" v="482"/>
-        <pc:sldMkLst>
-          <pc:docMk/>
-          <pc:sldMk cId="3548834691" sldId="262"/>
-        </pc:sldMkLst>
-      </pc:sldChg>
-      <pc:sldChg chg="modSp new mod">
-        <pc:chgData name="Jiří Zelenka" userId="df58f0fcc0f80eb2" providerId="LiveId" clId="{0DEDA3C8-6D0F-465E-BF39-CB7B153DACAD}" dt="2024-11-19T15:24:00.417" v="514"/>
-        <pc:sldMkLst>
-          <pc:docMk/>
-          <pc:sldMk cId="3967233716" sldId="263"/>
-        </pc:sldMkLst>
-        <pc:spChg chg="mod">
-          <ac:chgData name="Jiří Zelenka" userId="df58f0fcc0f80eb2" providerId="LiveId" clId="{0DEDA3C8-6D0F-465E-BF39-CB7B153DACAD}" dt="2024-11-19T15:23:47.209" v="513" actId="20577"/>
-          <ac:spMkLst>
-            <pc:docMk/>
-            <pc:sldMk cId="3967233716" sldId="263"/>
-            <ac:spMk id="2" creationId="{BCF3F78A-D62E-A79E-C1A9-B039165C5F6F}"/>
-          </ac:spMkLst>
-        </pc:spChg>
-      </pc:sldChg>
-      <pc:sldChg chg="addSp delSp modSp new mod modClrScheme chgLayout">
-        <pc:chgData name="Jiří Zelenka" userId="df58f0fcc0f80eb2" providerId="LiveId" clId="{0DEDA3C8-6D0F-465E-BF39-CB7B153DACAD}" dt="2024-11-19T15:24:29.442" v="570" actId="20577"/>
-        <pc:sldMkLst>
-          <pc:docMk/>
-          <pc:sldMk cId="1231510720" sldId="264"/>
-        </pc:sldMkLst>
-        <pc:spChg chg="add mod ord">
-          <ac:chgData name="Jiří Zelenka" userId="df58f0fcc0f80eb2" providerId="LiveId" clId="{0DEDA3C8-6D0F-465E-BF39-CB7B153DACAD}" dt="2024-11-19T15:24:29.442" v="570" actId="20577"/>
-          <ac:spMkLst>
-            <pc:docMk/>
-            <pc:sldMk cId="1231510720" sldId="264"/>
-            <ac:spMk id="4" creationId="{826E7F67-FBB2-0715-0336-190DE4473B6D}"/>
-          </ac:spMkLst>
-        </pc:spChg>
-      </pc:sldChg>
-      <pc:sldChg chg="del">
-        <pc:chgData name="Jiří Zelenka" userId="df58f0fcc0f80eb2" providerId="LiveId" clId="{0DEDA3C8-6D0F-465E-BF39-CB7B153DACAD}" dt="2024-11-26T11:08:36.823" v="905" actId="2696"/>
-        <pc:sldMkLst>
-          <pc:docMk/>
-          <pc:sldMk cId="2570008656" sldId="268"/>
-        </pc:sldMkLst>
-      </pc:sldChg>
-      <pc:sldChg chg="addSp modSp del mod">
-        <pc:chgData name="Jiří Zelenka" userId="df58f0fcc0f80eb2" providerId="LiveId" clId="{0DEDA3C8-6D0F-465E-BF39-CB7B153DACAD}" dt="2024-11-26T10:59:29.967" v="831" actId="2696"/>
-        <pc:sldMkLst>
-          <pc:docMk/>
-          <pc:sldMk cId="1733626072" sldId="282"/>
-        </pc:sldMkLst>
-        <pc:spChg chg="add mod">
-          <ac:chgData name="Jiří Zelenka" userId="df58f0fcc0f80eb2" providerId="LiveId" clId="{0DEDA3C8-6D0F-465E-BF39-CB7B153DACAD}" dt="2024-11-26T10:38:22.489" v="658" actId="20577"/>
-          <ac:spMkLst>
-            <pc:docMk/>
-            <pc:sldMk cId="1733626072" sldId="282"/>
-            <ac:spMk id="4" creationId="{3F0E07CF-BA30-B1F1-F6F8-0F8014F4414F}"/>
-          </ac:spMkLst>
-        </pc:spChg>
-      </pc:sldChg>
-      <pc:sldChg chg="addSp modSp del mod">
-        <pc:chgData name="Jiří Zelenka" userId="df58f0fcc0f80eb2" providerId="LiveId" clId="{0DEDA3C8-6D0F-465E-BF39-CB7B153DACAD}" dt="2024-11-26T10:59:34.010" v="832" actId="2696"/>
-        <pc:sldMkLst>
-          <pc:docMk/>
-          <pc:sldMk cId="1273820814" sldId="283"/>
-        </pc:sldMkLst>
-        <pc:spChg chg="add mod">
-          <ac:chgData name="Jiří Zelenka" userId="df58f0fcc0f80eb2" providerId="LiveId" clId="{0DEDA3C8-6D0F-465E-BF39-CB7B153DACAD}" dt="2024-11-26T10:38:18.157" v="655" actId="20577"/>
-          <ac:spMkLst>
-            <pc:docMk/>
-            <pc:sldMk cId="1273820814" sldId="283"/>
-            <ac:spMk id="4" creationId="{D02B511B-09C4-C3AA-4CE3-C11ABBDBFC08}"/>
-          </ac:spMkLst>
-        </pc:spChg>
-      </pc:sldChg>
-      <pc:sldChg chg="addSp delSp modSp new mod">
-        <pc:chgData name="Jiří Zelenka" userId="df58f0fcc0f80eb2" providerId="LiveId" clId="{0DEDA3C8-6D0F-465E-BF39-CB7B153DACAD}" dt="2024-11-26T11:03:16.652" v="903" actId="14100"/>
-        <pc:sldMkLst>
-          <pc:docMk/>
-          <pc:sldMk cId="2491711268" sldId="284"/>
-        </pc:sldMkLst>
-        <pc:spChg chg="mod">
-          <ac:chgData name="Jiří Zelenka" userId="df58f0fcc0f80eb2" providerId="LiveId" clId="{0DEDA3C8-6D0F-465E-BF39-CB7B153DACAD}" dt="2024-11-26T10:58:23.470" v="795" actId="20577"/>
-          <ac:spMkLst>
-            <pc:docMk/>
-            <pc:sldMk cId="2491711268" sldId="284"/>
-            <ac:spMk id="2" creationId="{46C12B1B-1F38-A3E6-8932-A99A87335AFD}"/>
-          </ac:spMkLst>
-        </pc:spChg>
-        <pc:spChg chg="del">
-          <ac:chgData name="Jiří Zelenka" userId="df58f0fcc0f80eb2" providerId="LiveId" clId="{0DEDA3C8-6D0F-465E-BF39-CB7B153DACAD}" dt="2024-11-26T10:58:14.932" v="767" actId="22"/>
-          <ac:spMkLst>
-            <pc:docMk/>
-            <pc:sldMk cId="2491711268" sldId="284"/>
-            <ac:spMk id="3" creationId="{17829D14-2D8D-7B20-AAA7-7A5A039D78FE}"/>
-          </ac:spMkLst>
-        </pc:spChg>
-        <pc:picChg chg="add mod ord">
-          <ac:chgData name="Jiří Zelenka" userId="df58f0fcc0f80eb2" providerId="LiveId" clId="{0DEDA3C8-6D0F-465E-BF39-CB7B153DACAD}" dt="2024-11-26T11:03:16.652" v="903" actId="14100"/>
-          <ac:picMkLst>
-            <pc:docMk/>
-            <pc:sldMk cId="2491711268" sldId="284"/>
-            <ac:picMk id="8" creationId="{D4E56248-DD86-101E-5222-94CCB613717E}"/>
-          </ac:picMkLst>
-        </pc:picChg>
-      </pc:sldChg>
-      <pc:sldChg chg="addSp delSp modSp new mod ord">
-        <pc:chgData name="Jiří Zelenka" userId="df58f0fcc0f80eb2" providerId="LiveId" clId="{0DEDA3C8-6D0F-465E-BF39-CB7B153DACAD}" dt="2024-11-26T11:03:08.376" v="901" actId="14100"/>
-        <pc:sldMkLst>
-          <pc:docMk/>
-          <pc:sldMk cId="2115653945" sldId="285"/>
-        </pc:sldMkLst>
-        <pc:spChg chg="mod">
-          <ac:chgData name="Jiří Zelenka" userId="df58f0fcc0f80eb2" providerId="LiveId" clId="{0DEDA3C8-6D0F-465E-BF39-CB7B153DACAD}" dt="2024-11-26T11:03:03.966" v="900" actId="1076"/>
-          <ac:spMkLst>
-            <pc:docMk/>
-            <pc:sldMk cId="2115653945" sldId="285"/>
-            <ac:spMk id="2" creationId="{CA174CE1-84A8-FCB1-A90C-51EC2D426EA1}"/>
-          </ac:spMkLst>
-        </pc:spChg>
-        <pc:spChg chg="del">
-          <ac:chgData name="Jiří Zelenka" userId="df58f0fcc0f80eb2" providerId="LiveId" clId="{0DEDA3C8-6D0F-465E-BF39-CB7B153DACAD}" dt="2024-11-26T10:59:10.225" v="827"/>
-          <ac:spMkLst>
-            <pc:docMk/>
-            <pc:sldMk cId="2115653945" sldId="285"/>
-            <ac:spMk id="3" creationId="{181E8A4F-C8CB-CBE4-99E7-5FDDE6681DAE}"/>
-          </ac:spMkLst>
-        </pc:spChg>
-        <pc:picChg chg="add mod">
-          <ac:chgData name="Jiří Zelenka" userId="df58f0fcc0f80eb2" providerId="LiveId" clId="{0DEDA3C8-6D0F-465E-BF39-CB7B153DACAD}" dt="2024-11-26T11:03:08.376" v="901" actId="14100"/>
-          <ac:picMkLst>
-            <pc:docMk/>
-            <pc:sldMk cId="2115653945" sldId="285"/>
-            <ac:picMk id="7" creationId="{CDF69B3C-AF85-3948-E283-599ED3CDF719}"/>
-          </ac:picMkLst>
-        </pc:picChg>
-      </pc:sldChg>
-      <pc:sldChg chg="addSp delSp modSp new mod">
-        <pc:chgData name="Jiří Zelenka" userId="df58f0fcc0f80eb2" providerId="LiveId" clId="{0DEDA3C8-6D0F-465E-BF39-CB7B153DACAD}" dt="2024-11-26T11:03:26.399" v="904" actId="14100"/>
-        <pc:sldMkLst>
-          <pc:docMk/>
-          <pc:sldMk cId="2794367450" sldId="286"/>
-        </pc:sldMkLst>
-        <pc:spChg chg="mod">
-          <ac:chgData name="Jiří Zelenka" userId="df58f0fcc0f80eb2" providerId="LiveId" clId="{0DEDA3C8-6D0F-465E-BF39-CB7B153DACAD}" dt="2024-11-26T11:00:37.826" v="890" actId="27636"/>
-          <ac:spMkLst>
-            <pc:docMk/>
-            <pc:sldMk cId="2794367450" sldId="286"/>
-            <ac:spMk id="2" creationId="{1AE1BBF2-CFE2-CBEE-406E-F88BD67AB7AD}"/>
-          </ac:spMkLst>
-        </pc:spChg>
-        <pc:spChg chg="del">
-          <ac:chgData name="Jiří Zelenka" userId="df58f0fcc0f80eb2" providerId="LiveId" clId="{0DEDA3C8-6D0F-465E-BF39-CB7B153DACAD}" dt="2024-11-26T10:59:48.794" v="834" actId="22"/>
-          <ac:spMkLst>
-            <pc:docMk/>
-            <pc:sldMk cId="2794367450" sldId="286"/>
-            <ac:spMk id="3" creationId="{89B9B394-E218-8815-BDEE-9D3C509B4D02}"/>
-          </ac:spMkLst>
-        </pc:spChg>
-        <pc:spChg chg="add del mod">
-          <ac:chgData name="Jiří Zelenka" userId="df58f0fcc0f80eb2" providerId="LiveId" clId="{0DEDA3C8-6D0F-465E-BF39-CB7B153DACAD}" dt="2024-11-26T11:01:40.301" v="898"/>
-          <ac:spMkLst>
-            <pc:docMk/>
-            <pc:sldMk cId="2794367450" sldId="286"/>
-            <ac:spMk id="9" creationId="{CE2735E7-CE94-2E60-4ECB-D586DE845092}"/>
-          </ac:spMkLst>
-        </pc:spChg>
-        <pc:picChg chg="add mod ord">
-          <ac:chgData name="Jiří Zelenka" userId="df58f0fcc0f80eb2" providerId="LiveId" clId="{0DEDA3C8-6D0F-465E-BF39-CB7B153DACAD}" dt="2024-11-26T11:03:26.399" v="904" actId="14100"/>
-          <ac:picMkLst>
-            <pc:docMk/>
-            <pc:sldMk cId="2794367450" sldId="286"/>
-            <ac:picMk id="8" creationId="{80118A8D-987E-5ABB-E8CB-E50EAE972BC6}"/>
-          </ac:picMkLst>
-        </pc:picChg>
-      </pc:sldChg>
-    </pc:docChg>
-  </pc:docChgLst>
-  <pc:docChgLst>
-    <pc:chgData name="Ladislav Nagy" userId="b8f981e2ccf60262" providerId="Windows Live" clId="Web-{89234472-BDEA-4CAD-985D-8441D3BB3FBD}"/>
-    <pc:docChg chg="addSld delSld modSld">
-      <pc:chgData name="Ladislav Nagy" userId="b8f981e2ccf60262" providerId="Windows Live" clId="Web-{89234472-BDEA-4CAD-985D-8441D3BB3FBD}" dt="2024-11-25T19:55:26.298" v="529" actId="1076"/>
-      <pc:docMkLst>
-        <pc:docMk/>
-      </pc:docMkLst>
-      <pc:sldChg chg="modSp">
-        <pc:chgData name="Ladislav Nagy" userId="b8f981e2ccf60262" providerId="Windows Live" clId="Web-{89234472-BDEA-4CAD-985D-8441D3BB3FBD}" dt="2024-11-25T19:39:56.985" v="410" actId="20577"/>
-        <pc:sldMkLst>
-          <pc:docMk/>
-          <pc:sldMk cId="3621262893" sldId="258"/>
-        </pc:sldMkLst>
-        <pc:spChg chg="mod">
-          <ac:chgData name="Ladislav Nagy" userId="b8f981e2ccf60262" providerId="Windows Live" clId="Web-{89234472-BDEA-4CAD-985D-8441D3BB3FBD}" dt="2024-11-25T19:39:56.985" v="410" actId="20577"/>
-          <ac:spMkLst>
-            <pc:docMk/>
-            <pc:sldMk cId="3621262893" sldId="258"/>
-            <ac:spMk id="3" creationId="{D825998C-CA6C-3BE9-2798-05448B7CC072}"/>
-          </ac:spMkLst>
-        </pc:spChg>
-      </pc:sldChg>
-      <pc:sldChg chg="addSp modSp mod setBg">
-        <pc:chgData name="Ladislav Nagy" userId="b8f981e2ccf60262" providerId="Windows Live" clId="Web-{89234472-BDEA-4CAD-985D-8441D3BB3FBD}" dt="2024-11-25T19:51:18.446" v="507" actId="1076"/>
-        <pc:sldMkLst>
-          <pc:docMk/>
-          <pc:sldMk cId="1231510720" sldId="264"/>
-        </pc:sldMkLst>
-        <pc:spChg chg="add mod">
-          <ac:chgData name="Ladislav Nagy" userId="b8f981e2ccf60262" providerId="Windows Live" clId="Web-{89234472-BDEA-4CAD-985D-8441D3BB3FBD}" dt="2024-11-25T19:51:18.446" v="507" actId="1076"/>
-          <ac:spMkLst>
-            <pc:docMk/>
-            <pc:sldMk cId="1231510720" sldId="264"/>
-            <ac:spMk id="3" creationId="{75E52C88-5E0B-5EFF-D6EF-D62FB33C6DF5}"/>
-          </ac:spMkLst>
-        </pc:spChg>
-        <pc:spChg chg="mod">
-          <ac:chgData name="Ladislav Nagy" userId="b8f981e2ccf60262" providerId="Windows Live" clId="Web-{89234472-BDEA-4CAD-985D-8441D3BB3FBD}" dt="2024-11-25T19:45:13.980" v="415" actId="20577"/>
-          <ac:spMkLst>
-            <pc:docMk/>
-            <pc:sldMk cId="1231510720" sldId="264"/>
-            <ac:spMk id="4" creationId="{826E7F67-FBB2-0715-0336-190DE4473B6D}"/>
-          </ac:spMkLst>
-        </pc:spChg>
-        <pc:spChg chg="add">
-          <ac:chgData name="Ladislav Nagy" userId="b8f981e2ccf60262" providerId="Windows Live" clId="Web-{89234472-BDEA-4CAD-985D-8441D3BB3FBD}" dt="2024-11-25T19:45:08.902" v="414"/>
-          <ac:spMkLst>
-            <pc:docMk/>
-            <pc:sldMk cId="1231510720" sldId="264"/>
-            <ac:spMk id="9" creationId="{362D44EE-C852-4460-B8B5-C4F2BC20510C}"/>
-          </ac:spMkLst>
-        </pc:spChg>
-        <pc:spChg chg="add">
-          <ac:chgData name="Ladislav Nagy" userId="b8f981e2ccf60262" providerId="Windows Live" clId="Web-{89234472-BDEA-4CAD-985D-8441D3BB3FBD}" dt="2024-11-25T19:45:08.902" v="414"/>
-          <ac:spMkLst>
-            <pc:docMk/>
-            <pc:sldMk cId="1231510720" sldId="264"/>
-            <ac:spMk id="11" creationId="{658970D8-8D1D-4B5C-894B-E871CC86543D}"/>
-          </ac:spMkLst>
-        </pc:spChg>
-        <pc:spChg chg="add">
-          <ac:chgData name="Ladislav Nagy" userId="b8f981e2ccf60262" providerId="Windows Live" clId="Web-{89234472-BDEA-4CAD-985D-8441D3BB3FBD}" dt="2024-11-25T19:45:08.902" v="414"/>
-          <ac:spMkLst>
-            <pc:docMk/>
-            <pc:sldMk cId="1231510720" sldId="264"/>
-            <ac:spMk id="13" creationId="{F227E5B6-9132-43CA-B503-37A18562ADF2}"/>
-          </ac:spMkLst>
-        </pc:spChg>
-        <pc:spChg chg="add">
-          <ac:chgData name="Ladislav Nagy" userId="b8f981e2ccf60262" providerId="Windows Live" clId="Web-{89234472-BDEA-4CAD-985D-8441D3BB3FBD}" dt="2024-11-25T19:45:08.902" v="414"/>
-          <ac:spMkLst>
-            <pc:docMk/>
-            <pc:sldMk cId="1231510720" sldId="264"/>
-            <ac:spMk id="15" creationId="{03C2051E-A88D-48E5-BACF-AAED17892722}"/>
-          </ac:spMkLst>
-        </pc:spChg>
-        <pc:spChg chg="add">
-          <ac:chgData name="Ladislav Nagy" userId="b8f981e2ccf60262" providerId="Windows Live" clId="Web-{89234472-BDEA-4CAD-985D-8441D3BB3FBD}" dt="2024-11-25T19:45:08.902" v="414"/>
-          <ac:spMkLst>
-            <pc:docMk/>
-            <pc:sldMk cId="1231510720" sldId="264"/>
-            <ac:spMk id="17" creationId="{7821A508-2985-4905-874A-527429BAABFA}"/>
-          </ac:spMkLst>
-        </pc:spChg>
-        <pc:spChg chg="add">
-          <ac:chgData name="Ladislav Nagy" userId="b8f981e2ccf60262" providerId="Windows Live" clId="Web-{89234472-BDEA-4CAD-985D-8441D3BB3FBD}" dt="2024-11-25T19:45:08.902" v="414"/>
-          <ac:spMkLst>
-            <pc:docMk/>
-            <pc:sldMk cId="1231510720" sldId="264"/>
-            <ac:spMk id="19" creationId="{D2929CB1-0E3C-4B2D-ADC5-0154FB33BA44}"/>
-          </ac:spMkLst>
-        </pc:spChg>
-        <pc:spChg chg="add">
-          <ac:chgData name="Ladislav Nagy" userId="b8f981e2ccf60262" providerId="Windows Live" clId="Web-{89234472-BDEA-4CAD-985D-8441D3BB3FBD}" dt="2024-11-25T19:45:08.902" v="414"/>
-          <ac:spMkLst>
-            <pc:docMk/>
-            <pc:sldMk cId="1231510720" sldId="264"/>
-            <ac:spMk id="21" creationId="{5F2F0C84-BE8C-4DC2-A6D3-30349A801D5C}"/>
-          </ac:spMkLst>
-        </pc:spChg>
-        <pc:picChg chg="add mod">
-          <ac:chgData name="Ladislav Nagy" userId="b8f981e2ccf60262" providerId="Windows Live" clId="Web-{89234472-BDEA-4CAD-985D-8441D3BB3FBD}" dt="2024-11-25T19:45:08.902" v="414"/>
-          <ac:picMkLst>
-            <pc:docMk/>
-            <pc:sldMk cId="1231510720" sldId="264"/>
-            <ac:picMk id="2" creationId="{03A776D3-8100-D3DC-0ADD-75331BEF22B4}"/>
-          </ac:picMkLst>
-        </pc:picChg>
-      </pc:sldChg>
-      <pc:sldChg chg="modSp new">
-        <pc:chgData name="Ladislav Nagy" userId="b8f981e2ccf60262" providerId="Windows Live" clId="Web-{89234472-BDEA-4CAD-985D-8441D3BB3FBD}" dt="2024-11-25T19:30:49.670" v="175" actId="20577"/>
-        <pc:sldMkLst>
-          <pc:docMk/>
-          <pc:sldMk cId="2570008656" sldId="268"/>
-        </pc:sldMkLst>
-        <pc:spChg chg="mod">
-          <ac:chgData name="Ladislav Nagy" userId="b8f981e2ccf60262" providerId="Windows Live" clId="Web-{89234472-BDEA-4CAD-985D-8441D3BB3FBD}" dt="2024-11-25T19:28:23.806" v="67" actId="20577"/>
-          <ac:spMkLst>
-            <pc:docMk/>
-            <pc:sldMk cId="2570008656" sldId="268"/>
-            <ac:spMk id="2" creationId="{D14317BD-BB01-5DEA-766D-C3B8DA00A393}"/>
-          </ac:spMkLst>
-        </pc:spChg>
-        <pc:spChg chg="mod">
-          <ac:chgData name="Ladislav Nagy" userId="b8f981e2ccf60262" providerId="Windows Live" clId="Web-{89234472-BDEA-4CAD-985D-8441D3BB3FBD}" dt="2024-11-25T19:30:49.670" v="175" actId="20577"/>
-          <ac:spMkLst>
-            <pc:docMk/>
-            <pc:sldMk cId="2570008656" sldId="268"/>
-            <ac:spMk id="3" creationId="{DF890C83-B701-7C39-363E-EE3C4AA10EB8}"/>
-          </ac:spMkLst>
-        </pc:spChg>
-      </pc:sldChg>
-      <pc:sldChg chg="modSp new">
-        <pc:chgData name="Ladislav Nagy" userId="b8f981e2ccf60262" providerId="Windows Live" clId="Web-{89234472-BDEA-4CAD-985D-8441D3BB3FBD}" dt="2024-11-25T19:33:23.832" v="312" actId="20577"/>
-        <pc:sldMkLst>
-          <pc:docMk/>
-          <pc:sldMk cId="393156591" sldId="269"/>
-        </pc:sldMkLst>
-        <pc:spChg chg="mod">
-          <ac:chgData name="Ladislav Nagy" userId="b8f981e2ccf60262" providerId="Windows Live" clId="Web-{89234472-BDEA-4CAD-985D-8441D3BB3FBD}" dt="2024-11-25T19:31:09.499" v="179" actId="20577"/>
-          <ac:spMkLst>
-            <pc:docMk/>
-            <pc:sldMk cId="393156591" sldId="269"/>
-            <ac:spMk id="2" creationId="{F9DCE38E-9E5B-5363-6CE8-763A4D3E1590}"/>
-          </ac:spMkLst>
-        </pc:spChg>
-        <pc:spChg chg="mod">
-          <ac:chgData name="Ladislav Nagy" userId="b8f981e2ccf60262" providerId="Windows Live" clId="Web-{89234472-BDEA-4CAD-985D-8441D3BB3FBD}" dt="2024-11-25T19:33:23.832" v="312" actId="20577"/>
-          <ac:spMkLst>
-            <pc:docMk/>
-            <pc:sldMk cId="393156591" sldId="269"/>
-            <ac:spMk id="3" creationId="{FE317941-97C8-E8DF-7EED-7C19C9A6F6A6}"/>
-          </ac:spMkLst>
-        </pc:spChg>
-      </pc:sldChg>
-      <pc:sldChg chg="modSp add replId">
-        <pc:chgData name="Ladislav Nagy" userId="b8f981e2ccf60262" providerId="Windows Live" clId="Web-{89234472-BDEA-4CAD-985D-8441D3BB3FBD}" dt="2024-11-25T19:35:40.836" v="347" actId="20577"/>
-        <pc:sldMkLst>
-          <pc:docMk/>
-          <pc:sldMk cId="2149822024" sldId="270"/>
-        </pc:sldMkLst>
-        <pc:spChg chg="mod">
-          <ac:chgData name="Ladislav Nagy" userId="b8f981e2ccf60262" providerId="Windows Live" clId="Web-{89234472-BDEA-4CAD-985D-8441D3BB3FBD}" dt="2024-11-25T19:35:25.195" v="340" actId="20577"/>
-          <ac:spMkLst>
-            <pc:docMk/>
-            <pc:sldMk cId="2149822024" sldId="270"/>
-            <ac:spMk id="2" creationId="{D14317BD-BB01-5DEA-766D-C3B8DA00A393}"/>
-          </ac:spMkLst>
-        </pc:spChg>
-        <pc:spChg chg="mod">
-          <ac:chgData name="Ladislav Nagy" userId="b8f981e2ccf60262" providerId="Windows Live" clId="Web-{89234472-BDEA-4CAD-985D-8441D3BB3FBD}" dt="2024-11-25T19:35:40.836" v="347" actId="20577"/>
-          <ac:spMkLst>
-            <pc:docMk/>
-            <pc:sldMk cId="2149822024" sldId="270"/>
-            <ac:spMk id="3" creationId="{DF890C83-B701-7C39-363E-EE3C4AA10EB8}"/>
-          </ac:spMkLst>
-        </pc:spChg>
-      </pc:sldChg>
-      <pc:sldChg chg="modSp add replId">
-        <pc:chgData name="Ladislav Nagy" userId="b8f981e2ccf60262" providerId="Windows Live" clId="Web-{89234472-BDEA-4CAD-985D-8441D3BB3FBD}" dt="2024-11-25T19:36:06.040" v="354" actId="20577"/>
-        <pc:sldMkLst>
-          <pc:docMk/>
-          <pc:sldMk cId="3524135438" sldId="271"/>
-        </pc:sldMkLst>
-        <pc:spChg chg="mod">
-          <ac:chgData name="Ladislav Nagy" userId="b8f981e2ccf60262" providerId="Windows Live" clId="Web-{89234472-BDEA-4CAD-985D-8441D3BB3FBD}" dt="2024-11-25T19:35:55.227" v="349" actId="20577"/>
-          <ac:spMkLst>
-            <pc:docMk/>
-            <pc:sldMk cId="3524135438" sldId="271"/>
-            <ac:spMk id="2" creationId="{D14317BD-BB01-5DEA-766D-C3B8DA00A393}"/>
-          </ac:spMkLst>
-        </pc:spChg>
-        <pc:spChg chg="mod">
-          <ac:chgData name="Ladislav Nagy" userId="b8f981e2ccf60262" providerId="Windows Live" clId="Web-{89234472-BDEA-4CAD-985D-8441D3BB3FBD}" dt="2024-11-25T19:36:06.040" v="354" actId="20577"/>
-          <ac:spMkLst>
-            <pc:docMk/>
-            <pc:sldMk cId="3524135438" sldId="271"/>
-            <ac:spMk id="3" creationId="{DF890C83-B701-7C39-363E-EE3C4AA10EB8}"/>
-          </ac:spMkLst>
-        </pc:spChg>
-      </pc:sldChg>
-      <pc:sldChg chg="add del replId">
-        <pc:chgData name="Ladislav Nagy" userId="b8f981e2ccf60262" providerId="Windows Live" clId="Web-{89234472-BDEA-4CAD-985D-8441D3BB3FBD}" dt="2024-11-25T19:34:26.802" v="327"/>
-        <pc:sldMkLst>
-          <pc:docMk/>
-          <pc:sldMk cId="3821738194" sldId="271"/>
-        </pc:sldMkLst>
-      </pc:sldChg>
-      <pc:sldChg chg="add del replId">
-        <pc:chgData name="Ladislav Nagy" userId="b8f981e2ccf60262" providerId="Windows Live" clId="Web-{89234472-BDEA-4CAD-985D-8441D3BB3FBD}" dt="2024-11-25T19:34:23.677" v="326"/>
-        <pc:sldMkLst>
-          <pc:docMk/>
-          <pc:sldMk cId="472592551" sldId="272"/>
-        </pc:sldMkLst>
-      </pc:sldChg>
-      <pc:sldChg chg="modSp add replId">
-        <pc:chgData name="Ladislav Nagy" userId="b8f981e2ccf60262" providerId="Windows Live" clId="Web-{89234472-BDEA-4CAD-985D-8441D3BB3FBD}" dt="2024-11-25T19:36:37.666" v="370" actId="20577"/>
-        <pc:sldMkLst>
-          <pc:docMk/>
-          <pc:sldMk cId="3718496977" sldId="272"/>
-        </pc:sldMkLst>
-        <pc:spChg chg="mod">
-          <ac:chgData name="Ladislav Nagy" userId="b8f981e2ccf60262" providerId="Windows Live" clId="Web-{89234472-BDEA-4CAD-985D-8441D3BB3FBD}" dt="2024-11-25T19:36:21.806" v="360" actId="20577"/>
-          <ac:spMkLst>
-            <pc:docMk/>
-            <pc:sldMk cId="3718496977" sldId="272"/>
-            <ac:spMk id="2" creationId="{D14317BD-BB01-5DEA-766D-C3B8DA00A393}"/>
-          </ac:spMkLst>
-        </pc:spChg>
-        <pc:spChg chg="mod">
-          <ac:chgData name="Ladislav Nagy" userId="b8f981e2ccf60262" providerId="Windows Live" clId="Web-{89234472-BDEA-4CAD-985D-8441D3BB3FBD}" dt="2024-11-25T19:36:37.666" v="370" actId="20577"/>
-          <ac:spMkLst>
-            <pc:docMk/>
-            <pc:sldMk cId="3718496977" sldId="272"/>
-            <ac:spMk id="3" creationId="{DF890C83-B701-7C39-363E-EE3C4AA10EB8}"/>
-          </ac:spMkLst>
-        </pc:spChg>
-      </pc:sldChg>
-      <pc:sldChg chg="modSp add replId">
-        <pc:chgData name="Ladislav Nagy" userId="b8f981e2ccf60262" providerId="Windows Live" clId="Web-{89234472-BDEA-4CAD-985D-8441D3BB3FBD}" dt="2024-11-25T19:37:03.651" v="376" actId="20577"/>
-        <pc:sldMkLst>
-          <pc:docMk/>
-          <pc:sldMk cId="1142221253" sldId="273"/>
-        </pc:sldMkLst>
-        <pc:spChg chg="mod">
-          <ac:chgData name="Ladislav Nagy" userId="b8f981e2ccf60262" providerId="Windows Live" clId="Web-{89234472-BDEA-4CAD-985D-8441D3BB3FBD}" dt="2024-11-25T19:36:58.120" v="373" actId="20577"/>
-          <ac:spMkLst>
-            <pc:docMk/>
-            <pc:sldMk cId="1142221253" sldId="273"/>
-            <ac:spMk id="2" creationId="{D14317BD-BB01-5DEA-766D-C3B8DA00A393}"/>
-          </ac:spMkLst>
-        </pc:spChg>
-        <pc:spChg chg="mod">
-          <ac:chgData name="Ladislav Nagy" userId="b8f981e2ccf60262" providerId="Windows Live" clId="Web-{89234472-BDEA-4CAD-985D-8441D3BB3FBD}" dt="2024-11-25T19:37:03.651" v="376" actId="20577"/>
-          <ac:spMkLst>
-            <pc:docMk/>
-            <pc:sldMk cId="1142221253" sldId="273"/>
-            <ac:spMk id="3" creationId="{DF890C83-B701-7C39-363E-EE3C4AA10EB8}"/>
-          </ac:spMkLst>
-        </pc:spChg>
-      </pc:sldChg>
-      <pc:sldChg chg="add del replId">
-        <pc:chgData name="Ladislav Nagy" userId="b8f981e2ccf60262" providerId="Windows Live" clId="Web-{89234472-BDEA-4CAD-985D-8441D3BB3FBD}" dt="2024-11-25T19:34:22.708" v="325"/>
-        <pc:sldMkLst>
-          <pc:docMk/>
-          <pc:sldMk cId="2968465358" sldId="273"/>
-        </pc:sldMkLst>
-      </pc:sldChg>
-      <pc:sldChg chg="modSp add replId">
-        <pc:chgData name="Ladislav Nagy" userId="b8f981e2ccf60262" providerId="Windows Live" clId="Web-{89234472-BDEA-4CAD-985D-8441D3BB3FBD}" dt="2024-11-25T19:37:35.699" v="390" actId="14100"/>
-        <pc:sldMkLst>
-          <pc:docMk/>
-          <pc:sldMk cId="134548107" sldId="274"/>
-        </pc:sldMkLst>
-        <pc:spChg chg="mod">
-          <ac:chgData name="Ladislav Nagy" userId="b8f981e2ccf60262" providerId="Windows Live" clId="Web-{89234472-BDEA-4CAD-985D-8441D3BB3FBD}" dt="2024-11-25T19:37:19.746" v="379" actId="20577"/>
-          <ac:spMkLst>
-            <pc:docMk/>
-            <pc:sldMk cId="134548107" sldId="274"/>
-            <ac:spMk id="2" creationId="{D14317BD-BB01-5DEA-766D-C3B8DA00A393}"/>
-          </ac:spMkLst>
-        </pc:spChg>
-        <pc:spChg chg="mod">
-          <ac:chgData name="Ladislav Nagy" userId="b8f981e2ccf60262" providerId="Windows Live" clId="Web-{89234472-BDEA-4CAD-985D-8441D3BB3FBD}" dt="2024-11-25T19:37:35.699" v="390" actId="14100"/>
-          <ac:spMkLst>
-            <pc:docMk/>
-            <pc:sldMk cId="134548107" sldId="274"/>
-            <ac:spMk id="3" creationId="{DF890C83-B701-7C39-363E-EE3C4AA10EB8}"/>
-          </ac:spMkLst>
-        </pc:spChg>
-      </pc:sldChg>
-      <pc:sldChg chg="add del replId">
-        <pc:chgData name="Ladislav Nagy" userId="b8f981e2ccf60262" providerId="Windows Live" clId="Web-{89234472-BDEA-4CAD-985D-8441D3BB3FBD}" dt="2024-11-25T19:34:21.849" v="324"/>
-        <pc:sldMkLst>
-          <pc:docMk/>
-          <pc:sldMk cId="1575268575" sldId="274"/>
-        </pc:sldMkLst>
-      </pc:sldChg>
-      <pc:sldChg chg="modSp add replId">
-        <pc:chgData name="Ladislav Nagy" userId="b8f981e2ccf60262" providerId="Windows Live" clId="Web-{89234472-BDEA-4CAD-985D-8441D3BB3FBD}" dt="2024-11-25T19:38:18.841" v="402" actId="20577"/>
-        <pc:sldMkLst>
-          <pc:docMk/>
-          <pc:sldMk cId="4133623028" sldId="275"/>
-        </pc:sldMkLst>
-        <pc:spChg chg="mod">
-          <ac:chgData name="Ladislav Nagy" userId="b8f981e2ccf60262" providerId="Windows Live" clId="Web-{89234472-BDEA-4CAD-985D-8441D3BB3FBD}" dt="2024-11-25T19:37:58.747" v="395" actId="20577"/>
-          <ac:spMkLst>
-            <pc:docMk/>
-            <pc:sldMk cId="4133623028" sldId="275"/>
-            <ac:spMk id="2" creationId="{D14317BD-BB01-5DEA-766D-C3B8DA00A393}"/>
-          </ac:spMkLst>
-        </pc:spChg>
-        <pc:spChg chg="mod">
-          <ac:chgData name="Ladislav Nagy" userId="b8f981e2ccf60262" providerId="Windows Live" clId="Web-{89234472-BDEA-4CAD-985D-8441D3BB3FBD}" dt="2024-11-25T19:38:18.841" v="402" actId="20577"/>
-          <ac:spMkLst>
-            <pc:docMk/>
-            <pc:sldMk cId="4133623028" sldId="275"/>
-            <ac:spMk id="3" creationId="{DF890C83-B701-7C39-363E-EE3C4AA10EB8}"/>
-          </ac:spMkLst>
-        </pc:spChg>
-      </pc:sldChg>
-      <pc:sldChg chg="addSp delSp modSp new mod setBg">
-        <pc:chgData name="Ladislav Nagy" userId="b8f981e2ccf60262" providerId="Windows Live" clId="Web-{89234472-BDEA-4CAD-985D-8441D3BB3FBD}" dt="2024-11-25T19:49:55.912" v="501" actId="20577"/>
-        <pc:sldMkLst>
-          <pc:docMk/>
-          <pc:sldMk cId="959329316" sldId="276"/>
-        </pc:sldMkLst>
-        <pc:spChg chg="add del mod">
-          <ac:chgData name="Ladislav Nagy" userId="b8f981e2ccf60262" providerId="Windows Live" clId="Web-{89234472-BDEA-4CAD-985D-8441D3BB3FBD}" dt="2024-11-25T19:48:36.706" v="495" actId="20577"/>
-          <ac:spMkLst>
-            <pc:docMk/>
-            <pc:sldMk cId="959329316" sldId="276"/>
-            <ac:spMk id="2" creationId="{44212C43-DB12-F0F1-50D0-52F487A78A47}"/>
-          </ac:spMkLst>
-        </pc:spChg>
-        <pc:spChg chg="add del">
-          <ac:chgData name="Ladislav Nagy" userId="b8f981e2ccf60262" providerId="Windows Live" clId="Web-{89234472-BDEA-4CAD-985D-8441D3BB3FBD}" dt="2024-11-25T19:47:59.798" v="443"/>
-          <ac:spMkLst>
-            <pc:docMk/>
-            <pc:sldMk cId="959329316" sldId="276"/>
-            <ac:spMk id="3" creationId="{1246173E-5740-0B8B-F3E1-964E31532252}"/>
-          </ac:spMkLst>
-        </pc:spChg>
-        <pc:spChg chg="add del mod">
-          <ac:chgData name="Ladislav Nagy" userId="b8f981e2ccf60262" providerId="Windows Live" clId="Web-{89234472-BDEA-4CAD-985D-8441D3BB3FBD}" dt="2024-11-25T19:47:55.658" v="440"/>
-          <ac:spMkLst>
-            <pc:docMk/>
-            <pc:sldMk cId="959329316" sldId="276"/>
-            <ac:spMk id="6" creationId="{3E1E3476-9865-42B9-624A-40759B108684}"/>
-          </ac:spMkLst>
-        </pc:spChg>
-        <pc:spChg chg="add mod">
-          <ac:chgData name="Ladislav Nagy" userId="b8f981e2ccf60262" providerId="Windows Live" clId="Web-{89234472-BDEA-4CAD-985D-8441D3BB3FBD}" dt="2024-11-25T19:49:55.912" v="501" actId="20577"/>
-          <ac:spMkLst>
-            <pc:docMk/>
-            <pc:sldMk cId="959329316" sldId="276"/>
-            <ac:spMk id="8" creationId="{10754B95-F5EC-9695-4CCF-62FD203E66DE}"/>
-          </ac:spMkLst>
-        </pc:spChg>
-        <pc:spChg chg="add del">
-          <ac:chgData name="Ladislav Nagy" userId="b8f981e2ccf60262" providerId="Windows Live" clId="Web-{89234472-BDEA-4CAD-985D-8441D3BB3FBD}" dt="2024-11-25T19:47:05.218" v="421"/>
-          <ac:spMkLst>
-            <pc:docMk/>
-            <pc:sldMk cId="959329316" sldId="276"/>
-            <ac:spMk id="9" creationId="{42A4FC2C-047E-45A5-965D-8E1E3BF09BC6}"/>
-          </ac:spMkLst>
-        </pc:spChg>
-        <pc:picChg chg="add del mod ord">
-          <ac:chgData name="Ladislav Nagy" userId="b8f981e2ccf60262" providerId="Windows Live" clId="Web-{89234472-BDEA-4CAD-985D-8441D3BB3FBD}" dt="2024-11-25T19:47:59.798" v="443"/>
-          <ac:picMkLst>
-            <pc:docMk/>
-            <pc:sldMk cId="959329316" sldId="276"/>
-            <ac:picMk id="4" creationId="{7D8B6D7B-340D-FAEC-9F92-6D5869EA55F8}"/>
-          </ac:picMkLst>
-        </pc:picChg>
-        <pc:picChg chg="add del mod">
-          <ac:chgData name="Ladislav Nagy" userId="b8f981e2ccf60262" providerId="Windows Live" clId="Web-{89234472-BDEA-4CAD-985D-8441D3BB3FBD}" dt="2024-11-25T19:47:53.470" v="438"/>
-          <ac:picMkLst>
-            <pc:docMk/>
-            <pc:sldMk cId="959329316" sldId="276"/>
-            <ac:picMk id="7" creationId="{8F881E19-6AE3-5F97-511F-9ADB6FCCA592}"/>
-          </ac:picMkLst>
-        </pc:picChg>
-      </pc:sldChg>
-      <pc:sldChg chg="addSp delSp modSp new del">
-        <pc:chgData name="Ladislav Nagy" userId="b8f981e2ccf60262" providerId="Windows Live" clId="Web-{89234472-BDEA-4CAD-985D-8441D3BB3FBD}" dt="2024-11-25T19:47:35.173" v="431"/>
-        <pc:sldMkLst>
-          <pc:docMk/>
-          <pc:sldMk cId="2725881028" sldId="277"/>
-        </pc:sldMkLst>
-        <pc:spChg chg="add del">
-          <ac:chgData name="Ladislav Nagy" userId="b8f981e2ccf60262" providerId="Windows Live" clId="Web-{89234472-BDEA-4CAD-985D-8441D3BB3FBD}" dt="2024-11-25T19:47:34.516" v="430"/>
-          <ac:spMkLst>
-            <pc:docMk/>
-            <pc:sldMk cId="2725881028" sldId="277"/>
-            <ac:spMk id="2" creationId="{498E9DE9-A22B-3C39-CDFF-74C56F692DE0}"/>
-          </ac:spMkLst>
-        </pc:spChg>
-        <pc:spChg chg="add del">
-          <ac:chgData name="Ladislav Nagy" userId="b8f981e2ccf60262" providerId="Windows Live" clId="Web-{89234472-BDEA-4CAD-985D-8441D3BB3FBD}" dt="2024-11-25T19:47:32.563" v="429"/>
-          <ac:spMkLst>
-            <pc:docMk/>
-            <pc:sldMk cId="2725881028" sldId="277"/>
-            <ac:spMk id="3" creationId="{BB812DF7-463A-951C-F972-0A949869786B}"/>
-          </ac:spMkLst>
-        </pc:spChg>
-        <pc:picChg chg="add del mod">
-          <ac:chgData name="Ladislav Nagy" userId="b8f981e2ccf60262" providerId="Windows Live" clId="Web-{89234472-BDEA-4CAD-985D-8441D3BB3FBD}" dt="2024-11-25T19:47:31.922" v="428"/>
-          <ac:picMkLst>
-            <pc:docMk/>
-            <pc:sldMk cId="2725881028" sldId="277"/>
-            <ac:picMk id="4" creationId="{8498BE91-5573-E420-0BA2-6C5C69E21F9B}"/>
-          </ac:picMkLst>
-        </pc:picChg>
-      </pc:sldChg>
-      <pc:sldChg chg="addSp delSp modSp new add del">
-        <pc:chgData name="Ladislav Nagy" userId="b8f981e2ccf60262" providerId="Windows Live" clId="Web-{89234472-BDEA-4CAD-985D-8441D3BB3FBD}" dt="2024-11-25T19:55:26.298" v="529" actId="1076"/>
-        <pc:sldMkLst>
-          <pc:docMk/>
-          <pc:sldMk cId="4050476310" sldId="277"/>
-        </pc:sldMkLst>
-        <pc:spChg chg="mod">
-          <ac:chgData name="Ladislav Nagy" userId="b8f981e2ccf60262" providerId="Windows Live" clId="Web-{89234472-BDEA-4CAD-985D-8441D3BB3FBD}" dt="2024-11-25T19:53:21.747" v="519" actId="20577"/>
-          <ac:spMkLst>
-            <pc:docMk/>
-            <pc:sldMk cId="4050476310" sldId="277"/>
-            <ac:spMk id="2" creationId="{BC2FA32E-6E40-06FB-6823-212775041441}"/>
-          </ac:spMkLst>
-        </pc:spChg>
-        <pc:spChg chg="add mod">
-          <ac:chgData name="Ladislav Nagy" userId="b8f981e2ccf60262" providerId="Windows Live" clId="Web-{89234472-BDEA-4CAD-985D-8441D3BB3FBD}" dt="2024-11-25T19:55:26.298" v="529" actId="1076"/>
-          <ac:spMkLst>
-            <pc:docMk/>
-            <pc:sldMk cId="4050476310" sldId="277"/>
-            <ac:spMk id="3" creationId="{29DF8FE9-27C3-878D-45A3-9490CFA51902}"/>
-          </ac:spMkLst>
-        </pc:spChg>
-        <pc:spChg chg="del">
-          <ac:chgData name="Ladislav Nagy" userId="b8f981e2ccf60262" providerId="Windows Live" clId="Web-{89234472-BDEA-4CAD-985D-8441D3BB3FBD}" dt="2024-11-25T19:52:21.916" v="509"/>
-          <ac:spMkLst>
-            <pc:docMk/>
-            <pc:sldMk cId="4050476310" sldId="277"/>
-            <ac:spMk id="3" creationId="{817ED3B6-D6FE-CAC7-840C-07E5BF39B354}"/>
-          </ac:spMkLst>
-        </pc:spChg>
-        <pc:picChg chg="add mod">
-          <ac:chgData name="Ladislav Nagy" userId="b8f981e2ccf60262" providerId="Windows Live" clId="Web-{89234472-BDEA-4CAD-985D-8441D3BB3FBD}" dt="2024-11-25T19:54:46.937" v="523" actId="1076"/>
-          <ac:picMkLst>
-            <pc:docMk/>
-            <pc:sldMk cId="4050476310" sldId="277"/>
-            <ac:picMk id="4" creationId="{82A05EF9-485C-99BB-DC37-5EA87A4D0C1E}"/>
-          </ac:picMkLst>
-        </pc:picChg>
-      </pc:sldChg>
-    </pc:docChg>
-  </pc:docChgLst>
-  <pc:docChgLst>
-    <pc:chgData name="Martin Znamenáček" userId="33331470d373d797" providerId="Windows Live" clId="Web-{327C7DE0-5C83-46D1-B8FF-FA61CBA6BB92}"/>
-    <pc:docChg chg="modSld">
-      <pc:chgData name="Martin Znamenáček" userId="33331470d373d797" providerId="Windows Live" clId="Web-{327C7DE0-5C83-46D1-B8FF-FA61CBA6BB92}" dt="2024-11-25T22:34:59.689" v="10"/>
-      <pc:docMkLst>
-        <pc:docMk/>
-      </pc:docMkLst>
-      <pc:sldChg chg="modSp">
-        <pc:chgData name="Martin Znamenáček" userId="33331470d373d797" providerId="Windows Live" clId="Web-{327C7DE0-5C83-46D1-B8FF-FA61CBA6BB92}" dt="2024-11-25T22:33:33.483" v="1" actId="20577"/>
-        <pc:sldMkLst>
-          <pc:docMk/>
-          <pc:sldMk cId="297826942" sldId="259"/>
-        </pc:sldMkLst>
-        <pc:spChg chg="mod">
-          <ac:chgData name="Martin Znamenáček" userId="33331470d373d797" providerId="Windows Live" clId="Web-{327C7DE0-5C83-46D1-B8FF-FA61CBA6BB92}" dt="2024-11-25T22:33:33.483" v="1" actId="20577"/>
-          <ac:spMkLst>
-            <pc:docMk/>
-            <pc:sldMk cId="297826942" sldId="259"/>
-            <ac:spMk id="3" creationId="{D488303E-288C-652B-FD3A-A8A593001CE1}"/>
-          </ac:spMkLst>
-        </pc:spChg>
-      </pc:sldChg>
-      <pc:sldChg chg="addSp modSp">
-        <pc:chgData name="Martin Znamenáček" userId="33331470d373d797" providerId="Windows Live" clId="Web-{327C7DE0-5C83-46D1-B8FF-FA61CBA6BB92}" dt="2024-11-25T22:34:59.689" v="10"/>
-        <pc:sldMkLst>
-          <pc:docMk/>
-          <pc:sldMk cId="4287060232" sldId="260"/>
-        </pc:sldMkLst>
-        <pc:spChg chg="mod">
-          <ac:chgData name="Martin Znamenáček" userId="33331470d373d797" providerId="Windows Live" clId="Web-{327C7DE0-5C83-46D1-B8FF-FA61CBA6BB92}" dt="2024-11-25T22:34:13.250" v="9" actId="20577"/>
-          <ac:spMkLst>
-            <pc:docMk/>
-            <pc:sldMk cId="4287060232" sldId="260"/>
-            <ac:spMk id="3" creationId="{6727F3E9-FD26-C2B8-789C-D06C94AD34BB}"/>
-          </ac:spMkLst>
-        </pc:spChg>
-        <pc:picChg chg="add mod">
-          <ac:chgData name="Martin Znamenáček" userId="33331470d373d797" providerId="Windows Live" clId="Web-{327C7DE0-5C83-46D1-B8FF-FA61CBA6BB92}" dt="2024-11-25T22:34:59.689" v="10"/>
-          <ac:picMkLst>
-            <pc:docMk/>
-            <pc:sldMk cId="4287060232" sldId="260"/>
-            <ac:picMk id="4" creationId="{4A15A527-BCF7-C39E-C441-149E0FC387CB}"/>
-          </ac:picMkLst>
-        </pc:picChg>
       </pc:sldChg>
     </pc:docChg>
   </pc:docChgLst>
@@ -3434,7 +1880,7 @@
           <a:p>
             <a:fld id="{A7B31F36-5B80-4F82-BDCD-64AC3EB04396}" type="datetimeFigureOut">
               <a:rPr lang="cs-CZ" smtClean="0"/>
-              <a:t>10.12.2024</a:t>
+              <a:t>02.01.2025</a:t>
             </a:fld>
             <a:endParaRPr lang="cs-CZ"/>
           </a:p>
@@ -3855,7 +2301,7 @@
           <a:p>
             <a:fld id="{8D5D83F1-BF6E-4A98-8153-BAC9ABDE7CE3}" type="datetimeFigureOut">
               <a:rPr lang="en-US" dirty="0"/>
-              <a:t>12/10/2024</a:t>
+              <a:t>1/2/2025</a:t>
             </a:fld>
             <a:endParaRPr lang="en-US"/>
           </a:p>
@@ -4073,7 +2519,7 @@
           <a:p>
             <a:fld id="{ED9BE5A2-57A1-4629-B29D-D386573AF9F3}" type="datetimeFigureOut">
               <a:rPr lang="en-US" dirty="0"/>
-              <a:t>12/10/2024</a:t>
+              <a:t>1/2/2025</a:t>
             </a:fld>
             <a:endParaRPr lang="en-US"/>
           </a:p>
@@ -4285,7 +2731,7 @@
           <a:p>
             <a:fld id="{A3A72485-1B57-41B4-A998-97848CC136C2}" type="datetimeFigureOut">
               <a:rPr lang="en-US" dirty="0"/>
-              <a:t>12/10/2024</a:t>
+              <a:t>1/2/2025</a:t>
             </a:fld>
             <a:endParaRPr lang="en-US"/>
           </a:p>
@@ -4487,7 +2933,7 @@
           <a:p>
             <a:fld id="{BA576E92-E5C8-4FF8-B2BE-A516F6A1724E}" type="datetimeFigureOut">
               <a:rPr lang="en-US" dirty="0"/>
-              <a:t>12/10/2024</a:t>
+              <a:t>1/2/2025</a:t>
             </a:fld>
             <a:endParaRPr lang="en-US"/>
           </a:p>
@@ -4770,7 +3216,7 @@
           <a:p>
             <a:fld id="{06DDB232-C681-46A2-B21F-2BD21E9CA134}" type="datetimeFigureOut">
               <a:rPr lang="en-US" dirty="0"/>
-              <a:t>12/10/2024</a:t>
+              <a:t>1/2/2025</a:t>
             </a:fld>
             <a:endParaRPr lang="en-US"/>
           </a:p>
@@ -5039,7 +3485,7 @@
           <a:p>
             <a:fld id="{30ABE26E-66F9-4E5F-9E07-CA7CDB200281}" type="datetimeFigureOut">
               <a:rPr lang="en-US" dirty="0"/>
-              <a:t>12/10/2024</a:t>
+              <a:t>1/2/2025</a:t>
             </a:fld>
             <a:endParaRPr lang="en-US"/>
           </a:p>
@@ -5459,7 +3905,7 @@
           <a:p>
             <a:fld id="{85A1A01C-F286-49E7-998E-3D5BB613F99A}" type="datetimeFigureOut">
               <a:rPr lang="en-US" dirty="0"/>
-              <a:t>12/10/2024</a:t>
+              <a:t>1/2/2025</a:t>
             </a:fld>
             <a:endParaRPr lang="en-US"/>
           </a:p>
@@ -5604,7 +4050,7 @@
           <a:p>
             <a:fld id="{B7CC2C0A-F771-42D9-AAB0-90C3A2B0FEAD}" type="datetimeFigureOut">
               <a:rPr lang="en-US" dirty="0"/>
-              <a:t>12/10/2024</a:t>
+              <a:t>1/2/2025</a:t>
             </a:fld>
             <a:endParaRPr lang="en-US"/>
           </a:p>
@@ -5721,7 +4167,7 @@
           <a:p>
             <a:fld id="{2CA2A270-409D-4410-9649-B7481576446C}" type="datetimeFigureOut">
               <a:rPr lang="en-US" dirty="0"/>
-              <a:t>12/10/2024</a:t>
+              <a:t>1/2/2025</a:t>
             </a:fld>
             <a:endParaRPr lang="en-US"/>
           </a:p>
@@ -6038,7 +4484,7 @@
           <a:p>
             <a:fld id="{42200AA3-798A-4433-8927-6E115914B6EF}" type="datetimeFigureOut">
               <a:rPr lang="en-US" dirty="0"/>
-              <a:t>12/10/2024</a:t>
+              <a:t>1/2/2025</a:t>
             </a:fld>
             <a:endParaRPr lang="en-US"/>
           </a:p>
@@ -6330,7 +4776,7 @@
           <a:p>
             <a:fld id="{36322871-0F85-43DC-99D7-CA8E7437E2EC}" type="datetimeFigureOut">
               <a:rPr lang="en-US" dirty="0"/>
-              <a:t>12/10/2024</a:t>
+              <a:t>1/2/2025</a:t>
             </a:fld>
             <a:endParaRPr lang="en-US"/>
           </a:p>
@@ -6573,7 +5019,7 @@
           <a:p>
             <a:fld id="{E857DF4D-D974-434D-9D64-40B7405DF5F0}" type="datetimeFigureOut">
               <a:rPr lang="en-US" dirty="0"/>
-              <a:t>12/10/2024</a:t>
+              <a:t>1/2/2025</a:t>
             </a:fld>
             <a:endParaRPr lang="en-US"/>
           </a:p>
@@ -7077,28 +5523,33 @@
             <p:ph type="ctrTitle"/>
           </p:nvPr>
         </p:nvSpPr>
-        <p:spPr/>
+        <p:spPr>
+          <a:xfrm>
+            <a:off x="912629" y="1371600"/>
+            <a:ext cx="5935540" cy="1490472"/>
+          </a:xfrm>
+        </p:spPr>
         <p:txBody>
           <a:bodyPr/>
           <a:lstStyle/>
           <a:p>
             <a:r>
-              <a:rPr lang="cs-CZ" b="1"/>
+              <a:rPr lang="cs-CZ" b="1" dirty="0"/>
               <a:t>SIS - </a:t>
             </a:r>
             <a:r>
-              <a:rPr lang="cs-CZ" b="1" err="1"/>
+              <a:rPr lang="cs-CZ" b="1" dirty="0" err="1"/>
               <a:t>Scheduling</a:t>
             </a:r>
             <a:r>
-              <a:rPr lang="cs-CZ" b="1"/>
+              <a:rPr lang="cs-CZ" b="1" dirty="0"/>
               <a:t> Module</a:t>
             </a:r>
             <a:br>
-              <a:rPr lang="en-US"/>
+              <a:rPr lang="en-US" dirty="0"/>
             </a:br>
             <a:r>
-              <a:rPr lang="cs-CZ" sz="2800"/>
+              <a:rPr lang="cs-CZ" sz="2800" dirty="0"/>
               <a:t>(NSWI130)</a:t>
             </a:r>
           </a:p>
@@ -7414,7 +5865,7 @@
           <a:p>
             <a:fld id="{4B6FBA7B-94AE-4930-8112-15497947B4E0}" type="datetime1">
               <a:rPr lang="en-US" smtClean="0"/>
-              <a:t>12/10/2024</a:t>
+              <a:t>1/2/2025</a:t>
             </a:fld>
             <a:endParaRPr lang="en-US"/>
           </a:p>
@@ -7793,101 +6244,156 @@
           <a:p>
             <a:pPr algn="l"/>
             <a:r>
+              <a:rPr lang="cs-CZ" sz="1800" dirty="0">
+                <a:solidFill>
+                  <a:srgbClr val="000000"/>
+                </a:solidFill>
+                <a:latin typeface="+mj-lt"/>
+              </a:rPr>
+              <a:t>P</a:t>
+            </a:r>
+            <a:r>
               <a:rPr lang="en-US" sz="1800" b="0" i="0" dirty="0">
                 <a:solidFill>
                   <a:srgbClr val="000000"/>
                 </a:solidFill>
                 <a:effectLst/>
-                <a:latin typeface="Calibri" panose="020F0502020204030204" pitchFamily="34" charset="0"/>
+                <a:latin typeface="+mj-lt"/>
               </a:rPr>
-              <a:t>present n quality requirement scenarios, one per team member, and for each explain:</a:t>
+              <a:t>resent n quality requirement scenarios, one per team member, and for each explain:</a:t>
             </a:r>
             <a:endParaRPr lang="en-US" b="0" i="0" dirty="0">
               <a:solidFill>
                 <a:srgbClr val="000000"/>
               </a:solidFill>
               <a:effectLst/>
-              <a:latin typeface="Calibri" panose="020F0502020204030204" pitchFamily="34" charset="0"/>
+              <a:latin typeface="+mj-lt"/>
             </a:endParaRPr>
           </a:p>
           <a:p>
-            <a:pPr algn="l"/>
-            <a:r>
-              <a:rPr lang="en-US" sz="1800" b="0" i="0" dirty="0">
+            <a:pPr lvl="1"/>
+            <a:r>
+              <a:rPr lang="cs-CZ" sz="1600" dirty="0">
+                <a:solidFill>
+                  <a:srgbClr val="000000"/>
+                </a:solidFill>
+                <a:latin typeface="+mj-lt"/>
+              </a:rPr>
+              <a:t>W</a:t>
+            </a:r>
+            <a:r>
+              <a:rPr lang="en-US" sz="1600" b="0" i="0" dirty="0">
                 <a:solidFill>
                   <a:srgbClr val="000000"/>
                 </a:solidFill>
                 <a:effectLst/>
-                <a:latin typeface="Calibri" panose="020F0502020204030204" pitchFamily="34" charset="0"/>
+                <a:latin typeface="+mj-lt"/>
               </a:rPr>
-              <a:t>what quality attribute it is</a:t>
+              <a:t>hat quality attribute it is</a:t>
             </a:r>
             <a:endParaRPr lang="en-US" b="0" i="0" dirty="0">
               <a:solidFill>
                 <a:srgbClr val="000000"/>
               </a:solidFill>
               <a:effectLst/>
-              <a:latin typeface="Calibri" panose="020F0502020204030204" pitchFamily="34" charset="0"/>
+              <a:latin typeface="+mj-lt"/>
             </a:endParaRPr>
           </a:p>
           <a:p>
-            <a:pPr algn="l"/>
-            <a:r>
-              <a:rPr lang="en-US" sz="1800" b="0" i="0" dirty="0">
+            <a:pPr lvl="1"/>
+            <a:r>
+              <a:rPr lang="cs-CZ" sz="1600" dirty="0">
+                <a:solidFill>
+                  <a:srgbClr val="000000"/>
+                </a:solidFill>
+                <a:latin typeface="+mj-lt"/>
+              </a:rPr>
+              <a:t>W</a:t>
+            </a:r>
+            <a:r>
+              <a:rPr lang="en-US" sz="1600" b="0" i="0" dirty="0">
                 <a:solidFill>
                   <a:srgbClr val="000000"/>
                 </a:solidFill>
                 <a:effectLst/>
-                <a:latin typeface="Calibri" panose="020F0502020204030204" pitchFamily="34" charset="0"/>
+                <a:latin typeface="+mj-lt"/>
               </a:rPr>
-              <a:t>who worked on it (only have it on the slide, do not read it)</a:t>
+              <a:t>ho worked on it (only have it on the slide, do not read it)</a:t>
             </a:r>
             <a:endParaRPr lang="en-US" b="0" i="0" dirty="0">
               <a:solidFill>
                 <a:srgbClr val="000000"/>
               </a:solidFill>
               <a:effectLst/>
-              <a:latin typeface="Calibri" panose="020F0502020204030204" pitchFamily="34" charset="0"/>
+              <a:latin typeface="+mj-lt"/>
             </a:endParaRPr>
           </a:p>
           <a:p>
-            <a:pPr algn="l"/>
-            <a:r>
-              <a:rPr lang="en-US" sz="1800" b="0" i="0" dirty="0">
+            <a:pPr lvl="1"/>
+            <a:r>
+              <a:rPr lang="cs-CZ" sz="1600" dirty="0">
+                <a:solidFill>
+                  <a:srgbClr val="000000"/>
+                </a:solidFill>
+                <a:latin typeface="+mj-lt"/>
+              </a:rPr>
+              <a:t>S</a:t>
+            </a:r>
+            <a:r>
+              <a:rPr lang="en-US" sz="1600" b="0" i="0" dirty="0">
                 <a:solidFill>
                   <a:srgbClr val="000000"/>
                 </a:solidFill>
                 <a:effectLst/>
-                <a:latin typeface="Calibri" panose="020F0502020204030204" pitchFamily="34" charset="0"/>
+                <a:latin typeface="+mj-lt"/>
               </a:rPr>
-              <a:t>show and explain the scenario</a:t>
+              <a:t>how and explain the scenario</a:t>
             </a:r>
             <a:endParaRPr lang="en-US" b="0" i="0" dirty="0">
               <a:solidFill>
                 <a:srgbClr val="000000"/>
               </a:solidFill>
               <a:effectLst/>
-              <a:latin typeface="Calibri" panose="020F0502020204030204" pitchFamily="34" charset="0"/>
+              <a:latin typeface="+mj-lt"/>
             </a:endParaRPr>
           </a:p>
           <a:p>
-            <a:pPr algn="l"/>
-            <a:r>
-              <a:rPr lang="en-US" sz="1800" b="0" i="0" dirty="0">
+            <a:pPr lvl="1"/>
+            <a:r>
+              <a:rPr lang="cs-CZ" sz="1600" dirty="0">
+                <a:solidFill>
+                  <a:srgbClr val="000000"/>
+                </a:solidFill>
+                <a:latin typeface="+mj-lt"/>
+              </a:rPr>
+              <a:t>E</a:t>
+            </a:r>
+            <a:r>
+              <a:rPr lang="en-US" sz="1600" b="0" i="0" dirty="0" err="1">
                 <a:solidFill>
                   <a:srgbClr val="000000"/>
                 </a:solidFill>
                 <a:effectLst/>
-                <a:latin typeface="Calibri" panose="020F0502020204030204" pitchFamily="34" charset="0"/>
+                <a:latin typeface="+mj-lt"/>
               </a:rPr>
-              <a:t>explain its impact on the architecture (Is there an impact? If no, why? If yes, show the updated part of the architecture and explain)</a:t>
+              <a:t>xplain</a:t>
+            </a:r>
+            <a:r>
+              <a:rPr lang="en-US" sz="1600" b="0" i="0" dirty="0">
+                <a:solidFill>
+                  <a:srgbClr val="000000"/>
+                </a:solidFill>
+                <a:effectLst/>
+                <a:latin typeface="+mj-lt"/>
+              </a:rPr>
+              <a:t> its impact on the architecture (Is there an impact? If no, why? If yes, show the updated part of the architecture and explain)</a:t>
             </a:r>
             <a:endParaRPr lang="en-US" b="0" i="0" dirty="0">
               <a:solidFill>
                 <a:srgbClr val="000000"/>
               </a:solidFill>
               <a:effectLst/>
-              <a:latin typeface="Calibri" panose="020F0502020204030204" pitchFamily="34" charset="0"/>
+              <a:latin typeface="+mj-lt"/>
             </a:endParaRPr>
           </a:p>
         </p:txBody>
@@ -7915,7 +6421,7 @@
           <a:p>
             <a:fld id="{37E73D44-82E8-4637-8D61-FC7F8A1079A8}" type="datetime1">
               <a:rPr lang="en-US" smtClean="0"/>
-              <a:t>12/10/2024</a:t>
+              <a:t>1/2/2025</a:t>
             </a:fld>
             <a:endParaRPr lang="en-US"/>
           </a:p>
@@ -8027,38 +6533,242 @@
         </p:nvSpPr>
         <p:spPr/>
         <p:txBody>
-          <a:bodyPr/>
-          <a:lstStyle/>
-          <a:p>
+          <a:bodyPr>
+            <a:normAutofit/>
+          </a:bodyPr>
+          <a:lstStyle/>
+          <a:p>
+            <a:r>
+              <a:rPr lang="cs-CZ" dirty="0" err="1">
+                <a:solidFill>
+                  <a:srgbClr val="000000"/>
+                </a:solidFill>
+                <a:ea typeface="+mj-lt"/>
+                <a:cs typeface="+mj-lt"/>
+              </a:rPr>
+              <a:t>Scenario</a:t>
+            </a:r>
+            <a:r>
+              <a:rPr lang="cs-CZ" dirty="0">
+                <a:solidFill>
+                  <a:srgbClr val="000000"/>
+                </a:solidFill>
+                <a:ea typeface="+mj-lt"/>
+                <a:cs typeface="+mj-lt"/>
+              </a:rPr>
+              <a:t>: Database </a:t>
+            </a:r>
+            <a:r>
+              <a:rPr lang="cs-CZ" dirty="0" err="1">
+                <a:solidFill>
+                  <a:srgbClr val="000000"/>
+                </a:solidFill>
+                <a:ea typeface="+mj-lt"/>
+                <a:cs typeface="+mj-lt"/>
+              </a:rPr>
+              <a:t>High</a:t>
+            </a:r>
+            <a:r>
+              <a:rPr lang="cs-CZ" dirty="0">
+                <a:solidFill>
+                  <a:srgbClr val="000000"/>
+                </a:solidFill>
+                <a:ea typeface="+mj-lt"/>
+                <a:cs typeface="+mj-lt"/>
+              </a:rPr>
+              <a:t> </a:t>
+            </a:r>
+            <a:r>
+              <a:rPr lang="cs-CZ" dirty="0" err="1">
+                <a:solidFill>
+                  <a:srgbClr val="000000"/>
+                </a:solidFill>
+                <a:ea typeface="+mj-lt"/>
+                <a:cs typeface="+mj-lt"/>
+              </a:rPr>
+              <a:t>Availability</a:t>
+            </a:r>
+            <a:endParaRPr lang="cs-CZ" dirty="0" err="1"/>
+          </a:p>
+        </p:txBody>
+      </p:sp>
+      <p:sp>
+        <p:nvSpPr>
+          <p:cNvPr id="3" name="Content Placeholder 2">
+            <a:extLst>
+              <a:ext uri="{FF2B5EF4-FFF2-40B4-BE49-F238E27FC236}">
+                <a16:creationId xmlns:a16="http://schemas.microsoft.com/office/drawing/2014/main" id="{AB5B809E-FA80-65CD-9D41-29A068B11936}"/>
+              </a:ext>
+            </a:extLst>
+          </p:cNvPr>
+          <p:cNvSpPr>
+            <a:spLocks noGrp="1"/>
+          </p:cNvSpPr>
+          <p:nvPr>
+            <p:ph idx="1"/>
+          </p:nvPr>
+        </p:nvSpPr>
+        <p:spPr>
+          <a:xfrm>
+            <a:off x="914399" y="2559171"/>
+            <a:ext cx="4761089" cy="3368547"/>
+          </a:xfrm>
+        </p:spPr>
+        <p:txBody>
+          <a:bodyPr vert="horz" lIns="91440" tIns="45720" rIns="91440" bIns="45720" rtlCol="0" anchor="t">
+            <a:normAutofit/>
+          </a:bodyPr>
+          <a:lstStyle/>
+          <a:p>
+            <a:r>
+              <a:rPr lang="cs-CZ" dirty="0" err="1"/>
+              <a:t>Quality</a:t>
+            </a:r>
             <a:r>
               <a:rPr lang="cs-CZ" dirty="0"/>
-              <a:t>Scenario</a:t>
-            </a:r>
-          </a:p>
-        </p:txBody>
-      </p:sp>
-      <p:sp>
-        <p:nvSpPr>
-          <p:cNvPr id="3" name="Content Placeholder 2">
-            <a:extLst>
-              <a:ext uri="{FF2B5EF4-FFF2-40B4-BE49-F238E27FC236}">
-                <a16:creationId xmlns:a16="http://schemas.microsoft.com/office/drawing/2014/main" id="{AB5B809E-FA80-65CD-9D41-29A068B11936}"/>
-              </a:ext>
-            </a:extLst>
-          </p:cNvPr>
-          <p:cNvSpPr>
-            <a:spLocks noGrp="1"/>
-          </p:cNvSpPr>
-          <p:nvPr>
-            <p:ph idx="1"/>
-          </p:nvPr>
-        </p:nvSpPr>
-        <p:spPr/>
-        <p:txBody>
-          <a:bodyPr/>
-          <a:lstStyle/>
-          <a:p>
-            <a:endParaRPr lang="cs-CZ"/>
+              <a:t> </a:t>
+            </a:r>
+            <a:r>
+              <a:rPr lang="cs-CZ" dirty="0" err="1"/>
+              <a:t>attribute</a:t>
+            </a:r>
+            <a:r>
+              <a:rPr lang="cs-CZ" dirty="0"/>
+              <a:t>: </a:t>
+            </a:r>
+            <a:r>
+              <a:rPr lang="cs-CZ" dirty="0" err="1">
+                <a:solidFill>
+                  <a:schemeClr val="tx2">
+                    <a:lumMod val="49000"/>
+                    <a:lumOff val="51000"/>
+                  </a:schemeClr>
+                </a:solidFill>
+              </a:rPr>
+              <a:t>Availability</a:t>
+            </a:r>
+            <a:endParaRPr lang="cs-CZ" dirty="0">
+              <a:solidFill>
+                <a:schemeClr val="tx2">
+                  <a:lumMod val="49000"/>
+                  <a:lumOff val="51000"/>
+                </a:schemeClr>
+              </a:solidFill>
+            </a:endParaRPr>
+          </a:p>
+          <a:p>
+            <a:r>
+              <a:rPr lang="cs-CZ" dirty="0" err="1"/>
+              <a:t>Result</a:t>
+            </a:r>
+            <a:r>
+              <a:rPr lang="cs-CZ" dirty="0"/>
+              <a:t>: </a:t>
+            </a:r>
+            <a:r>
+              <a:rPr lang="cs-CZ" dirty="0" err="1">
+                <a:solidFill>
+                  <a:srgbClr val="FF0000"/>
+                </a:solidFill>
+              </a:rPr>
+              <a:t>Failed</a:t>
+            </a:r>
+            <a:endParaRPr lang="cs-CZ" dirty="0">
+              <a:solidFill>
+                <a:srgbClr val="FF0000"/>
+              </a:solidFill>
+            </a:endParaRPr>
+          </a:p>
+          <a:p>
+            <a:r>
+              <a:rPr lang="cs-CZ" dirty="0" err="1"/>
+              <a:t>Solution</a:t>
+            </a:r>
+            <a:r>
+              <a:rPr lang="cs-CZ" dirty="0"/>
+              <a:t>: </a:t>
+            </a:r>
+            <a:r>
+              <a:rPr lang="cs-CZ" dirty="0" err="1"/>
+              <a:t>Create</a:t>
+            </a:r>
+            <a:r>
+              <a:rPr lang="cs-CZ" dirty="0"/>
+              <a:t> </a:t>
+            </a:r>
+            <a:r>
+              <a:rPr lang="cs-CZ" b="1" dirty="0"/>
+              <a:t>master-</a:t>
+            </a:r>
+            <a:r>
+              <a:rPr lang="cs-CZ" b="1" dirty="0" err="1"/>
+              <a:t>slave</a:t>
+            </a:r>
+            <a:r>
+              <a:rPr lang="cs-CZ" dirty="0"/>
+              <a:t> </a:t>
+            </a:r>
+            <a:r>
+              <a:rPr lang="cs-CZ" dirty="0" err="1"/>
+              <a:t>databases</a:t>
+            </a:r>
+            <a:r>
+              <a:rPr lang="cs-CZ" dirty="0"/>
+              <a:t> and use </a:t>
+            </a:r>
+            <a:r>
+              <a:rPr lang="cs-CZ" dirty="0">
+                <a:ea typeface="+mn-lt"/>
+                <a:cs typeface="+mn-lt"/>
+              </a:rPr>
+              <a:t>DBMS</a:t>
+            </a:r>
+            <a:r>
+              <a:rPr lang="cs-CZ" dirty="0"/>
+              <a:t> </a:t>
+            </a:r>
+            <a:r>
+              <a:rPr lang="cs-CZ" dirty="0" err="1"/>
+              <a:t>with</a:t>
+            </a:r>
+            <a:r>
+              <a:rPr lang="cs-CZ" dirty="0"/>
+              <a:t> </a:t>
+            </a:r>
+            <a:r>
+              <a:rPr lang="cs-CZ" dirty="0" err="1"/>
+              <a:t>automatic</a:t>
+            </a:r>
+            <a:r>
+              <a:rPr lang="cs-CZ" dirty="0"/>
+              <a:t> </a:t>
+            </a:r>
+            <a:r>
+              <a:rPr lang="cs-CZ" b="1" dirty="0" err="1"/>
+              <a:t>failover</a:t>
+            </a:r>
+            <a:r>
+              <a:rPr lang="cs-CZ" b="1" dirty="0"/>
+              <a:t> support</a:t>
+            </a:r>
+            <a:r>
+              <a:rPr lang="cs-CZ" dirty="0"/>
+              <a:t> (</a:t>
+            </a:r>
+            <a:r>
+              <a:rPr lang="cs-CZ" dirty="0" err="1"/>
+              <a:t>PostgreSQL</a:t>
+            </a:r>
+            <a:r>
+              <a:rPr lang="cs-CZ" dirty="0"/>
+              <a:t>)</a:t>
+            </a:r>
+          </a:p>
+          <a:p>
+            <a:pPr marL="0" indent="0">
+              <a:buNone/>
+            </a:pPr>
+            <a:endParaRPr lang="cs-CZ" dirty="0"/>
           </a:p>
         </p:txBody>
       </p:sp>
@@ -8085,7 +6795,7 @@
           <a:p>
             <a:fld id="{C8FC608C-7E85-40AC-B31E-0D00EC96515D}" type="datetime1">
               <a:rPr lang="en-US" smtClean="0"/>
-              <a:t>12/10/2024</a:t>
+              <a:t>1/2/2025</a:t>
             </a:fld>
             <a:endParaRPr lang="en-US"/>
           </a:p>
@@ -8184,6 +6894,36 @@
           </a:p>
         </p:txBody>
       </p:sp>
+      <p:pic>
+        <p:nvPicPr>
+          <p:cNvPr id="10" name="Obrázek 9" descr="Obsah obrázku text, snímek obrazovky, design&#10;&#10;Popis se vygeneroval automaticky.">
+            <a:extLst>
+              <a:ext uri="{FF2B5EF4-FFF2-40B4-BE49-F238E27FC236}">
+                <a16:creationId xmlns:a16="http://schemas.microsoft.com/office/drawing/2014/main" id="{6751A2E9-842B-2416-5D90-5C0AFA9D01B5}"/>
+              </a:ext>
+            </a:extLst>
+          </p:cNvPr>
+          <p:cNvPicPr>
+            <a:picLocks noChangeAspect="1"/>
+          </p:cNvPicPr>
+          <p:nvPr/>
+        </p:nvPicPr>
+        <p:blipFill>
+          <a:blip r:embed="rId2"/>
+          <a:stretch>
+            <a:fillRect/>
+          </a:stretch>
+        </p:blipFill>
+        <p:spPr>
+          <a:xfrm>
+            <a:off x="5538611" y="2556849"/>
+            <a:ext cx="6208890" cy="3360024"/>
+          </a:xfrm>
+          <a:prstGeom prst="rect">
+            <a:avLst/>
+          </a:prstGeom>
+        </p:spPr>
+      </p:pic>
     </p:spTree>
     <p:extLst>
       <p:ext uri="{BB962C8B-B14F-4D97-AF65-F5344CB8AC3E}">
@@ -8296,7 +7036,7 @@
           <a:p>
             <a:fld id="{C8FC608C-7E85-40AC-B31E-0D00EC96515D}" type="datetime1">
               <a:rPr lang="en-US" smtClean="0"/>
-              <a:t>12/10/2024</a:t>
+              <a:t>1/2/2025</a:t>
             </a:fld>
             <a:endParaRPr lang="en-US"/>
           </a:p>
@@ -8507,7 +7247,7 @@
           <a:p>
             <a:fld id="{C8FC608C-7E85-40AC-B31E-0D00EC96515D}" type="datetime1">
               <a:rPr lang="en-US" smtClean="0"/>
-              <a:t>12/10/2024</a:t>
+              <a:t>1/2/2025</a:t>
             </a:fld>
             <a:endParaRPr lang="en-US"/>
           </a:p>
@@ -8721,7 +7461,7 @@
           <a:p>
             <a:fld id="{C8FC608C-7E85-40AC-B31E-0D00EC96515D}" type="datetime1">
               <a:rPr lang="en-US" smtClean="0"/>
-              <a:t>12/10/2024</a:t>
+              <a:t>1/2/2025</a:t>
             </a:fld>
             <a:endParaRPr lang="en-US"/>
           </a:p>
@@ -8878,8 +7618,36 @@
           <a:lstStyle/>
           <a:p>
             <a:r>
+              <a:rPr lang="cs-CZ" dirty="0" err="1"/>
+              <a:t>Scenario</a:t>
+            </a:r>
+            <a:r>
               <a:rPr lang="cs-CZ" dirty="0"/>
-              <a:t>Scenario</a:t>
+              <a:t>: </a:t>
+            </a:r>
+            <a:r>
+              <a:rPr lang="cs-CZ" dirty="0" err="1"/>
+              <a:t>High-Frequency</a:t>
+            </a:r>
+            <a:r>
+              <a:rPr lang="cs-CZ" dirty="0"/>
+              <a:t> </a:t>
+            </a:r>
+            <a:r>
+              <a:rPr lang="cs-CZ" dirty="0" err="1"/>
+              <a:t>Batch</a:t>
+            </a:r>
+            <a:r>
+              <a:rPr lang="cs-CZ" dirty="0"/>
+              <a:t> </a:t>
+            </a:r>
+            <a:r>
+              <a:rPr lang="cs-CZ" dirty="0" err="1"/>
+              <a:t>Enrollment</a:t>
+            </a:r>
+            <a:r>
+              <a:rPr lang="cs-CZ" dirty="0"/>
+              <a:t> </a:t>
             </a:r>
           </a:p>
         </p:txBody>
@@ -8900,12 +7668,100 @@
             <p:ph idx="1"/>
           </p:nvPr>
         </p:nvSpPr>
-        <p:spPr/>
-        <p:txBody>
-          <a:bodyPr/>
-          <a:lstStyle/>
-          <a:p>
-            <a:endParaRPr lang="cs-CZ"/>
+        <p:spPr>
+          <a:xfrm>
+            <a:off x="912628" y="2170049"/>
+            <a:ext cx="10436600" cy="2128781"/>
+          </a:xfrm>
+        </p:spPr>
+        <p:txBody>
+          <a:bodyPr>
+            <a:normAutofit/>
+          </a:bodyPr>
+          <a:lstStyle/>
+          <a:p>
+            <a:r>
+              <a:rPr lang="cs-CZ" b="1" dirty="0"/>
+              <a:t>Run-</a:t>
+            </a:r>
+            <a:r>
+              <a:rPr lang="cs-CZ" b="1" dirty="0" err="1"/>
+              <a:t>time</a:t>
+            </a:r>
+            <a:r>
+              <a:rPr lang="cs-CZ" dirty="0"/>
+              <a:t> </a:t>
+            </a:r>
+            <a:r>
+              <a:rPr lang="cs-CZ" dirty="0" err="1"/>
+              <a:t>attribute</a:t>
+            </a:r>
+            <a:r>
+              <a:rPr lang="cs-CZ" dirty="0"/>
+              <a:t>: </a:t>
+            </a:r>
+            <a:r>
+              <a:rPr lang="cs-CZ" dirty="0" err="1">
+                <a:solidFill>
+                  <a:schemeClr val="tx2">
+                    <a:lumMod val="49000"/>
+                    <a:lumOff val="51000"/>
+                  </a:schemeClr>
+                </a:solidFill>
+              </a:rPr>
+              <a:t>Scalability</a:t>
+            </a:r>
+            <a:endParaRPr lang="cs-CZ" dirty="0">
+              <a:solidFill>
+                <a:schemeClr val="tx2">
+                  <a:lumMod val="49000"/>
+                  <a:lumOff val="51000"/>
+                </a:schemeClr>
+              </a:solidFill>
+            </a:endParaRPr>
+          </a:p>
+          <a:p>
+            <a:r>
+              <a:rPr lang="en-US" b="1" dirty="0"/>
+              <a:t>Context</a:t>
+            </a:r>
+            <a:r>
+              <a:rPr lang="en-US" dirty="0"/>
+              <a:t>: During late registration, large batches of enrollment requests are submitted simultaneously.</a:t>
+            </a:r>
+            <a:endParaRPr lang="cs-CZ" dirty="0">
+              <a:solidFill>
+                <a:schemeClr val="tx2">
+                  <a:lumMod val="49000"/>
+                  <a:lumOff val="51000"/>
+                </a:schemeClr>
+              </a:solidFill>
+            </a:endParaRPr>
+          </a:p>
+          <a:p>
+            <a:r>
+              <a:rPr lang="cs-CZ" b="1" dirty="0" err="1"/>
+              <a:t>Result</a:t>
+            </a:r>
+            <a:r>
+              <a:rPr lang="cs-CZ" dirty="0"/>
+              <a:t>: </a:t>
+            </a:r>
+            <a:r>
+              <a:rPr lang="cs-CZ" dirty="0" err="1">
+                <a:solidFill>
+                  <a:srgbClr val="00B050"/>
+                </a:solidFill>
+              </a:rPr>
+              <a:t>Passed</a:t>
+            </a:r>
+            <a:endParaRPr lang="cs-CZ" dirty="0"/>
+          </a:p>
+          <a:p>
+            <a:endParaRPr lang="cs-CZ" dirty="0"/>
+          </a:p>
+          <a:p>
+            <a:endParaRPr lang="cs-CZ" dirty="0"/>
           </a:p>
         </p:txBody>
       </p:sp>
@@ -8932,7 +7788,7 @@
           <a:p>
             <a:fld id="{C8FC608C-7E85-40AC-B31E-0D00EC96515D}" type="datetime1">
               <a:rPr lang="en-US" smtClean="0"/>
-              <a:t>12/10/2024</a:t>
+              <a:t>1/2/2025</a:t>
             </a:fld>
             <a:endParaRPr lang="en-US"/>
           </a:p>
@@ -9031,6 +7887,36 @@
           </a:p>
         </p:txBody>
       </p:sp>
+      <p:pic>
+        <p:nvPicPr>
+          <p:cNvPr id="11" name="Obrázek 10">
+            <a:extLst>
+              <a:ext uri="{FF2B5EF4-FFF2-40B4-BE49-F238E27FC236}">
+                <a16:creationId xmlns:a16="http://schemas.microsoft.com/office/drawing/2014/main" id="{C0FF9E5D-9517-96AF-BBEF-3E34D72951E4}"/>
+              </a:ext>
+            </a:extLst>
+          </p:cNvPr>
+          <p:cNvPicPr>
+            <a:picLocks noChangeAspect="1"/>
+          </p:cNvPicPr>
+          <p:nvPr/>
+        </p:nvPicPr>
+        <p:blipFill>
+          <a:blip r:embed="rId2"/>
+          <a:stretch>
+            <a:fillRect/>
+          </a:stretch>
+        </p:blipFill>
+        <p:spPr>
+          <a:xfrm>
+            <a:off x="842771" y="4428468"/>
+            <a:ext cx="10506457" cy="1038326"/>
+          </a:xfrm>
+          <a:prstGeom prst="rect">
+            <a:avLst/>
+          </a:prstGeom>
+        </p:spPr>
+      </p:pic>
     </p:spTree>
     <p:extLst>
       <p:ext uri="{BB962C8B-B14F-4D97-AF65-F5344CB8AC3E}">
@@ -9143,7 +8029,7 @@
           <a:p>
             <a:fld id="{C8FC608C-7E85-40AC-B31E-0D00EC96515D}" type="datetime1">
               <a:rPr lang="en-US" smtClean="0"/>
-              <a:t>12/10/2024</a:t>
+              <a:t>1/2/2025</a:t>
             </a:fld>
             <a:endParaRPr lang="en-US"/>
           </a:p>

</xml_diff>